<commit_message>
Work on SRS and prototype
</commit_message>
<xml_diff>
--- a/Requirements & Specifications/Prototype.pptx
+++ b/Requirements & Specifications/Prototype.pptx
@@ -5,24 +5,24 @@
     <p:sldMasterId id="2147483648" r:id="rId1"/>
   </p:sldMasterIdLst>
   <p:sldIdLst>
-    <p:sldId id="256" r:id="rId2"/>
-    <p:sldId id="257" r:id="rId3"/>
-    <p:sldId id="270" r:id="rId4"/>
-    <p:sldId id="259" r:id="rId5"/>
-    <p:sldId id="260" r:id="rId6"/>
-    <p:sldId id="261" r:id="rId7"/>
-    <p:sldId id="262" r:id="rId8"/>
-    <p:sldId id="263" r:id="rId9"/>
-    <p:sldId id="264" r:id="rId10"/>
-    <p:sldId id="265" r:id="rId11"/>
-    <p:sldId id="271" r:id="rId12"/>
-    <p:sldId id="266" r:id="rId13"/>
-    <p:sldId id="272" r:id="rId14"/>
-    <p:sldId id="273" r:id="rId15"/>
-    <p:sldId id="267" r:id="rId16"/>
-    <p:sldId id="268" r:id="rId17"/>
-    <p:sldId id="269" r:id="rId18"/>
-    <p:sldId id="258" r:id="rId19"/>
+    <p:sldId id="256" r:id="rId3"/>
+    <p:sldId id="257" r:id="rId4"/>
+    <p:sldId id="270" r:id="rId5"/>
+    <p:sldId id="259" r:id="rId6"/>
+    <p:sldId id="260" r:id="rId7"/>
+    <p:sldId id="261" r:id="rId8"/>
+    <p:sldId id="262" r:id="rId9"/>
+    <p:sldId id="263" r:id="rId10"/>
+    <p:sldId id="264" r:id="rId11"/>
+    <p:sldId id="265" r:id="rId12"/>
+    <p:sldId id="271" r:id="rId13"/>
+    <p:sldId id="266" r:id="rId14"/>
+    <p:sldId id="272" r:id="rId15"/>
+    <p:sldId id="273" r:id="rId16"/>
+    <p:sldId id="267" r:id="rId17"/>
+    <p:sldId id="268" r:id="rId18"/>
+    <p:sldId id="269" r:id="rId19"/>
+    <p:sldId id="258" r:id="rId20"/>
   </p:sldIdLst>
   <p:sldSz cx="12192000" cy="6858000"/>
   <p:notesSz cx="6858000" cy="9144000"/>
@@ -121,22 +121,6 @@
       </a:defRPr>
     </a:lvl9pPr>
   </p:defaultTextStyle>
-  <p:extLst>
-    <p:ext uri="{EFAFB233-063F-42B5-8137-9DF3F51BA10A}">
-      <p15:sldGuideLst xmlns:p15="http://schemas.microsoft.com/office/powerpoint/2012/main">
-        <p15:guide id="1" orient="horz" pos="2160">
-          <p15:clr>
-            <a:srgbClr val="A4A3A4"/>
-          </p15:clr>
-        </p15:guide>
-        <p15:guide id="2" pos="3840">
-          <p15:clr>
-            <a:srgbClr val="A4A3A4"/>
-          </p15:clr>
-        </p15:guide>
-      </p15:sldGuideLst>
-    </p:ext>
-  </p:extLst>
 </p:presentation>
 </file>
 
@@ -353,7 +337,6 @@
           <a:p>
             <a:fld id="{B61BEF0D-F0BB-DE4B-95CE-6DB70DBA9567}" type="datetimeFigureOut">
               <a:rPr lang="en-US" dirty="0"/>
-              <a:t>10/28/2018</a:t>
             </a:fld>
             <a:endParaRPr lang="en-US" dirty="0"/>
           </a:p>
@@ -395,7 +378,6 @@
           <a:p>
             <a:fld id="{D57F1E4F-1CFF-5643-939E-217C01CDF565}" type="slidenum">
               <a:rPr lang="en-US" dirty="0"/>
-              <a:t>‹#›</a:t>
             </a:fld>
             <a:endParaRPr lang="en-US" dirty="0"/>
           </a:p>
@@ -406,13 +388,13 @@
   <p:clrMapOvr>
     <a:masterClrMapping/>
   </p:clrMapOvr>
-  <mc:AlternateContent xmlns:mc="http://schemas.openxmlformats.org/markup-compatibility/2006" xmlns:p14="http://schemas.microsoft.com/office/powerpoint/2010/main">
-    <mc:Choice Requires="p14">
+  <mc:AlternateContent xmlns:mc="http://schemas.openxmlformats.org/markup-compatibility/2006">
+    <mc:Choice xmlns:p14="http://schemas.microsoft.com/office/powerpoint/2010/main" Requires="p14">
       <p:transition spd="slow" p14:dur="1300">
         <p14:pan dir="u"/>
       </p:transition>
     </mc:Choice>
-    <mc:Fallback xmlns="">
+    <mc:Fallback>
       <p:transition spd="slow">
         <p:fade/>
       </p:transition>
@@ -631,6 +613,7 @@
               <a:rPr lang="he-IL"/>
               <a:t>ערוך סגנונות טקסט של תבנית בסיס</a:t>
             </a:r>
+            <a:endParaRPr lang="he-IL"/>
           </a:p>
         </p:txBody>
       </p:sp>
@@ -651,7 +634,6 @@
           <a:p>
             <a:fld id="{B61BEF0D-F0BB-DE4B-95CE-6DB70DBA9567}" type="datetimeFigureOut">
               <a:rPr lang="en-US" dirty="0"/>
-              <a:t>10/28/2018</a:t>
             </a:fld>
             <a:endParaRPr lang="en-US" dirty="0"/>
           </a:p>
@@ -693,7 +675,6 @@
           <a:p>
             <a:fld id="{D57F1E4F-1CFF-5643-939E-217C01CDF565}" type="slidenum">
               <a:rPr lang="en-US" dirty="0"/>
-              <a:t>‹#›</a:t>
             </a:fld>
             <a:endParaRPr lang="en-US" dirty="0"/>
           </a:p>
@@ -704,13 +685,13 @@
   <p:clrMapOvr>
     <a:masterClrMapping/>
   </p:clrMapOvr>
-  <mc:AlternateContent xmlns:mc="http://schemas.openxmlformats.org/markup-compatibility/2006" xmlns:p14="http://schemas.microsoft.com/office/powerpoint/2010/main">
-    <mc:Choice Requires="p14">
+  <mc:AlternateContent xmlns:mc="http://schemas.openxmlformats.org/markup-compatibility/2006">
+    <mc:Choice xmlns:p14="http://schemas.microsoft.com/office/powerpoint/2010/main" Requires="p14">
       <p:transition spd="slow" p14:dur="1300">
         <p14:pan dir="u"/>
       </p:transition>
     </mc:Choice>
-    <mc:Fallback xmlns="">
+    <mc:Fallback>
       <p:transition spd="slow">
         <p:fade/>
       </p:transition>
@@ -897,6 +878,7 @@
               <a:rPr lang="he-IL"/>
               <a:t>ערוך סגנונות טקסט של תבנית בסיס</a:t>
             </a:r>
+            <a:endParaRPr lang="he-IL"/>
           </a:p>
         </p:txBody>
       </p:sp>
@@ -917,7 +899,6 @@
           <a:p>
             <a:fld id="{B61BEF0D-F0BB-DE4B-95CE-6DB70DBA9567}" type="datetimeFigureOut">
               <a:rPr lang="en-US" dirty="0"/>
-              <a:t>10/28/2018</a:t>
             </a:fld>
             <a:endParaRPr lang="en-US" dirty="0"/>
           </a:p>
@@ -959,7 +940,6 @@
           <a:p>
             <a:fld id="{D57F1E4F-1CFF-5643-939E-217C01CDF565}" type="slidenum">
               <a:rPr lang="en-US" dirty="0"/>
-              <a:t>‹#›</a:t>
             </a:fld>
             <a:endParaRPr lang="en-US" dirty="0"/>
           </a:p>
@@ -970,13 +950,13 @@
   <p:clrMapOvr>
     <a:masterClrMapping/>
   </p:clrMapOvr>
-  <mc:AlternateContent xmlns:mc="http://schemas.openxmlformats.org/markup-compatibility/2006" xmlns:p14="http://schemas.microsoft.com/office/powerpoint/2010/main">
-    <mc:Choice Requires="p14">
+  <mc:AlternateContent xmlns:mc="http://schemas.openxmlformats.org/markup-compatibility/2006">
+    <mc:Choice xmlns:p14="http://schemas.microsoft.com/office/powerpoint/2010/main" Requires="p14">
       <p:transition spd="slow" p14:dur="1300">
         <p14:pan dir="u"/>
       </p:transition>
     </mc:Choice>
-    <mc:Fallback xmlns="">
+    <mc:Fallback>
       <p:transition spd="slow">
         <p:fade/>
       </p:transition>
@@ -1114,6 +1094,11 @@
               </a:rPr>
               <a:t>“</a:t>
             </a:r>
+            <a:endParaRPr lang="en-US" sz="8000" dirty="0">
+              <a:solidFill>
+                <a:schemeClr val="accent1"/>
+              </a:solidFill>
+            </a:endParaRPr>
           </a:p>
         </p:txBody>
       </p:sp>
@@ -1229,6 +1214,11 @@
               </a:rPr>
               <a:t>”</a:t>
             </a:r>
+            <a:endParaRPr lang="en-US" sz="8000" dirty="0">
+              <a:solidFill>
+                <a:schemeClr val="accent1"/>
+              </a:solidFill>
+            </a:endParaRPr>
           </a:p>
         </p:txBody>
       </p:sp>
@@ -1321,6 +1311,7 @@
               <a:rPr lang="he-IL"/>
               <a:t>ערוך סגנונות טקסט של תבנית בסיס</a:t>
             </a:r>
+            <a:endParaRPr lang="he-IL"/>
           </a:p>
         </p:txBody>
       </p:sp>
@@ -1373,6 +1364,7 @@
               <a:rPr lang="he-IL"/>
               <a:t>ערוך סגנונות טקסט של תבנית בסיס</a:t>
             </a:r>
+            <a:endParaRPr lang="he-IL"/>
           </a:p>
         </p:txBody>
       </p:sp>
@@ -1393,7 +1385,6 @@
           <a:p>
             <a:fld id="{B61BEF0D-F0BB-DE4B-95CE-6DB70DBA9567}" type="datetimeFigureOut">
               <a:rPr lang="en-US" dirty="0"/>
-              <a:t>10/28/2018</a:t>
             </a:fld>
             <a:endParaRPr lang="en-US" dirty="0"/>
           </a:p>
@@ -1435,7 +1426,6 @@
           <a:p>
             <a:fld id="{D57F1E4F-1CFF-5643-939E-217C01CDF565}" type="slidenum">
               <a:rPr lang="en-US" dirty="0"/>
-              <a:t>‹#›</a:t>
             </a:fld>
             <a:endParaRPr lang="en-US" dirty="0"/>
           </a:p>
@@ -1446,13 +1436,13 @@
   <p:clrMapOvr>
     <a:masterClrMapping/>
   </p:clrMapOvr>
-  <mc:AlternateContent xmlns:mc="http://schemas.openxmlformats.org/markup-compatibility/2006" xmlns:p14="http://schemas.microsoft.com/office/powerpoint/2010/main">
-    <mc:Choice Requires="p14">
+  <mc:AlternateContent xmlns:mc="http://schemas.openxmlformats.org/markup-compatibility/2006">
+    <mc:Choice xmlns:p14="http://schemas.microsoft.com/office/powerpoint/2010/main" Requires="p14">
       <p:transition spd="slow" p14:dur="1300">
         <p14:pan dir="u"/>
       </p:transition>
     </mc:Choice>
-    <mc:Fallback xmlns="">
+    <mc:Fallback>
       <p:transition spd="slow">
         <p:fade/>
       </p:transition>
@@ -1560,6 +1550,7 @@
               <a:rPr lang="he-IL"/>
               <a:t>ערוך סגנונות טקסט של תבנית בסיס</a:t>
             </a:r>
+            <a:endParaRPr lang="he-IL"/>
           </a:p>
         </p:txBody>
       </p:sp>
@@ -1580,7 +1571,6 @@
           <a:p>
             <a:fld id="{B61BEF0D-F0BB-DE4B-95CE-6DB70DBA9567}" type="datetimeFigureOut">
               <a:rPr lang="en-US" dirty="0"/>
-              <a:t>10/28/2018</a:t>
             </a:fld>
             <a:endParaRPr lang="en-US" dirty="0"/>
           </a:p>
@@ -1622,7 +1612,6 @@
           <a:p>
             <a:fld id="{D57F1E4F-1CFF-5643-939E-217C01CDF565}" type="slidenum">
               <a:rPr lang="en-US" dirty="0"/>
-              <a:t>‹#›</a:t>
             </a:fld>
             <a:endParaRPr lang="en-US" dirty="0"/>
           </a:p>
@@ -1633,13 +1622,13 @@
   <p:clrMapOvr>
     <a:masterClrMapping/>
   </p:clrMapOvr>
-  <mc:AlternateContent xmlns:mc="http://schemas.openxmlformats.org/markup-compatibility/2006" xmlns:p14="http://schemas.microsoft.com/office/powerpoint/2010/main">
-    <mc:Choice Requires="p14">
+  <mc:AlternateContent xmlns:mc="http://schemas.openxmlformats.org/markup-compatibility/2006">
+    <mc:Choice xmlns:p14="http://schemas.microsoft.com/office/powerpoint/2010/main" Requires="p14">
       <p:transition spd="slow" p14:dur="1300">
         <p14:pan dir="u"/>
       </p:transition>
     </mc:Choice>
-    <mc:Fallback xmlns="">
+    <mc:Fallback>
       <p:transition spd="slow">
         <p:fade/>
       </p:transition>
@@ -1777,6 +1766,11 @@
               </a:rPr>
               <a:t>“</a:t>
             </a:r>
+            <a:endParaRPr lang="en-US" sz="8000" dirty="0">
+              <a:solidFill>
+                <a:schemeClr val="accent1"/>
+              </a:solidFill>
+            </a:endParaRPr>
           </a:p>
         </p:txBody>
       </p:sp>
@@ -1892,6 +1886,11 @@
               </a:rPr>
               <a:t>”</a:t>
             </a:r>
+            <a:endParaRPr lang="en-US" sz="8000" dirty="0">
+              <a:solidFill>
+                <a:schemeClr val="accent1"/>
+              </a:solidFill>
+            </a:endParaRPr>
           </a:p>
         </p:txBody>
       </p:sp>
@@ -2013,6 +2012,7 @@
               <a:rPr lang="he-IL"/>
               <a:t>ערוך סגנונות טקסט של תבנית בסיס</a:t>
             </a:r>
+            <a:endParaRPr lang="he-IL"/>
           </a:p>
         </p:txBody>
       </p:sp>
@@ -2143,6 +2143,7 @@
               <a:rPr lang="he-IL"/>
               <a:t>ערוך סגנונות טקסט של תבנית בסיס</a:t>
             </a:r>
+            <a:endParaRPr lang="he-IL"/>
           </a:p>
         </p:txBody>
       </p:sp>
@@ -2163,7 +2164,6 @@
           <a:p>
             <a:fld id="{B61BEF0D-F0BB-DE4B-95CE-6DB70DBA9567}" type="datetimeFigureOut">
               <a:rPr lang="en-US" dirty="0"/>
-              <a:t>10/28/2018</a:t>
             </a:fld>
             <a:endParaRPr lang="en-US" dirty="0"/>
           </a:p>
@@ -2205,7 +2205,6 @@
           <a:p>
             <a:fld id="{D57F1E4F-1CFF-5643-939E-217C01CDF565}" type="slidenum">
               <a:rPr lang="en-US" dirty="0"/>
-              <a:t>‹#›</a:t>
             </a:fld>
             <a:endParaRPr lang="en-US" dirty="0"/>
           </a:p>
@@ -2216,13 +2215,13 @@
   <p:clrMapOvr>
     <a:masterClrMapping/>
   </p:clrMapOvr>
-  <mc:AlternateContent xmlns:mc="http://schemas.openxmlformats.org/markup-compatibility/2006" xmlns:p14="http://schemas.microsoft.com/office/powerpoint/2010/main">
-    <mc:Choice Requires="p14">
+  <mc:AlternateContent xmlns:mc="http://schemas.openxmlformats.org/markup-compatibility/2006">
+    <mc:Choice xmlns:p14="http://schemas.microsoft.com/office/powerpoint/2010/main" Requires="p14">
       <p:transition spd="slow" p14:dur="1300">
         <p14:pan dir="u"/>
       </p:transition>
     </mc:Choice>
-    <mc:Fallback xmlns="">
+    <mc:Fallback>
       <p:transition spd="slow">
         <p:fade/>
       </p:transition>
@@ -2352,6 +2351,7 @@
               <a:rPr lang="he-IL"/>
               <a:t>ערוך סגנונות טקסט של תבנית בסיס</a:t>
             </a:r>
+            <a:endParaRPr lang="he-IL"/>
           </a:p>
         </p:txBody>
       </p:sp>
@@ -2482,6 +2482,7 @@
               <a:rPr lang="he-IL"/>
               <a:t>ערוך סגנונות טקסט של תבנית בסיס</a:t>
             </a:r>
+            <a:endParaRPr lang="he-IL"/>
           </a:p>
         </p:txBody>
       </p:sp>
@@ -2502,7 +2503,6 @@
           <a:p>
             <a:fld id="{B61BEF0D-F0BB-DE4B-95CE-6DB70DBA9567}" type="datetimeFigureOut">
               <a:rPr lang="en-US" dirty="0"/>
-              <a:t>10/28/2018</a:t>
             </a:fld>
             <a:endParaRPr lang="en-US" dirty="0"/>
           </a:p>
@@ -2544,7 +2544,6 @@
           <a:p>
             <a:fld id="{D57F1E4F-1CFF-5643-939E-217C01CDF565}" type="slidenum">
               <a:rPr lang="en-US" dirty="0"/>
-              <a:t>‹#›</a:t>
             </a:fld>
             <a:endParaRPr lang="en-US" dirty="0"/>
           </a:p>
@@ -2555,13 +2554,13 @@
   <p:clrMapOvr>
     <a:masterClrMapping/>
   </p:clrMapOvr>
-  <mc:AlternateContent xmlns:mc="http://schemas.openxmlformats.org/markup-compatibility/2006" xmlns:p14="http://schemas.microsoft.com/office/powerpoint/2010/main">
-    <mc:Choice Requires="p14">
+  <mc:AlternateContent xmlns:mc="http://schemas.openxmlformats.org/markup-compatibility/2006">
+    <mc:Choice xmlns:p14="http://schemas.microsoft.com/office/powerpoint/2010/main" Requires="p14">
       <p:transition spd="slow" p14:dur="1300">
         <p14:pan dir="u"/>
       </p:transition>
     </mc:Choice>
-    <mc:Fallback xmlns="">
+    <mc:Fallback>
       <p:transition spd="slow">
         <p:fade/>
       </p:transition>
@@ -2635,6 +2634,7 @@
               <a:rPr lang="he-IL"/>
               <a:t>ערוך סגנונות טקסט של תבנית בסיס</a:t>
             </a:r>
+            <a:endParaRPr lang="he-IL"/>
           </a:p>
           <a:p>
             <a:pPr lvl="1"/>
@@ -2642,6 +2642,7 @@
               <a:rPr lang="he-IL"/>
               <a:t>רמה שניה</a:t>
             </a:r>
+            <a:endParaRPr lang="he-IL"/>
           </a:p>
           <a:p>
             <a:pPr lvl="2"/>
@@ -2649,6 +2650,7 @@
               <a:rPr lang="he-IL"/>
               <a:t>רמה שלישית</a:t>
             </a:r>
+            <a:endParaRPr lang="he-IL"/>
           </a:p>
           <a:p>
             <a:pPr lvl="3"/>
@@ -2656,6 +2658,7 @@
               <a:rPr lang="he-IL"/>
               <a:t>רמה רביעית</a:t>
             </a:r>
+            <a:endParaRPr lang="he-IL"/>
           </a:p>
           <a:p>
             <a:pPr lvl="4"/>
@@ -2684,7 +2687,6 @@
           <a:p>
             <a:fld id="{B61BEF0D-F0BB-DE4B-95CE-6DB70DBA9567}" type="datetimeFigureOut">
               <a:rPr lang="en-US" dirty="0"/>
-              <a:t>10/28/2018</a:t>
             </a:fld>
             <a:endParaRPr lang="en-US" dirty="0"/>
           </a:p>
@@ -2726,7 +2728,6 @@
           <a:p>
             <a:fld id="{D57F1E4F-1CFF-5643-939E-217C01CDF565}" type="slidenum">
               <a:rPr lang="en-US" dirty="0"/>
-              <a:t>‹#›</a:t>
             </a:fld>
             <a:endParaRPr lang="en-US" dirty="0"/>
           </a:p>
@@ -2737,13 +2738,13 @@
   <p:clrMapOvr>
     <a:masterClrMapping/>
   </p:clrMapOvr>
-  <mc:AlternateContent xmlns:mc="http://schemas.openxmlformats.org/markup-compatibility/2006" xmlns:p14="http://schemas.microsoft.com/office/powerpoint/2010/main">
-    <mc:Choice Requires="p14">
+  <mc:AlternateContent xmlns:mc="http://schemas.openxmlformats.org/markup-compatibility/2006">
+    <mc:Choice xmlns:p14="http://schemas.microsoft.com/office/powerpoint/2010/main" Requires="p14">
       <p:transition spd="slow" p14:dur="1300">
         <p14:pan dir="u"/>
       </p:transition>
     </mc:Choice>
-    <mc:Fallback xmlns="">
+    <mc:Fallback>
       <p:transition spd="slow">
         <p:fade/>
       </p:transition>
@@ -2822,6 +2823,7 @@
               <a:rPr lang="he-IL"/>
               <a:t>ערוך סגנונות טקסט של תבנית בסיס</a:t>
             </a:r>
+            <a:endParaRPr lang="he-IL"/>
           </a:p>
           <a:p>
             <a:pPr lvl="1"/>
@@ -2829,6 +2831,7 @@
               <a:rPr lang="he-IL"/>
               <a:t>רמה שניה</a:t>
             </a:r>
+            <a:endParaRPr lang="he-IL"/>
           </a:p>
           <a:p>
             <a:pPr lvl="2"/>
@@ -2836,6 +2839,7 @@
               <a:rPr lang="he-IL"/>
               <a:t>רמה שלישית</a:t>
             </a:r>
+            <a:endParaRPr lang="he-IL"/>
           </a:p>
           <a:p>
             <a:pPr lvl="3"/>
@@ -2843,6 +2847,7 @@
               <a:rPr lang="he-IL"/>
               <a:t>רמה רביעית</a:t>
             </a:r>
+            <a:endParaRPr lang="he-IL"/>
           </a:p>
           <a:p>
             <a:pPr lvl="4"/>
@@ -2871,7 +2876,6 @@
           <a:p>
             <a:fld id="{B61BEF0D-F0BB-DE4B-95CE-6DB70DBA9567}" type="datetimeFigureOut">
               <a:rPr lang="en-US" dirty="0"/>
-              <a:t>10/28/2018</a:t>
             </a:fld>
             <a:endParaRPr lang="en-US" dirty="0"/>
           </a:p>
@@ -2913,7 +2917,6 @@
           <a:p>
             <a:fld id="{D57F1E4F-1CFF-5643-939E-217C01CDF565}" type="slidenum">
               <a:rPr lang="en-US" dirty="0"/>
-              <a:t>‹#›</a:t>
             </a:fld>
             <a:endParaRPr lang="en-US" dirty="0"/>
           </a:p>
@@ -2924,13 +2927,13 @@
   <p:clrMapOvr>
     <a:masterClrMapping/>
   </p:clrMapOvr>
-  <mc:AlternateContent xmlns:mc="http://schemas.openxmlformats.org/markup-compatibility/2006" xmlns:p14="http://schemas.microsoft.com/office/powerpoint/2010/main">
-    <mc:Choice Requires="p14">
+  <mc:AlternateContent xmlns:mc="http://schemas.openxmlformats.org/markup-compatibility/2006">
+    <mc:Choice xmlns:p14="http://schemas.microsoft.com/office/powerpoint/2010/main" Requires="p14">
       <p:transition spd="slow" p14:dur="1300">
         <p14:pan dir="u"/>
       </p:transition>
     </mc:Choice>
-    <mc:Fallback xmlns="">
+    <mc:Fallback>
       <p:transition spd="slow">
         <p:fade/>
       </p:transition>
@@ -2999,6 +3002,7 @@
               <a:rPr lang="he-IL"/>
               <a:t>ערוך סגנונות טקסט של תבנית בסיס</a:t>
             </a:r>
+            <a:endParaRPr lang="he-IL"/>
           </a:p>
           <a:p>
             <a:pPr lvl="1"/>
@@ -3006,6 +3010,7 @@
               <a:rPr lang="he-IL"/>
               <a:t>רמה שניה</a:t>
             </a:r>
+            <a:endParaRPr lang="he-IL"/>
           </a:p>
           <a:p>
             <a:pPr lvl="2"/>
@@ -3013,6 +3018,7 @@
               <a:rPr lang="he-IL"/>
               <a:t>רמה שלישית</a:t>
             </a:r>
+            <a:endParaRPr lang="he-IL"/>
           </a:p>
           <a:p>
             <a:pPr lvl="3"/>
@@ -3020,6 +3026,7 @@
               <a:rPr lang="he-IL"/>
               <a:t>רמה רביעית</a:t>
             </a:r>
+            <a:endParaRPr lang="he-IL"/>
           </a:p>
           <a:p>
             <a:pPr lvl="4"/>
@@ -3048,7 +3055,6 @@
           <a:p>
             <a:fld id="{B61BEF0D-F0BB-DE4B-95CE-6DB70DBA9567}" type="datetimeFigureOut">
               <a:rPr lang="en-US" dirty="0"/>
-              <a:t>10/28/2018</a:t>
             </a:fld>
             <a:endParaRPr lang="en-US" dirty="0"/>
           </a:p>
@@ -3090,7 +3096,6 @@
           <a:p>
             <a:fld id="{D57F1E4F-1CFF-5643-939E-217C01CDF565}" type="slidenum">
               <a:rPr lang="en-US" dirty="0"/>
-              <a:t>‹#›</a:t>
             </a:fld>
             <a:endParaRPr lang="en-US" dirty="0"/>
           </a:p>
@@ -3101,13 +3106,13 @@
   <p:clrMapOvr>
     <a:masterClrMapping/>
   </p:clrMapOvr>
-  <mc:AlternateContent xmlns:mc="http://schemas.openxmlformats.org/markup-compatibility/2006" xmlns:p14="http://schemas.microsoft.com/office/powerpoint/2010/main">
-    <mc:Choice Requires="p14">
+  <mc:AlternateContent xmlns:mc="http://schemas.openxmlformats.org/markup-compatibility/2006">
+    <mc:Choice xmlns:p14="http://schemas.microsoft.com/office/powerpoint/2010/main" Requires="p14">
       <p:transition spd="slow" p14:dur="1300">
         <p14:pan dir="u"/>
       </p:transition>
     </mc:Choice>
-    <mc:Fallback xmlns="">
+    <mc:Fallback>
       <p:transition spd="slow">
         <p:fade/>
       </p:transition>
@@ -3292,6 +3297,7 @@
               <a:rPr lang="he-IL"/>
               <a:t>ערוך סגנונות טקסט של תבנית בסיס</a:t>
             </a:r>
+            <a:endParaRPr lang="he-IL"/>
           </a:p>
         </p:txBody>
       </p:sp>
@@ -3312,7 +3318,6 @@
           <a:p>
             <a:fld id="{B61BEF0D-F0BB-DE4B-95CE-6DB70DBA9567}" type="datetimeFigureOut">
               <a:rPr lang="en-US" dirty="0"/>
-              <a:t>10/28/2018</a:t>
             </a:fld>
             <a:endParaRPr lang="en-US" dirty="0"/>
           </a:p>
@@ -3354,7 +3359,6 @@
           <a:p>
             <a:fld id="{D57F1E4F-1CFF-5643-939E-217C01CDF565}" type="slidenum">
               <a:rPr lang="en-US" dirty="0"/>
-              <a:t>‹#›</a:t>
             </a:fld>
             <a:endParaRPr lang="en-US" dirty="0"/>
           </a:p>
@@ -3365,13 +3369,13 @@
   <p:clrMapOvr>
     <a:masterClrMapping/>
   </p:clrMapOvr>
-  <mc:AlternateContent xmlns:mc="http://schemas.openxmlformats.org/markup-compatibility/2006" xmlns:p14="http://schemas.microsoft.com/office/powerpoint/2010/main">
-    <mc:Choice Requires="p14">
+  <mc:AlternateContent xmlns:mc="http://schemas.openxmlformats.org/markup-compatibility/2006">
+    <mc:Choice xmlns:p14="http://schemas.microsoft.com/office/powerpoint/2010/main" Requires="p14">
       <p:transition spd="slow" p14:dur="1300">
         <p14:pan dir="u"/>
       </p:transition>
     </mc:Choice>
-    <mc:Fallback xmlns="">
+    <mc:Fallback>
       <p:transition spd="slow">
         <p:fade/>
       </p:transition>
@@ -3475,6 +3479,7 @@
               <a:rPr lang="he-IL"/>
               <a:t>ערוך סגנונות טקסט של תבנית בסיס</a:t>
             </a:r>
+            <a:endParaRPr lang="he-IL"/>
           </a:p>
           <a:p>
             <a:pPr lvl="1"/>
@@ -3482,6 +3487,7 @@
               <a:rPr lang="he-IL"/>
               <a:t>רמה שניה</a:t>
             </a:r>
+            <a:endParaRPr lang="he-IL"/>
           </a:p>
           <a:p>
             <a:pPr lvl="2"/>
@@ -3489,6 +3495,7 @@
               <a:rPr lang="he-IL"/>
               <a:t>רמה שלישית</a:t>
             </a:r>
+            <a:endParaRPr lang="he-IL"/>
           </a:p>
           <a:p>
             <a:pPr lvl="3"/>
@@ -3496,6 +3503,7 @@
               <a:rPr lang="he-IL"/>
               <a:t>רמה רביעית</a:t>
             </a:r>
+            <a:endParaRPr lang="he-IL"/>
           </a:p>
           <a:p>
             <a:pPr lvl="4"/>
@@ -3562,6 +3570,7 @@
               <a:rPr lang="he-IL"/>
               <a:t>ערוך סגנונות טקסט של תבנית בסיס</a:t>
             </a:r>
+            <a:endParaRPr lang="he-IL"/>
           </a:p>
           <a:p>
             <a:pPr lvl="1"/>
@@ -3569,6 +3578,7 @@
               <a:rPr lang="he-IL"/>
               <a:t>רמה שניה</a:t>
             </a:r>
+            <a:endParaRPr lang="he-IL"/>
           </a:p>
           <a:p>
             <a:pPr lvl="2"/>
@@ -3576,6 +3586,7 @@
               <a:rPr lang="he-IL"/>
               <a:t>רמה שלישית</a:t>
             </a:r>
+            <a:endParaRPr lang="he-IL"/>
           </a:p>
           <a:p>
             <a:pPr lvl="3"/>
@@ -3583,6 +3594,7 @@
               <a:rPr lang="he-IL"/>
               <a:t>רמה רביעית</a:t>
             </a:r>
+            <a:endParaRPr lang="he-IL"/>
           </a:p>
           <a:p>
             <a:pPr lvl="4"/>
@@ -3611,7 +3623,6 @@
           <a:p>
             <a:fld id="{B61BEF0D-F0BB-DE4B-95CE-6DB70DBA9567}" type="datetimeFigureOut">
               <a:rPr lang="en-US" dirty="0"/>
-              <a:t>10/28/2018</a:t>
             </a:fld>
             <a:endParaRPr lang="en-US" dirty="0"/>
           </a:p>
@@ -3653,7 +3664,6 @@
           <a:p>
             <a:fld id="{D57F1E4F-1CFF-5643-939E-217C01CDF565}" type="slidenum">
               <a:rPr lang="en-US" dirty="0"/>
-              <a:t>‹#›</a:t>
             </a:fld>
             <a:endParaRPr lang="en-US" dirty="0"/>
           </a:p>
@@ -3664,13 +3674,13 @@
   <p:clrMapOvr>
     <a:masterClrMapping/>
   </p:clrMapOvr>
-  <mc:AlternateContent xmlns:mc="http://schemas.openxmlformats.org/markup-compatibility/2006" xmlns:p14="http://schemas.microsoft.com/office/powerpoint/2010/main">
-    <mc:Choice Requires="p14">
+  <mc:AlternateContent xmlns:mc="http://schemas.openxmlformats.org/markup-compatibility/2006">
+    <mc:Choice xmlns:p14="http://schemas.microsoft.com/office/powerpoint/2010/main" Requires="p14">
       <p:transition spd="slow" p14:dur="1300">
         <p14:pan dir="u"/>
       </p:transition>
     </mc:Choice>
-    <mc:Fallback xmlns="">
+    <mc:Fallback>
       <p:transition spd="slow">
         <p:fade/>
       </p:transition>
@@ -3787,6 +3797,7 @@
               <a:rPr lang="he-IL"/>
               <a:t>ערוך סגנונות טקסט של תבנית בסיס</a:t>
             </a:r>
+            <a:endParaRPr lang="he-IL"/>
           </a:p>
         </p:txBody>
       </p:sp>
@@ -3845,6 +3856,7 @@
               <a:rPr lang="he-IL"/>
               <a:t>ערוך סגנונות טקסט של תבנית בסיס</a:t>
             </a:r>
+            <a:endParaRPr lang="he-IL"/>
           </a:p>
           <a:p>
             <a:pPr lvl="1"/>
@@ -3852,6 +3864,7 @@
               <a:rPr lang="he-IL"/>
               <a:t>רמה שניה</a:t>
             </a:r>
+            <a:endParaRPr lang="he-IL"/>
           </a:p>
           <a:p>
             <a:pPr lvl="2"/>
@@ -3859,6 +3872,7 @@
               <a:rPr lang="he-IL"/>
               <a:t>רמה שלישית</a:t>
             </a:r>
+            <a:endParaRPr lang="he-IL"/>
           </a:p>
           <a:p>
             <a:pPr lvl="3"/>
@@ -3866,6 +3880,7 @@
               <a:rPr lang="he-IL"/>
               <a:t>רמה רביעית</a:t>
             </a:r>
+            <a:endParaRPr lang="he-IL"/>
           </a:p>
           <a:p>
             <a:pPr lvl="4"/>
@@ -3941,6 +3956,7 @@
               <a:rPr lang="he-IL"/>
               <a:t>ערוך סגנונות טקסט של תבנית בסיס</a:t>
             </a:r>
+            <a:endParaRPr lang="he-IL"/>
           </a:p>
         </p:txBody>
       </p:sp>
@@ -3999,6 +4015,7 @@
               <a:rPr lang="he-IL"/>
               <a:t>ערוך סגנונות טקסט של תבנית בסיס</a:t>
             </a:r>
+            <a:endParaRPr lang="he-IL"/>
           </a:p>
           <a:p>
             <a:pPr lvl="1"/>
@@ -4006,6 +4023,7 @@
               <a:rPr lang="he-IL"/>
               <a:t>רמה שניה</a:t>
             </a:r>
+            <a:endParaRPr lang="he-IL"/>
           </a:p>
           <a:p>
             <a:pPr lvl="2"/>
@@ -4013,6 +4031,7 @@
               <a:rPr lang="he-IL"/>
               <a:t>רמה שלישית</a:t>
             </a:r>
+            <a:endParaRPr lang="he-IL"/>
           </a:p>
           <a:p>
             <a:pPr lvl="3"/>
@@ -4020,6 +4039,7 @@
               <a:rPr lang="he-IL"/>
               <a:t>רמה רביעית</a:t>
             </a:r>
+            <a:endParaRPr lang="he-IL"/>
           </a:p>
           <a:p>
             <a:pPr lvl="4"/>
@@ -4048,7 +4068,6 @@
           <a:p>
             <a:fld id="{B61BEF0D-F0BB-DE4B-95CE-6DB70DBA9567}" type="datetimeFigureOut">
               <a:rPr lang="en-US" dirty="0"/>
-              <a:t>10/28/2018</a:t>
             </a:fld>
             <a:endParaRPr lang="en-US" dirty="0"/>
           </a:p>
@@ -4090,7 +4109,6 @@
           <a:p>
             <a:fld id="{D57F1E4F-1CFF-5643-939E-217C01CDF565}" type="slidenum">
               <a:rPr lang="en-US" dirty="0"/>
-              <a:t>‹#›</a:t>
             </a:fld>
             <a:endParaRPr lang="en-US" dirty="0"/>
           </a:p>
@@ -4101,13 +4119,13 @@
   <p:clrMapOvr>
     <a:masterClrMapping/>
   </p:clrMapOvr>
-  <mc:AlternateContent xmlns:mc="http://schemas.openxmlformats.org/markup-compatibility/2006" xmlns:p14="http://schemas.microsoft.com/office/powerpoint/2010/main">
-    <mc:Choice Requires="p14">
+  <mc:AlternateContent xmlns:mc="http://schemas.openxmlformats.org/markup-compatibility/2006">
+    <mc:Choice xmlns:p14="http://schemas.microsoft.com/office/powerpoint/2010/main" Requires="p14">
       <p:transition spd="slow" p14:dur="1300">
         <p14:pan dir="u"/>
       </p:transition>
     </mc:Choice>
-    <mc:Fallback xmlns="">
+    <mc:Fallback>
       <p:transition spd="slow">
         <p:fade/>
       </p:transition>
@@ -4173,7 +4191,6 @@
           <a:p>
             <a:fld id="{B61BEF0D-F0BB-DE4B-95CE-6DB70DBA9567}" type="datetimeFigureOut">
               <a:rPr lang="en-US" dirty="0"/>
-              <a:t>10/28/2018</a:t>
             </a:fld>
             <a:endParaRPr lang="en-US" dirty="0"/>
           </a:p>
@@ -4215,7 +4232,6 @@
           <a:p>
             <a:fld id="{D57F1E4F-1CFF-5643-939E-217C01CDF565}" type="slidenum">
               <a:rPr lang="en-US" dirty="0"/>
-              <a:t>‹#›</a:t>
             </a:fld>
             <a:endParaRPr lang="en-US" dirty="0"/>
           </a:p>
@@ -4226,13 +4242,13 @@
   <p:clrMapOvr>
     <a:masterClrMapping/>
   </p:clrMapOvr>
-  <mc:AlternateContent xmlns:mc="http://schemas.openxmlformats.org/markup-compatibility/2006" xmlns:p14="http://schemas.microsoft.com/office/powerpoint/2010/main">
-    <mc:Choice Requires="p14">
+  <mc:AlternateContent xmlns:mc="http://schemas.openxmlformats.org/markup-compatibility/2006">
+    <mc:Choice xmlns:p14="http://schemas.microsoft.com/office/powerpoint/2010/main" Requires="p14">
       <p:transition spd="slow" p14:dur="1300">
         <p14:pan dir="u"/>
       </p:transition>
     </mc:Choice>
-    <mc:Fallback xmlns="">
+    <mc:Fallback>
       <p:transition spd="slow">
         <p:fade/>
       </p:transition>
@@ -4275,7 +4291,6 @@
           <a:p>
             <a:fld id="{B61BEF0D-F0BB-DE4B-95CE-6DB70DBA9567}" type="datetimeFigureOut">
               <a:rPr lang="en-US" dirty="0"/>
-              <a:t>10/28/2018</a:t>
             </a:fld>
             <a:endParaRPr lang="en-US" dirty="0"/>
           </a:p>
@@ -4317,7 +4332,6 @@
           <a:p>
             <a:fld id="{D57F1E4F-1CFF-5643-939E-217C01CDF565}" type="slidenum">
               <a:rPr lang="en-US" dirty="0"/>
-              <a:t>‹#›</a:t>
             </a:fld>
             <a:endParaRPr lang="en-US" dirty="0"/>
           </a:p>
@@ -4328,13 +4342,13 @@
   <p:clrMapOvr>
     <a:masterClrMapping/>
   </p:clrMapOvr>
-  <mc:AlternateContent xmlns:mc="http://schemas.openxmlformats.org/markup-compatibility/2006" xmlns:p14="http://schemas.microsoft.com/office/powerpoint/2010/main">
-    <mc:Choice Requires="p14">
+  <mc:AlternateContent xmlns:mc="http://schemas.openxmlformats.org/markup-compatibility/2006">
+    <mc:Choice xmlns:p14="http://schemas.microsoft.com/office/powerpoint/2010/main" Requires="p14">
       <p:transition spd="slow" p14:dur="1300">
         <p14:pan dir="u"/>
       </p:transition>
     </mc:Choice>
-    <mc:Fallback xmlns="">
+    <mc:Fallback>
       <p:transition spd="slow">
         <p:fade/>
       </p:transition>
@@ -4449,6 +4463,7 @@
               <a:rPr lang="he-IL"/>
               <a:t>ערוך סגנונות טקסט של תבנית בסיס</a:t>
             </a:r>
+            <a:endParaRPr lang="he-IL"/>
           </a:p>
           <a:p>
             <a:pPr lvl="1"/>
@@ -4456,6 +4471,7 @@
               <a:rPr lang="he-IL"/>
               <a:t>רמה שניה</a:t>
             </a:r>
+            <a:endParaRPr lang="he-IL"/>
           </a:p>
           <a:p>
             <a:pPr lvl="2"/>
@@ -4463,6 +4479,7 @@
               <a:rPr lang="he-IL"/>
               <a:t>רמה שלישית</a:t>
             </a:r>
+            <a:endParaRPr lang="he-IL"/>
           </a:p>
           <a:p>
             <a:pPr lvl="3"/>
@@ -4470,6 +4487,7 @@
               <a:rPr lang="he-IL"/>
               <a:t>רמה רביעית</a:t>
             </a:r>
+            <a:endParaRPr lang="he-IL"/>
           </a:p>
           <a:p>
             <a:pPr lvl="4"/>
@@ -4545,6 +4563,7 @@
               <a:rPr lang="he-IL"/>
               <a:t>ערוך סגנונות טקסט של תבנית בסיס</a:t>
             </a:r>
+            <a:endParaRPr lang="he-IL"/>
           </a:p>
         </p:txBody>
       </p:sp>
@@ -4565,7 +4584,6 @@
           <a:p>
             <a:fld id="{B61BEF0D-F0BB-DE4B-95CE-6DB70DBA9567}" type="datetimeFigureOut">
               <a:rPr lang="en-US" dirty="0"/>
-              <a:t>10/28/2018</a:t>
             </a:fld>
             <a:endParaRPr lang="en-US" dirty="0"/>
           </a:p>
@@ -4607,7 +4625,6 @@
           <a:p>
             <a:fld id="{D57F1E4F-1CFF-5643-939E-217C01CDF565}" type="slidenum">
               <a:rPr lang="en-US" dirty="0"/>
-              <a:t>‹#›</a:t>
             </a:fld>
             <a:endParaRPr lang="en-US" dirty="0"/>
           </a:p>
@@ -4618,13 +4635,13 @@
   <p:clrMapOvr>
     <a:masterClrMapping/>
   </p:clrMapOvr>
-  <mc:AlternateContent xmlns:mc="http://schemas.openxmlformats.org/markup-compatibility/2006" xmlns:p14="http://schemas.microsoft.com/office/powerpoint/2010/main">
-    <mc:Choice Requires="p14">
+  <mc:AlternateContent xmlns:mc="http://schemas.openxmlformats.org/markup-compatibility/2006">
+    <mc:Choice xmlns:p14="http://schemas.microsoft.com/office/powerpoint/2010/main" Requires="p14">
       <p:transition spd="slow" p14:dur="1300">
         <p14:pan dir="u"/>
       </p:transition>
     </mc:Choice>
-    <mc:Fallback xmlns="">
+    <mc:Fallback>
       <p:transition spd="slow">
         <p:fade/>
       </p:transition>
@@ -4838,6 +4855,7 @@
               <a:rPr lang="he-IL"/>
               <a:t>ערוך סגנונות טקסט של תבנית בסיס</a:t>
             </a:r>
+            <a:endParaRPr lang="he-IL"/>
           </a:p>
         </p:txBody>
       </p:sp>
@@ -4863,7 +4881,6 @@
           <a:p>
             <a:fld id="{B61BEF0D-F0BB-DE4B-95CE-6DB70DBA9567}" type="datetimeFigureOut">
               <a:rPr lang="en-US" dirty="0"/>
-              <a:t>10/28/2018</a:t>
             </a:fld>
             <a:endParaRPr lang="en-US" dirty="0"/>
           </a:p>
@@ -4915,7 +4932,6 @@
           <a:p>
             <a:fld id="{D57F1E4F-1CFF-5643-939E-217C01CDF565}" type="slidenum">
               <a:rPr lang="en-US" dirty="0"/>
-              <a:t>‹#›</a:t>
             </a:fld>
             <a:endParaRPr lang="en-US" dirty="0"/>
           </a:p>
@@ -4926,13 +4942,13 @@
   <p:clrMapOvr>
     <a:masterClrMapping/>
   </p:clrMapOvr>
-  <mc:AlternateContent xmlns:mc="http://schemas.openxmlformats.org/markup-compatibility/2006" xmlns:p14="http://schemas.microsoft.com/office/powerpoint/2010/main">
-    <mc:Choice Requires="p14">
+  <mc:AlternateContent xmlns:mc="http://schemas.openxmlformats.org/markup-compatibility/2006">
+    <mc:Choice xmlns:p14="http://schemas.microsoft.com/office/powerpoint/2010/main" Requires="p14">
       <p:transition spd="slow" p14:dur="1300">
         <p14:pan dir="u"/>
       </p:transition>
     </mc:Choice>
-    <mc:Fallback xmlns="">
+    <mc:Fallback>
       <p:transition spd="slow">
         <p:fade/>
       </p:transition>
@@ -5026,6 +5042,7 @@
               <a:rPr lang="he-IL"/>
               <a:t>ערוך סגנונות טקסט של תבנית בסיס</a:t>
             </a:r>
+            <a:endParaRPr lang="he-IL"/>
           </a:p>
           <a:p>
             <a:pPr lvl="1"/>
@@ -5033,6 +5050,7 @@
               <a:rPr lang="he-IL"/>
               <a:t>רמה שניה</a:t>
             </a:r>
+            <a:endParaRPr lang="he-IL"/>
           </a:p>
           <a:p>
             <a:pPr lvl="2"/>
@@ -5040,6 +5058,7 @@
               <a:rPr lang="he-IL"/>
               <a:t>רמה שלישית</a:t>
             </a:r>
+            <a:endParaRPr lang="he-IL"/>
           </a:p>
           <a:p>
             <a:pPr lvl="3"/>
@@ -5047,6 +5066,7 @@
               <a:rPr lang="he-IL"/>
               <a:t>רמה רביעית</a:t>
             </a:r>
+            <a:endParaRPr lang="he-IL"/>
           </a:p>
           <a:p>
             <a:pPr lvl="4"/>
@@ -5101,7 +5121,6 @@
           <a:p>
             <a:fld id="{B61BEF0D-F0BB-DE4B-95CE-6DB70DBA9567}" type="datetimeFigureOut">
               <a:rPr lang="en-US" dirty="0"/>
-              <a:t>10/28/2018</a:t>
             </a:fld>
             <a:endParaRPr lang="en-US" dirty="0"/>
           </a:p>
@@ -5195,7 +5214,6 @@
           <a:p>
             <a:fld id="{D57F1E4F-1CFF-5643-939E-217C01CDF565}" type="slidenum">
               <a:rPr lang="en-US" dirty="0"/>
-              <a:t>‹#›</a:t>
             </a:fld>
             <a:endParaRPr lang="en-US" dirty="0"/>
           </a:p>
@@ -5223,13 +5241,13 @@
     <p:sldLayoutId id="2147483664" r:id="rId16"/>
     <p:sldLayoutId id="2147483665" r:id="rId17"/>
   </p:sldLayoutIdLst>
-  <mc:AlternateContent xmlns:mc="http://schemas.openxmlformats.org/markup-compatibility/2006" xmlns:p14="http://schemas.microsoft.com/office/powerpoint/2010/main">
-    <mc:Choice Requires="p14">
+  <mc:AlternateContent xmlns:mc="http://schemas.openxmlformats.org/markup-compatibility/2006">
+    <mc:Choice xmlns:p14="http://schemas.microsoft.com/office/powerpoint/2010/main" Requires="p14">
       <p:transition spd="slow" p14:dur="1300">
         <p14:pan dir="u"/>
       </p:transition>
     </mc:Choice>
-    <mc:Fallback xmlns="">
+    <mc:Fallback>
       <p:transition spd="slow">
         <p:fade/>
       </p:transition>
@@ -5937,7 +5955,7 @@
       <p:sp>
         <p:nvSpPr>
           <p:cNvPr id="4" name="מלבן 7">
-            <a:hlinkClick r:id="rId2" action="ppaction://hlinksldjump"/>
+            <a:hlinkClick r:id="rId1" action="ppaction://hlinksldjump"/>
           </p:cNvPr>
           <p:cNvSpPr/>
           <p:nvPr/>
@@ -6033,13 +6051,13 @@
   <p:clrMapOvr>
     <a:masterClrMapping/>
   </p:clrMapOvr>
-  <mc:AlternateContent xmlns:mc="http://schemas.openxmlformats.org/markup-compatibility/2006" xmlns:p14="http://schemas.microsoft.com/office/powerpoint/2010/main">
-    <mc:Choice Requires="p14">
+  <mc:AlternateContent xmlns:mc="http://schemas.openxmlformats.org/markup-compatibility/2006">
+    <mc:Choice xmlns:p14="http://schemas.microsoft.com/office/powerpoint/2010/main" Requires="p14">
       <p:transition spd="slow" p14:dur="1300">
         <p14:pan dir="u"/>
       </p:transition>
     </mc:Choice>
-    <mc:Fallback xmlns="">
+    <mc:Fallback>
       <p:transition spd="slow">
         <p:fade/>
       </p:transition>
@@ -6186,7 +6204,7 @@
       <p:sp>
         <p:nvSpPr>
           <p:cNvPr id="6" name="מלבן 6">
-            <a:hlinkClick r:id="rId2" action="ppaction://hlinksldjump"/>
+            <a:hlinkClick r:id="rId1" action="ppaction://hlinksldjump"/>
           </p:cNvPr>
           <p:cNvSpPr/>
           <p:nvPr/>
@@ -6338,7 +6356,7 @@
       <p:sp>
         <p:nvSpPr>
           <p:cNvPr id="9" name="מלבן 6">
-            <a:hlinkClick r:id="rId2" action="ppaction://hlinksldjump"/>
+            <a:hlinkClick r:id="rId1" action="ppaction://hlinksldjump"/>
           </p:cNvPr>
           <p:cNvSpPr/>
           <p:nvPr/>
@@ -6404,13 +6422,13 @@
   <p:clrMapOvr>
     <a:masterClrMapping/>
   </p:clrMapOvr>
-  <mc:AlternateContent xmlns:mc="http://schemas.openxmlformats.org/markup-compatibility/2006" xmlns:p14="http://schemas.microsoft.com/office/powerpoint/2010/main">
-    <mc:Choice Requires="p14">
+  <mc:AlternateContent xmlns:mc="http://schemas.openxmlformats.org/markup-compatibility/2006">
+    <mc:Choice xmlns:p14="http://schemas.microsoft.com/office/powerpoint/2010/main" Requires="p14">
       <p:transition spd="slow" p14:dur="1300">
         <p14:pan dir="u"/>
       </p:transition>
     </mc:Choice>
-    <mc:Fallback xmlns="">
+    <mc:Fallback>
       <p:transition spd="slow">
         <p:fade/>
       </p:transition>
@@ -6493,6 +6511,7 @@
               <a:rPr lang="en-US" dirty="0" smtClean="0"/>
               <a:t>ABC.</a:t>
             </a:r>
+            <a:endParaRPr lang="en-US" dirty="0" smtClean="0"/>
           </a:p>
           <a:p>
             <a:pPr algn="l" rtl="0"/>
@@ -6507,6 +6526,7 @@
               <a:rPr lang="en-US" dirty="0" smtClean="0"/>
               <a:t>DEF.</a:t>
             </a:r>
+            <a:endParaRPr lang="en-US" dirty="0" smtClean="0"/>
           </a:p>
           <a:p>
             <a:pPr algn="l" rtl="0"/>
@@ -6521,7 +6541,7 @@
       <p:sp>
         <p:nvSpPr>
           <p:cNvPr id="4" name="מלבן 6">
-            <a:hlinkClick r:id="rId2" action="ppaction://hlinksldjump"/>
+            <a:hlinkClick r:id="rId1" action="ppaction://hlinksldjump"/>
           </p:cNvPr>
           <p:cNvSpPr/>
           <p:nvPr/>
@@ -6587,13 +6607,13 @@
   <p:clrMapOvr>
     <a:masterClrMapping/>
   </p:clrMapOvr>
-  <mc:AlternateContent xmlns:mc="http://schemas.openxmlformats.org/markup-compatibility/2006" xmlns:p14="http://schemas.microsoft.com/office/powerpoint/2010/main">
-    <mc:Choice Requires="p14">
+  <mc:AlternateContent xmlns:mc="http://schemas.openxmlformats.org/markup-compatibility/2006">
+    <mc:Choice xmlns:p14="http://schemas.microsoft.com/office/powerpoint/2010/main" Requires="p14">
       <p:transition spd="slow" p14:dur="1300">
         <p14:pan dir="u"/>
       </p:transition>
     </mc:Choice>
-    <mc:Fallback xmlns="">
+    <mc:Fallback>
       <p:transition spd="slow">
         <p:fade/>
       </p:transition>
@@ -6679,6 +6699,7 @@
               <a:rPr lang="en-US" dirty="0" smtClean="0"/>
               <a:t>Open ticket</a:t>
             </a:r>
+            <a:endParaRPr lang="en-US" dirty="0" smtClean="0"/>
           </a:p>
           <a:p>
             <a:pPr marL="457200" indent="-457200" algn="l" rtl="0">
@@ -6689,6 +6710,7 @@
               <a:rPr lang="en-US" dirty="0" smtClean="0"/>
               <a:t>View / update ticket</a:t>
             </a:r>
+            <a:endParaRPr lang="en-US" dirty="0" smtClean="0"/>
           </a:p>
           <a:p>
             <a:pPr marL="457200" indent="-457200" algn="l" rtl="0">
@@ -6697,12 +6719,9 @@
             </a:pPr>
             <a:r>
               <a:rPr lang="en-US" dirty="0" smtClean="0"/>
-              <a:t>Browse </a:t>
-            </a:r>
-            <a:r>
-              <a:rPr lang="en-US" dirty="0" smtClean="0"/>
-              <a:t>tickets</a:t>
-            </a:r>
+              <a:t>Browse tickets</a:t>
+            </a:r>
+            <a:endParaRPr lang="en-US" dirty="0" smtClean="0"/>
           </a:p>
           <a:p>
             <a:pPr marL="457200" indent="-457200" algn="l" rtl="0">
@@ -6731,7 +6750,7 @@
       <p:sp>
         <p:nvSpPr>
           <p:cNvPr id="4" name="Right Arrow 3">
-            <a:hlinkClick r:id="rId2" action="ppaction://hlinksldjump"/>
+            <a:hlinkClick r:id="rId1" action="ppaction://hlinksldjump"/>
           </p:cNvPr>
           <p:cNvSpPr/>
           <p:nvPr/>
@@ -6786,7 +6805,7 @@
       <p:sp>
         <p:nvSpPr>
           <p:cNvPr id="5" name="Right Arrow 4">
-            <a:hlinkClick r:id="rId3" action="ppaction://hlinksldjump"/>
+            <a:hlinkClick r:id="rId2" action="ppaction://hlinksldjump"/>
           </p:cNvPr>
           <p:cNvSpPr/>
           <p:nvPr/>
@@ -6841,7 +6860,7 @@
       <p:sp>
         <p:nvSpPr>
           <p:cNvPr id="6" name="Right Arrow 5">
-            <a:hlinkClick r:id="rId4" action="ppaction://hlinksldjump"/>
+            <a:hlinkClick r:id="rId3" action="ppaction://hlinksldjump"/>
           </p:cNvPr>
           <p:cNvSpPr/>
           <p:nvPr/>
@@ -6896,7 +6915,7 @@
       <p:sp>
         <p:nvSpPr>
           <p:cNvPr id="7" name="Right Arrow 6">
-            <a:hlinkClick r:id="rId5" action="ppaction://hlinksldjump"/>
+            <a:hlinkClick r:id="rId4" action="ppaction://hlinksldjump"/>
           </p:cNvPr>
           <p:cNvSpPr/>
           <p:nvPr/>
@@ -6951,7 +6970,7 @@
       <p:sp>
         <p:nvSpPr>
           <p:cNvPr id="8" name="Right Arrow 7">
-            <a:hlinkClick r:id="rId6" action="ppaction://hlinksldjump"/>
+            <a:hlinkClick r:id="rId5" action="ppaction://hlinksldjump"/>
           </p:cNvPr>
           <p:cNvSpPr/>
           <p:nvPr/>
@@ -7008,13 +7027,13 @@
   <p:clrMapOvr>
     <a:masterClrMapping/>
   </p:clrMapOvr>
-  <mc:AlternateContent xmlns:mc="http://schemas.openxmlformats.org/markup-compatibility/2006" xmlns:p14="http://schemas.microsoft.com/office/powerpoint/2010/main">
-    <mc:Choice Requires="p14">
+  <mc:AlternateContent xmlns:mc="http://schemas.openxmlformats.org/markup-compatibility/2006">
+    <mc:Choice xmlns:p14="http://schemas.microsoft.com/office/powerpoint/2010/main" Requires="p14">
       <p:transition spd="slow" p14:dur="1300">
         <p14:pan dir="u"/>
       </p:transition>
     </mc:Choice>
-    <mc:Fallback xmlns="">
+    <mc:Fallback>
       <p:transition spd="slow">
         <p:fade/>
       </p:transition>
@@ -7161,7 +7180,7 @@
       <p:sp>
         <p:nvSpPr>
           <p:cNvPr id="6" name="מלבן 5">
-            <a:hlinkClick r:id="rId2" action="ppaction://hlinksldjump"/>
+            <a:hlinkClick r:id="rId1" action="ppaction://hlinksldjump"/>
           </p:cNvPr>
           <p:cNvSpPr/>
           <p:nvPr/>
@@ -7417,6 +7436,7 @@
               <a:rPr lang="en-US" dirty="0" smtClean="0"/>
               <a:t>Will attempt to find a registered user with this email.</a:t>
             </a:r>
+            <a:endParaRPr lang="en-US" dirty="0" smtClean="0"/>
           </a:p>
           <a:p>
             <a:pPr algn="ctr"/>
@@ -7424,6 +7444,7 @@
               <a:rPr lang="en-US" dirty="0" smtClean="0"/>
               <a:t>If found, will link them and the ticket.</a:t>
             </a:r>
+            <a:endParaRPr lang="en-US" dirty="0" smtClean="0"/>
           </a:p>
           <a:p>
             <a:pPr algn="ctr"/>
@@ -7438,7 +7459,7 @@
       <p:sp>
         <p:nvSpPr>
           <p:cNvPr id="12" name="מלבן 6">
-            <a:hlinkClick r:id="rId3" action="ppaction://hlinksldjump"/>
+            <a:hlinkClick r:id="rId2" action="ppaction://hlinksldjump"/>
           </p:cNvPr>
           <p:cNvSpPr/>
           <p:nvPr/>
@@ -7504,13 +7525,13 @@
   <p:clrMapOvr>
     <a:masterClrMapping/>
   </p:clrMapOvr>
-  <mc:AlternateContent xmlns:mc="http://schemas.openxmlformats.org/markup-compatibility/2006" xmlns:p14="http://schemas.microsoft.com/office/powerpoint/2010/main">
-    <mc:Choice Requires="p14">
+  <mc:AlternateContent xmlns:mc="http://schemas.openxmlformats.org/markup-compatibility/2006">
+    <mc:Choice xmlns:p14="http://schemas.microsoft.com/office/powerpoint/2010/main" Requires="p14">
       <p:transition spd="slow" p14:dur="1300">
         <p14:pan dir="u"/>
       </p:transition>
     </mc:Choice>
-    <mc:Fallback xmlns="">
+    <mc:Fallback>
       <p:transition spd="slow">
         <p:fade/>
       </p:transition>
@@ -7586,30 +7607,14 @@
             </a:pPr>
             <a:r>
               <a:rPr lang="en-US" dirty="0" smtClean="0"/>
-              <a:t>The</a:t>
-            </a:r>
-            <a:r>
-              <a:rPr lang="en-US" dirty="0" smtClean="0"/>
-              <a:t> </a:t>
-            </a:r>
-            <a:r>
-              <a:rPr lang="en-US" dirty="0" smtClean="0"/>
-              <a:t>ticket was saved in the system.</a:t>
+              <a:t>The ticket was saved in the system.</a:t>
             </a:r>
             <a:br>
               <a:rPr lang="en-US" dirty="0" smtClean="0"/>
             </a:br>
             <a:r>
               <a:rPr lang="en-US" dirty="0" smtClean="0"/>
-              <a:t>The</a:t>
-            </a:r>
-            <a:r>
-              <a:rPr lang="en-US" dirty="0" smtClean="0"/>
-              <a:t> </a:t>
-            </a:r>
-            <a:r>
-              <a:rPr lang="en-US" dirty="0" smtClean="0"/>
-              <a:t>ticket ID is:</a:t>
+              <a:t>The ticket ID is:</a:t>
             </a:r>
             <a:br>
               <a:rPr lang="en-US" dirty="0" smtClean="0"/>
@@ -7632,7 +7637,7 @@
       <p:sp>
         <p:nvSpPr>
           <p:cNvPr id="4" name="מלבן 6">
-            <a:hlinkClick r:id="rId2" action="ppaction://hlinksldjump"/>
+            <a:hlinkClick r:id="rId1" action="ppaction://hlinksldjump"/>
           </p:cNvPr>
           <p:cNvSpPr/>
           <p:nvPr/>
@@ -7698,13 +7703,13 @@
   <p:clrMapOvr>
     <a:masterClrMapping/>
   </p:clrMapOvr>
-  <mc:AlternateContent xmlns:mc="http://schemas.openxmlformats.org/markup-compatibility/2006" xmlns:p14="http://schemas.microsoft.com/office/powerpoint/2010/main">
-    <mc:Choice Requires="p14">
+  <mc:AlternateContent xmlns:mc="http://schemas.openxmlformats.org/markup-compatibility/2006">
+    <mc:Choice xmlns:p14="http://schemas.microsoft.com/office/powerpoint/2010/main" Requires="p14">
       <p:transition spd="slow" p14:dur="1300">
         <p14:pan dir="u"/>
       </p:transition>
     </mc:Choice>
-    <mc:Fallback xmlns="">
+    <mc:Fallback>
       <p:transition spd="slow">
         <p:fade/>
       </p:transition>
@@ -7833,7 +7838,7 @@
       <p:sp>
         <p:nvSpPr>
           <p:cNvPr id="5" name="מלבן 6">
-            <a:hlinkClick r:id="rId2" action="ppaction://hlinksldjump"/>
+            <a:hlinkClick r:id="rId1" action="ppaction://hlinksldjump"/>
           </p:cNvPr>
           <p:cNvSpPr/>
           <p:nvPr/>
@@ -7899,13 +7904,13 @@
   <p:clrMapOvr>
     <a:masterClrMapping/>
   </p:clrMapOvr>
-  <mc:AlternateContent xmlns:mc="http://schemas.openxmlformats.org/markup-compatibility/2006" xmlns:p14="http://schemas.microsoft.com/office/powerpoint/2010/main">
-    <mc:Choice Requires="p14">
+  <mc:AlternateContent xmlns:mc="http://schemas.openxmlformats.org/markup-compatibility/2006">
+    <mc:Choice xmlns:p14="http://schemas.microsoft.com/office/powerpoint/2010/main" Requires="p14">
       <p:transition spd="slow" p14:dur="1300">
         <p14:pan dir="u"/>
       </p:transition>
     </mc:Choice>
-    <mc:Fallback xmlns="">
+    <mc:Fallback>
       <p:transition spd="slow">
         <p:fade/>
       </p:transition>
@@ -7983,6 +7988,7 @@
               <a:rPr lang="en-US" dirty="0" smtClean="0"/>
               <a:t>Ticket ID: XXXX</a:t>
             </a:r>
+            <a:endParaRPr lang="en-US" dirty="0" smtClean="0"/>
           </a:p>
           <a:p>
             <a:pPr marL="0" indent="0" algn="l" rtl="0">
@@ -7992,6 +7998,7 @@
               <a:rPr lang="en-US" dirty="0" smtClean="0"/>
               <a:t>Description: ____</a:t>
             </a:r>
+            <a:endParaRPr lang="en-US" dirty="0" smtClean="0"/>
           </a:p>
           <a:p>
             <a:pPr marL="0" indent="0" algn="l" rtl="0">
@@ -8140,7 +8147,7 @@
       <p:sp>
         <p:nvSpPr>
           <p:cNvPr id="7" name="מלבן 6">
-            <a:hlinkClick r:id="rId2" action="ppaction://hlinksldjump"/>
+            <a:hlinkClick r:id="rId1" action="ppaction://hlinksldjump"/>
           </p:cNvPr>
           <p:cNvSpPr/>
           <p:nvPr/>
@@ -8204,7 +8211,7 @@
       <p:sp>
         <p:nvSpPr>
           <p:cNvPr id="8" name="מלבן 6">
-            <a:hlinkClick r:id="rId2" action="ppaction://hlinksldjump"/>
+            <a:hlinkClick r:id="rId1" action="ppaction://hlinksldjump"/>
           </p:cNvPr>
           <p:cNvSpPr/>
           <p:nvPr/>
@@ -8555,6 +8562,7 @@
               <a:rPr lang="en-US" dirty="0" smtClean="0"/>
               <a:t>Notes: ____</a:t>
             </a:r>
+            <a:endParaRPr lang="en-US" dirty="0" smtClean="0"/>
           </a:p>
           <a:p>
             <a:r>
@@ -8591,18 +8599,21 @@
               <a:rPr lang="en-US" dirty="0" smtClean="0"/>
               <a:t>Ticket creator:</a:t>
             </a:r>
+            <a:endParaRPr lang="en-US" dirty="0" smtClean="0"/>
           </a:p>
           <a:p>
             <a:r>
               <a:rPr lang="en-US" dirty="0" smtClean="0"/>
               <a:t>Name:</a:t>
             </a:r>
+            <a:endParaRPr lang="en-US" dirty="0" smtClean="0"/>
           </a:p>
           <a:p>
             <a:r>
               <a:rPr lang="en-US" dirty="0" smtClean="0"/>
               <a:t>E-Mail:</a:t>
             </a:r>
+            <a:endParaRPr lang="en-US" dirty="0" smtClean="0"/>
           </a:p>
           <a:p>
             <a:r>
@@ -8618,13 +8629,13 @@
   <p:clrMapOvr>
     <a:masterClrMapping/>
   </p:clrMapOvr>
-  <mc:AlternateContent xmlns:mc="http://schemas.openxmlformats.org/markup-compatibility/2006" xmlns:p14="http://schemas.microsoft.com/office/powerpoint/2010/main">
-    <mc:Choice Requires="p14">
+  <mc:AlternateContent xmlns:mc="http://schemas.openxmlformats.org/markup-compatibility/2006">
+    <mc:Choice xmlns:p14="http://schemas.microsoft.com/office/powerpoint/2010/main" Requires="p14">
       <p:transition spd="slow" p14:dur="1300">
         <p14:pan dir="u"/>
       </p:transition>
     </mc:Choice>
-    <mc:Fallback xmlns="">
+    <mc:Fallback>
       <p:transition spd="slow">
         <p:fade/>
       </p:transition>
@@ -8714,6 +8725,7 @@
               <a:rPr lang="en-US" dirty="0" smtClean="0"/>
               <a:t>– ID</a:t>
             </a:r>
+            <a:endParaRPr lang="en-US" dirty="0" smtClean="0"/>
           </a:p>
           <a:p>
             <a:pPr marL="285750" indent="-285750">
@@ -8724,6 +8736,7 @@
               <a:rPr lang="en-US" dirty="0"/>
               <a:t>Title - ID</a:t>
             </a:r>
+            <a:endParaRPr lang="en-US" dirty="0"/>
           </a:p>
           <a:p>
             <a:pPr marL="285750" indent="-285750">
@@ -8738,6 +8751,7 @@
               <a:rPr lang="en-US" dirty="0" smtClean="0"/>
               <a:t>ID</a:t>
             </a:r>
+            <a:endParaRPr lang="en-US" dirty="0" smtClean="0"/>
           </a:p>
           <a:p>
             <a:pPr marL="285750" indent="-285750">
@@ -8748,6 +8762,7 @@
               <a:rPr lang="en-US" dirty="0"/>
               <a:t>Title - ID</a:t>
             </a:r>
+            <a:endParaRPr lang="en-US" dirty="0"/>
           </a:p>
           <a:p>
             <a:pPr marL="285750" indent="-285750">
@@ -8758,6 +8773,7 @@
               <a:rPr lang="en-US" dirty="0"/>
               <a:t>Title - ID</a:t>
             </a:r>
+            <a:endParaRPr lang="en-US" dirty="0"/>
           </a:p>
           <a:p>
             <a:pPr marL="285750" indent="-285750">
@@ -8768,6 +8784,7 @@
               <a:rPr lang="en-US" dirty="0"/>
               <a:t>Title - ID</a:t>
             </a:r>
+            <a:endParaRPr lang="en-US" dirty="0"/>
           </a:p>
           <a:p>
             <a:pPr marL="285750" indent="-285750">
@@ -8778,6 +8795,7 @@
               <a:rPr lang="en-US" dirty="0"/>
               <a:t>Title - ID</a:t>
             </a:r>
+            <a:endParaRPr lang="en-US" dirty="0"/>
           </a:p>
           <a:p>
             <a:pPr marL="285750" indent="-285750">
@@ -8792,6 +8810,7 @@
               <a:rPr lang="en-US" dirty="0" smtClean="0"/>
               <a:t>– ID</a:t>
             </a:r>
+            <a:endParaRPr lang="en-US" dirty="0" smtClean="0"/>
           </a:p>
           <a:p>
             <a:pPr marL="285750" indent="-285750">
@@ -8809,7 +8828,7 @@
       <p:sp>
         <p:nvSpPr>
           <p:cNvPr id="5" name="מלבן 6">
-            <a:hlinkClick r:id="rId2" action="ppaction://hlinksldjump"/>
+            <a:hlinkClick r:id="rId1" action="ppaction://hlinksldjump"/>
           </p:cNvPr>
           <p:cNvSpPr/>
           <p:nvPr/>
@@ -9194,18 +9213,47 @@
           </a:p>
         </p:txBody>
       </p:sp>
+      <p:sp>
+        <p:nvSpPr>
+          <p:cNvPr id="3" name="Text Box 2"/>
+          <p:cNvSpPr txBox="1"/>
+          <p:nvPr/>
+        </p:nvSpPr>
+        <p:spPr>
+          <a:xfrm>
+            <a:off x="296545" y="5443220"/>
+            <a:ext cx="4189095" cy="427990"/>
+          </a:xfrm>
+          <a:prstGeom prst="rect">
+            <a:avLst/>
+          </a:prstGeom>
+          <a:noFill/>
+        </p:spPr>
+        <p:txBody>
+          <a:bodyPr wrap="none" rtlCol="0">
+            <a:spAutoFit/>
+          </a:bodyPr>
+          <a:p>
+            <a:r>
+              <a:rPr lang="en-US" altLang="en-US"/>
+              <a:t>Tickets that answer the criteria: X</a:t>
+            </a:r>
+            <a:endParaRPr lang="en-US" altLang="en-US"/>
+          </a:p>
+        </p:txBody>
+      </p:sp>
     </p:spTree>
   </p:cSld>
   <p:clrMapOvr>
     <a:masterClrMapping/>
   </p:clrMapOvr>
-  <mc:AlternateContent xmlns:mc="http://schemas.openxmlformats.org/markup-compatibility/2006" xmlns:p14="http://schemas.microsoft.com/office/powerpoint/2010/main">
-    <mc:Choice Requires="p14">
+  <mc:AlternateContent xmlns:mc="http://schemas.openxmlformats.org/markup-compatibility/2006">
+    <mc:Choice xmlns:p14="http://schemas.microsoft.com/office/powerpoint/2010/main" Requires="p14">
       <p:transition spd="slow" p14:dur="1300">
         <p14:pan dir="u"/>
       </p:transition>
     </mc:Choice>
-    <mc:Fallback xmlns="">
+    <mc:Fallback>
       <p:transition spd="slow">
         <p:fade/>
       </p:transition>
@@ -9352,7 +9400,7 @@
       <p:sp>
         <p:nvSpPr>
           <p:cNvPr id="6" name="מלבן 5">
-            <a:hlinkClick r:id="rId2" action="ppaction://hlinksldjump"/>
+            <a:hlinkClick r:id="rId1" action="ppaction://hlinksldjump"/>
           </p:cNvPr>
           <p:cNvSpPr/>
           <p:nvPr/>
@@ -9416,7 +9464,7 @@
       <p:sp>
         <p:nvSpPr>
           <p:cNvPr id="7" name="מלבן 6">
-            <a:hlinkClick r:id="rId2" action="ppaction://hlinksldjump"/>
+            <a:hlinkClick r:id="rId1" action="ppaction://hlinksldjump"/>
           </p:cNvPr>
           <p:cNvSpPr/>
           <p:nvPr/>
@@ -9570,13 +9618,13 @@
   <p:clrMapOvr>
     <a:masterClrMapping/>
   </p:clrMapOvr>
-  <mc:AlternateContent xmlns:mc="http://schemas.openxmlformats.org/markup-compatibility/2006" xmlns:p14="http://schemas.microsoft.com/office/powerpoint/2010/main">
-    <mc:Choice Requires="p14">
+  <mc:AlternateContent xmlns:mc="http://schemas.openxmlformats.org/markup-compatibility/2006">
+    <mc:Choice xmlns:p14="http://schemas.microsoft.com/office/powerpoint/2010/main" Requires="p14">
       <p:transition spd="slow" p14:dur="1300">
         <p14:pan dir="u"/>
       </p:transition>
     </mc:Choice>
-    <mc:Fallback xmlns="">
+    <mc:Fallback>
       <p:transition spd="slow">
         <p:fade/>
       </p:transition>
@@ -9747,7 +9795,7 @@
       <p:sp>
         <p:nvSpPr>
           <p:cNvPr id="8" name="מלבן 7">
-            <a:hlinkClick r:id="rId2" action="ppaction://hlinksldjump"/>
+            <a:hlinkClick r:id="rId1" action="ppaction://hlinksldjump"/>
           </p:cNvPr>
           <p:cNvSpPr/>
           <p:nvPr/>
@@ -9838,6 +9886,7 @@
               <a:rPr lang="en-US" dirty="0" smtClean="0"/>
               <a:t>?</a:t>
             </a:r>
+            <a:endParaRPr lang="en-US" dirty="0" smtClean="0"/>
           </a:p>
           <a:p>
             <a:pPr algn="r"/>
@@ -9854,13 +9903,13 @@
   <p:clrMapOvr>
     <a:masterClrMapping/>
   </p:clrMapOvr>
-  <mc:AlternateContent xmlns:mc="http://schemas.openxmlformats.org/markup-compatibility/2006" xmlns:p14="http://schemas.microsoft.com/office/powerpoint/2010/main">
-    <mc:Choice Requires="p14">
+  <mc:AlternateContent xmlns:mc="http://schemas.openxmlformats.org/markup-compatibility/2006">
+    <mc:Choice xmlns:p14="http://schemas.microsoft.com/office/powerpoint/2010/main" Requires="p14">
       <p:transition spd="slow" p14:dur="1300">
         <p14:pan dir="u"/>
       </p:transition>
     </mc:Choice>
-    <mc:Fallback xmlns="">
+    <mc:Fallback>
       <p:transition spd="slow">
         <p:fade/>
       </p:transition>
@@ -9921,7 +9970,7 @@
       <p:sp>
         <p:nvSpPr>
           <p:cNvPr id="4" name="מלבן 5">
-            <a:hlinkClick r:id="rId2" action="ppaction://hlinksldjump"/>
+            <a:hlinkClick r:id="rId1" action="ppaction://hlinksldjump"/>
           </p:cNvPr>
           <p:cNvSpPr/>
           <p:nvPr/>
@@ -9974,6 +10023,11 @@
               </a:rPr>
               <a:t>NO</a:t>
             </a:r>
+            <a:endParaRPr lang="en-US" b="1" dirty="0" smtClean="0">
+              <a:solidFill>
+                <a:schemeClr val="bg1"/>
+              </a:solidFill>
+            </a:endParaRPr>
           </a:p>
           <a:p>
             <a:pPr algn="ctr"/>
@@ -9996,7 +10050,7 @@
       <p:sp>
         <p:nvSpPr>
           <p:cNvPr id="5" name="מלבן 6">
-            <a:hlinkClick r:id="rId3" action="ppaction://hlinksldjump"/>
+            <a:hlinkClick r:id="rId2" action="ppaction://hlinksldjump"/>
           </p:cNvPr>
           <p:cNvSpPr/>
           <p:nvPr/>
@@ -10049,6 +10103,11 @@
               </a:rPr>
               <a:t>YES</a:t>
             </a:r>
+            <a:endParaRPr lang="en-US" b="1" dirty="0" smtClean="0">
+              <a:solidFill>
+                <a:schemeClr val="bg1"/>
+              </a:solidFill>
+            </a:endParaRPr>
           </a:p>
           <a:p>
             <a:pPr algn="ctr"/>
@@ -10095,6 +10154,7 @@
               <a:rPr lang="en-US" dirty="0" smtClean="0"/>
               <a:t>This page is not part of the program.</a:t>
             </a:r>
+            <a:endParaRPr lang="en-US" dirty="0" smtClean="0"/>
           </a:p>
           <a:p>
             <a:pPr algn="ctr"/>
@@ -10111,13 +10171,13 @@
   <p:clrMapOvr>
     <a:masterClrMapping/>
   </p:clrMapOvr>
-  <mc:AlternateContent xmlns:mc="http://schemas.openxmlformats.org/markup-compatibility/2006" xmlns:p14="http://schemas.microsoft.com/office/powerpoint/2010/main">
-    <mc:Choice Requires="p14">
+  <mc:AlternateContent xmlns:mc="http://schemas.openxmlformats.org/markup-compatibility/2006">
+    <mc:Choice xmlns:p14="http://schemas.microsoft.com/office/powerpoint/2010/main" Requires="p14">
       <p:transition spd="slow" p14:dur="1300">
         <p14:pan dir="u"/>
       </p:transition>
     </mc:Choice>
-    <mc:Fallback xmlns="">
+    <mc:Fallback>
       <p:transition spd="slow">
         <p:fade/>
       </p:transition>
@@ -10216,16 +10276,13 @@
             </a:r>
             <a:r>
               <a:rPr lang="en-US" dirty="0" smtClean="0"/>
-              <a:t>support call</a:t>
-            </a:r>
-            <a:r>
-              <a:rPr lang="en-US" dirty="0" smtClean="0"/>
-              <a:t> </a:t>
+              <a:t>support call </a:t>
             </a:r>
             <a:r>
               <a:rPr lang="en-US" dirty="0"/>
               <a:t>status</a:t>
             </a:r>
+            <a:endParaRPr lang="en-US" dirty="0"/>
           </a:p>
           <a:p>
             <a:pPr marL="457200" indent="-457200" algn="l" rtl="0">
@@ -10251,6 +10308,7 @@
               <a:rPr lang="en-US" dirty="0"/>
               <a:t>Update contact information</a:t>
             </a:r>
+            <a:endParaRPr lang="en-US" dirty="0"/>
           </a:p>
           <a:p>
             <a:pPr marL="457200" indent="-457200" algn="l" rtl="0">
@@ -10261,6 +10319,7 @@
               <a:rPr lang="en-US" dirty="0"/>
               <a:t>FAQ / Q&amp;A</a:t>
             </a:r>
+            <a:endParaRPr lang="en-US" dirty="0"/>
           </a:p>
           <a:p>
             <a:pPr marL="457200" indent="-457200" algn="l" rtl="0">
@@ -10278,7 +10337,7 @@
       <p:sp>
         <p:nvSpPr>
           <p:cNvPr id="5" name="Right Arrow 4">
-            <a:hlinkClick r:id="rId2" action="ppaction://hlinksldjump"/>
+            <a:hlinkClick r:id="rId1" action="ppaction://hlinksldjump"/>
           </p:cNvPr>
           <p:cNvSpPr/>
           <p:nvPr/>
@@ -10333,7 +10392,7 @@
       <p:sp>
         <p:nvSpPr>
           <p:cNvPr id="6" name="Right Arrow 5">
-            <a:hlinkClick r:id="rId3" action="ppaction://hlinksldjump"/>
+            <a:hlinkClick r:id="rId2" action="ppaction://hlinksldjump"/>
           </p:cNvPr>
           <p:cNvSpPr/>
           <p:nvPr/>
@@ -10388,7 +10447,7 @@
       <p:sp>
         <p:nvSpPr>
           <p:cNvPr id="7" name="Right Arrow 6">
-            <a:hlinkClick r:id="rId4" action="ppaction://hlinksldjump"/>
+            <a:hlinkClick r:id="rId3" action="ppaction://hlinksldjump"/>
           </p:cNvPr>
           <p:cNvSpPr/>
           <p:nvPr/>
@@ -10443,7 +10502,7 @@
       <p:sp>
         <p:nvSpPr>
           <p:cNvPr id="8" name="Right Arrow 7">
-            <a:hlinkClick r:id="rId5" action="ppaction://hlinksldjump"/>
+            <a:hlinkClick r:id="rId4" action="ppaction://hlinksldjump"/>
           </p:cNvPr>
           <p:cNvSpPr/>
           <p:nvPr/>
@@ -10498,7 +10557,7 @@
       <p:sp>
         <p:nvSpPr>
           <p:cNvPr id="9" name="Right Arrow 8">
-            <a:hlinkClick r:id="rId6" action="ppaction://hlinksldjump"/>
+            <a:hlinkClick r:id="rId5" action="ppaction://hlinksldjump"/>
           </p:cNvPr>
           <p:cNvSpPr/>
           <p:nvPr/>
@@ -10553,7 +10612,7 @@
       <p:sp>
         <p:nvSpPr>
           <p:cNvPr id="10" name="Right Arrow 9">
-            <a:hlinkClick r:id="rId7" action="ppaction://hlinksldjump"/>
+            <a:hlinkClick r:id="rId6" action="ppaction://hlinksldjump"/>
           </p:cNvPr>
           <p:cNvSpPr/>
           <p:nvPr/>
@@ -10610,13 +10669,13 @@
   <p:clrMapOvr>
     <a:masterClrMapping/>
   </p:clrMapOvr>
-  <mc:AlternateContent xmlns:mc="http://schemas.openxmlformats.org/markup-compatibility/2006" xmlns:p14="http://schemas.microsoft.com/office/powerpoint/2010/main">
-    <mc:Choice Requires="p14">
+  <mc:AlternateContent xmlns:mc="http://schemas.openxmlformats.org/markup-compatibility/2006">
+    <mc:Choice xmlns:p14="http://schemas.microsoft.com/office/powerpoint/2010/main" Requires="p14">
       <p:transition spd="slow" p14:dur="1300">
         <p14:pan dir="u"/>
       </p:transition>
     </mc:Choice>
-    <mc:Fallback xmlns="">
+    <mc:Fallback>
       <p:transition spd="slow">
         <p:fade/>
       </p:transition>
@@ -10763,7 +10822,7 @@
       <p:sp>
         <p:nvSpPr>
           <p:cNvPr id="6" name="מלבן 5">
-            <a:hlinkClick r:id="rId2" action="ppaction://hlinksldjump"/>
+            <a:hlinkClick r:id="rId1" action="ppaction://hlinksldjump"/>
           </p:cNvPr>
           <p:cNvSpPr/>
           <p:nvPr/>
@@ -10873,13 +10932,13 @@
   <p:clrMapOvr>
     <a:masterClrMapping/>
   </p:clrMapOvr>
-  <mc:AlternateContent xmlns:mc="http://schemas.openxmlformats.org/markup-compatibility/2006" xmlns:p14="http://schemas.microsoft.com/office/powerpoint/2010/main">
-    <mc:Choice Requires="p14">
+  <mc:AlternateContent xmlns:mc="http://schemas.openxmlformats.org/markup-compatibility/2006">
+    <mc:Choice xmlns:p14="http://schemas.microsoft.com/office/powerpoint/2010/main" Requires="p14">
       <p:transition spd="slow" p14:dur="1300">
         <p14:pan dir="u"/>
       </p:transition>
     </mc:Choice>
-    <mc:Fallback xmlns="">
+    <mc:Fallback>
       <p:transition spd="slow">
         <p:fade/>
       </p:transition>
@@ -10929,49 +10988,33 @@
           <a:p>
             <a:r>
               <a:rPr lang="en-US" dirty="0" smtClean="0"/>
-              <a:t>Support call</a:t>
-            </a:r>
+              <a:t>Support call saved</a:t>
+            </a:r>
+            <a:endParaRPr lang="en-US" dirty="0"/>
+          </a:p>
+        </p:txBody>
+      </p:sp>
+      <p:sp>
+        <p:nvSpPr>
+          <p:cNvPr id="3" name="Content Placeholder 2"/>
+          <p:cNvSpPr>
+            <a:spLocks noGrp="1"/>
+          </p:cNvSpPr>
+          <p:nvPr>
+            <p:ph idx="1"/>
+          </p:nvPr>
+        </p:nvSpPr>
+        <p:spPr/>
+        <p:txBody>
+          <a:bodyPr/>
+          <a:lstStyle/>
+          <a:p>
+            <a:pPr marL="0" indent="0" algn="ctr" rtl="0">
+              <a:buNone/>
+            </a:pPr>
             <a:r>
               <a:rPr lang="en-US" dirty="0" smtClean="0"/>
-              <a:t> </a:t>
-            </a:r>
-            <a:r>
-              <a:rPr lang="en-US" dirty="0" smtClean="0"/>
-              <a:t>saved</a:t>
-            </a:r>
-            <a:endParaRPr lang="en-US" dirty="0"/>
-          </a:p>
-        </p:txBody>
-      </p:sp>
-      <p:sp>
-        <p:nvSpPr>
-          <p:cNvPr id="3" name="Content Placeholder 2"/>
-          <p:cNvSpPr>
-            <a:spLocks noGrp="1"/>
-          </p:cNvSpPr>
-          <p:nvPr>
-            <p:ph idx="1"/>
-          </p:nvPr>
-        </p:nvSpPr>
-        <p:spPr/>
-        <p:txBody>
-          <a:bodyPr/>
-          <a:lstStyle/>
-          <a:p>
-            <a:pPr marL="0" indent="0" algn="ctr" rtl="0">
-              <a:buNone/>
-            </a:pPr>
-            <a:r>
-              <a:rPr lang="en-US" dirty="0" smtClean="0"/>
-              <a:t>Your </a:t>
-            </a:r>
-            <a:r>
-              <a:rPr lang="en-US" dirty="0" smtClean="0"/>
-              <a:t>support call was </a:t>
-            </a:r>
-            <a:r>
-              <a:rPr lang="en-US" dirty="0" smtClean="0"/>
-              <a:t>saved in the system.</a:t>
+              <a:t>Your support call was saved in the system.</a:t>
             </a:r>
             <a:br>
               <a:rPr lang="en-US" dirty="0" smtClean="0"/>
@@ -11001,7 +11044,7 @@
       <p:sp>
         <p:nvSpPr>
           <p:cNvPr id="4" name="מלבן 6">
-            <a:hlinkClick r:id="rId2" action="ppaction://hlinksldjump"/>
+            <a:hlinkClick r:id="rId1" action="ppaction://hlinksldjump"/>
           </p:cNvPr>
           <p:cNvSpPr/>
           <p:nvPr/>
@@ -11067,13 +11110,13 @@
   <p:clrMapOvr>
     <a:masterClrMapping/>
   </p:clrMapOvr>
-  <mc:AlternateContent xmlns:mc="http://schemas.openxmlformats.org/markup-compatibility/2006" xmlns:p14="http://schemas.microsoft.com/office/powerpoint/2010/main">
-    <mc:Choice Requires="p14">
+  <mc:AlternateContent xmlns:mc="http://schemas.openxmlformats.org/markup-compatibility/2006">
+    <mc:Choice xmlns:p14="http://schemas.microsoft.com/office/powerpoint/2010/main" Requires="p14">
       <p:transition spd="slow" p14:dur="1300">
         <p14:pan dir="u"/>
       </p:transition>
     </mc:Choice>
-    <mc:Fallback xmlns="">
+    <mc:Fallback>
       <p:transition spd="slow">
         <p:fade/>
       </p:transition>
@@ -11123,11 +11166,7 @@
           <a:p>
             <a:r>
               <a:rPr lang="en-US" dirty="0" smtClean="0"/>
-              <a:t>View a </a:t>
-            </a:r>
-            <a:r>
-              <a:rPr lang="en-US" dirty="0" smtClean="0"/>
-              <a:t>support call</a:t>
+              <a:t>View a support call</a:t>
             </a:r>
             <a:endParaRPr lang="en-US" dirty="0"/>
           </a:p>
@@ -11206,7 +11245,7 @@
       <p:sp>
         <p:nvSpPr>
           <p:cNvPr id="5" name="מלבן 6">
-            <a:hlinkClick r:id="rId2" action="ppaction://hlinksldjump"/>
+            <a:hlinkClick r:id="rId1" action="ppaction://hlinksldjump"/>
           </p:cNvPr>
           <p:cNvSpPr/>
           <p:nvPr/>
@@ -11272,13 +11311,13 @@
   <p:clrMapOvr>
     <a:masterClrMapping/>
   </p:clrMapOvr>
-  <mc:AlternateContent xmlns:mc="http://schemas.openxmlformats.org/markup-compatibility/2006" xmlns:p14="http://schemas.microsoft.com/office/powerpoint/2010/main">
-    <mc:Choice Requires="p14">
+  <mc:AlternateContent xmlns:mc="http://schemas.openxmlformats.org/markup-compatibility/2006">
+    <mc:Choice xmlns:p14="http://schemas.microsoft.com/office/powerpoint/2010/main" Requires="p14">
       <p:transition spd="slow" p14:dur="1300">
         <p14:pan dir="u"/>
       </p:transition>
     </mc:Choice>
-    <mc:Fallback xmlns="">
+    <mc:Fallback>
       <p:transition spd="slow">
         <p:fade/>
       </p:transition>
@@ -11328,11 +11367,7 @@
           <a:p>
             <a:r>
               <a:rPr lang="en-US" dirty="0" smtClean="0"/>
-              <a:t>View a </a:t>
-            </a:r>
-            <a:r>
-              <a:rPr lang="en-US" dirty="0" smtClean="0"/>
-              <a:t>support call</a:t>
+              <a:t>View a support call</a:t>
             </a:r>
             <a:endParaRPr lang="en-US" dirty="0"/>
           </a:p>
@@ -11362,6 +11397,7 @@
               <a:rPr lang="en-US" dirty="0" smtClean="0"/>
               <a:t>Ticket ID: XXXX</a:t>
             </a:r>
+            <a:endParaRPr lang="en-US" dirty="0" smtClean="0"/>
           </a:p>
           <a:p>
             <a:pPr marL="0" indent="0" algn="l" rtl="0">
@@ -11371,6 +11407,7 @@
               <a:rPr lang="en-US" dirty="0" smtClean="0"/>
               <a:t>Title:</a:t>
             </a:r>
+            <a:endParaRPr lang="en-US" dirty="0" smtClean="0"/>
           </a:p>
           <a:p>
             <a:pPr marL="0" indent="0" algn="l" rtl="0">
@@ -11380,6 +11417,7 @@
               <a:rPr lang="en-US" dirty="0" smtClean="0"/>
               <a:t>Date:</a:t>
             </a:r>
+            <a:endParaRPr lang="en-US" dirty="0" smtClean="0"/>
           </a:p>
           <a:p>
             <a:pPr marL="0" indent="0" algn="l" rtl="0">
@@ -11389,6 +11427,7 @@
               <a:rPr lang="en-US" dirty="0" smtClean="0"/>
               <a:t>Status:</a:t>
             </a:r>
+            <a:endParaRPr lang="en-US" dirty="0" smtClean="0"/>
           </a:p>
           <a:p>
             <a:pPr marL="0" indent="0" algn="l" rtl="0">
@@ -11398,6 +11437,7 @@
               <a:rPr lang="en-US" dirty="0" smtClean="0"/>
               <a:t>Tier:</a:t>
             </a:r>
+            <a:endParaRPr lang="en-US" dirty="0" smtClean="0"/>
           </a:p>
           <a:p>
             <a:pPr marL="0" indent="0" algn="l" rtl="0">
@@ -11407,6 +11447,7 @@
               <a:rPr lang="en-US" dirty="0" smtClean="0"/>
               <a:t>Type:</a:t>
             </a:r>
+            <a:endParaRPr lang="en-US" dirty="0" smtClean="0"/>
           </a:p>
           <a:p>
             <a:pPr marL="0" indent="0" algn="l" rtl="0">
@@ -11416,6 +11457,7 @@
               <a:rPr lang="en-US" dirty="0" smtClean="0"/>
               <a:t>Severity:</a:t>
             </a:r>
+            <a:endParaRPr lang="en-US" dirty="0" smtClean="0"/>
           </a:p>
           <a:p>
             <a:pPr marL="0" indent="0" algn="l" rtl="0">
@@ -11425,6 +11467,7 @@
               <a:rPr lang="en-US" dirty="0" smtClean="0"/>
               <a:t>Description:</a:t>
             </a:r>
+            <a:endParaRPr lang="en-US" dirty="0" smtClean="0"/>
           </a:p>
           <a:p>
             <a:pPr marL="0" indent="0" algn="l" rtl="0">
@@ -11441,7 +11484,7 @@
       <p:sp>
         <p:nvSpPr>
           <p:cNvPr id="4" name="מלבן 6">
-            <a:hlinkClick r:id="rId2" action="ppaction://hlinksldjump"/>
+            <a:hlinkClick r:id="rId1" action="ppaction://hlinksldjump"/>
           </p:cNvPr>
           <p:cNvSpPr/>
           <p:nvPr/>
@@ -11507,13 +11550,13 @@
   <p:clrMapOvr>
     <a:masterClrMapping/>
   </p:clrMapOvr>
-  <mc:AlternateContent xmlns:mc="http://schemas.openxmlformats.org/markup-compatibility/2006" xmlns:p14="http://schemas.microsoft.com/office/powerpoint/2010/main">
-    <mc:Choice Requires="p14">
+  <mc:AlternateContent xmlns:mc="http://schemas.openxmlformats.org/markup-compatibility/2006">
+    <mc:Choice xmlns:p14="http://schemas.microsoft.com/office/powerpoint/2010/main" Requires="p14">
       <p:transition spd="slow" p14:dur="1300">
         <p14:pan dir="u"/>
       </p:transition>
     </mc:Choice>
-    <mc:Fallback xmlns="">
+    <mc:Fallback>
       <p:transition spd="slow">
         <p:fade/>
       </p:transition>
@@ -11563,11 +11606,7 @@
           <a:p>
             <a:r>
               <a:rPr lang="en-US" dirty="0" smtClean="0"/>
-              <a:t>My </a:t>
-            </a:r>
-            <a:r>
-              <a:rPr lang="en-US" dirty="0" smtClean="0"/>
-              <a:t>support calls</a:t>
+              <a:t>My support calls</a:t>
             </a:r>
             <a:endParaRPr lang="en-US" dirty="0"/>
           </a:p>
@@ -11607,6 +11646,7 @@
               <a:rPr lang="en-US" dirty="0" smtClean="0"/>
               <a:t>)</a:t>
             </a:r>
+            <a:endParaRPr lang="en-US" dirty="0" smtClean="0"/>
           </a:p>
           <a:p>
             <a:pPr algn="l" rtl="0"/>
@@ -11614,6 +11654,7 @@
               <a:rPr lang="en-US" dirty="0"/>
               <a:t>(Ticket ID) – (Ticket Title)</a:t>
             </a:r>
+            <a:endParaRPr lang="en-US" dirty="0"/>
           </a:p>
           <a:p>
             <a:pPr algn="l" rtl="0"/>
@@ -11625,6 +11666,7 @@
               <a:rPr lang="en-US" dirty="0" smtClean="0"/>
               <a:t>)</a:t>
             </a:r>
+            <a:endParaRPr lang="en-US" dirty="0" smtClean="0"/>
           </a:p>
           <a:p>
             <a:pPr algn="l" rtl="0"/>
@@ -11632,6 +11674,7 @@
               <a:rPr lang="en-US" dirty="0"/>
               <a:t>(Ticket ID) – (Ticket Title)</a:t>
             </a:r>
+            <a:endParaRPr lang="en-US" dirty="0"/>
           </a:p>
           <a:p>
             <a:pPr algn="l" rtl="0"/>
@@ -11646,7 +11689,7 @@
       <p:sp>
         <p:nvSpPr>
           <p:cNvPr id="4" name="מלבן 6">
-            <a:hlinkClick r:id="rId2" action="ppaction://hlinksldjump"/>
+            <a:hlinkClick r:id="rId1" action="ppaction://hlinksldjump"/>
           </p:cNvPr>
           <p:cNvSpPr/>
           <p:nvPr/>
@@ -11712,13 +11755,13 @@
   <p:clrMapOvr>
     <a:masterClrMapping/>
   </p:clrMapOvr>
-  <mc:AlternateContent xmlns:mc="http://schemas.openxmlformats.org/markup-compatibility/2006" xmlns:p14="http://schemas.microsoft.com/office/powerpoint/2010/main">
-    <mc:Choice Requires="p14">
+  <mc:AlternateContent xmlns:mc="http://schemas.openxmlformats.org/markup-compatibility/2006">
+    <mc:Choice xmlns:p14="http://schemas.microsoft.com/office/powerpoint/2010/main" Requires="p14">
       <p:transition spd="slow" p14:dur="1300">
         <p14:pan dir="u"/>
       </p:transition>
     </mc:Choice>
-    <mc:Fallback xmlns="">
+    <mc:Fallback>
       <p:transition spd="slow">
         <p:fade/>
       </p:transition>
@@ -11982,8 +12025,6 @@
       </a:bgFillStyleLst>
     </a:fmtScheme>
   </a:themeElements>
-  <a:objectDefaults/>
-  <a:extraClrSchemeLst/>
   <a:extLst>
     <a:ext uri="{05A4C25C-085E-4340-85A3-A5531E510DB2}">
       <thm15:themeFamily xmlns:thm15="http://schemas.microsoft.com/office/thememl/2012/main" name="Office Theme" id="{62F939B6-93AF-4DB8-9C6B-D6C7DFDC589F}" vid="{4A3C46E8-61CC-4603-A589-7422A47A8E4A}"/>

</xml_diff>

<commit_message>
hanged DFD,SRS and prototype to accomodate for the changes suggested by shani and be
</commit_message>
<xml_diff>
--- a/Requirements & Specifications/Prototype.pptx
+++ b/Requirements & Specifications/Prototype.pptx
@@ -5,24 +5,25 @@
     <p:sldMasterId id="2147483648" r:id="rId1"/>
   </p:sldMasterIdLst>
   <p:sldIdLst>
-    <p:sldId id="256" r:id="rId3"/>
-    <p:sldId id="257" r:id="rId4"/>
-    <p:sldId id="270" r:id="rId5"/>
-    <p:sldId id="259" r:id="rId6"/>
-    <p:sldId id="260" r:id="rId7"/>
-    <p:sldId id="261" r:id="rId8"/>
-    <p:sldId id="262" r:id="rId9"/>
-    <p:sldId id="263" r:id="rId10"/>
-    <p:sldId id="264" r:id="rId11"/>
-    <p:sldId id="265" r:id="rId12"/>
-    <p:sldId id="271" r:id="rId13"/>
-    <p:sldId id="266" r:id="rId14"/>
-    <p:sldId id="272" r:id="rId15"/>
-    <p:sldId id="273" r:id="rId16"/>
-    <p:sldId id="267" r:id="rId17"/>
-    <p:sldId id="268" r:id="rId18"/>
-    <p:sldId id="269" r:id="rId19"/>
-    <p:sldId id="258" r:id="rId20"/>
+    <p:sldId id="256" r:id="rId2"/>
+    <p:sldId id="257" r:id="rId3"/>
+    <p:sldId id="270" r:id="rId4"/>
+    <p:sldId id="259" r:id="rId5"/>
+    <p:sldId id="260" r:id="rId6"/>
+    <p:sldId id="261" r:id="rId7"/>
+    <p:sldId id="262" r:id="rId8"/>
+    <p:sldId id="263" r:id="rId9"/>
+    <p:sldId id="264" r:id="rId10"/>
+    <p:sldId id="265" r:id="rId11"/>
+    <p:sldId id="271" r:id="rId12"/>
+    <p:sldId id="266" r:id="rId13"/>
+    <p:sldId id="272" r:id="rId14"/>
+    <p:sldId id="273" r:id="rId15"/>
+    <p:sldId id="267" r:id="rId16"/>
+    <p:sldId id="268" r:id="rId17"/>
+    <p:sldId id="269" r:id="rId18"/>
+    <p:sldId id="258" r:id="rId19"/>
+    <p:sldId id="274" r:id="rId20"/>
   </p:sldIdLst>
   <p:sldSz cx="12192000" cy="6858000"/>
   <p:notesSz cx="6858000" cy="9144000"/>
@@ -121,6 +122,22 @@
       </a:defRPr>
     </a:lvl9pPr>
   </p:defaultTextStyle>
+  <p:extLst>
+    <p:ext uri="{EFAFB233-063F-42B5-8137-9DF3F51BA10A}">
+      <p15:sldGuideLst xmlns:p15="http://schemas.microsoft.com/office/powerpoint/2012/main">
+        <p15:guide id="1" orient="horz" pos="2160">
+          <p15:clr>
+            <a:srgbClr val="A4A3A4"/>
+          </p15:clr>
+        </p15:guide>
+        <p15:guide id="2" pos="3840">
+          <p15:clr>
+            <a:srgbClr val="A4A3A4"/>
+          </p15:clr>
+        </p15:guide>
+      </p15:sldGuideLst>
+    </p:ext>
+  </p:extLst>
 </p:presentation>
 </file>
 
@@ -337,6 +354,7 @@
           <a:p>
             <a:fld id="{B61BEF0D-F0BB-DE4B-95CE-6DB70DBA9567}" type="datetimeFigureOut">
               <a:rPr lang="en-US" dirty="0"/>
+              <a:t>11/20/2018</a:t>
             </a:fld>
             <a:endParaRPr lang="en-US" dirty="0"/>
           </a:p>
@@ -378,6 +396,7 @@
           <a:p>
             <a:fld id="{D57F1E4F-1CFF-5643-939E-217C01CDF565}" type="slidenum">
               <a:rPr lang="en-US" dirty="0"/>
+              <a:t>‹#›</a:t>
             </a:fld>
             <a:endParaRPr lang="en-US" dirty="0"/>
           </a:p>
@@ -388,13 +407,13 @@
   <p:clrMapOvr>
     <a:masterClrMapping/>
   </p:clrMapOvr>
-  <mc:AlternateContent xmlns:mc="http://schemas.openxmlformats.org/markup-compatibility/2006">
-    <mc:Choice xmlns:p14="http://schemas.microsoft.com/office/powerpoint/2010/main" Requires="p14">
+  <mc:AlternateContent xmlns:mc="http://schemas.openxmlformats.org/markup-compatibility/2006" xmlns:p14="http://schemas.microsoft.com/office/powerpoint/2010/main">
+    <mc:Choice Requires="p14">
       <p:transition spd="slow" p14:dur="1300">
         <p14:pan dir="u"/>
       </p:transition>
     </mc:Choice>
-    <mc:Fallback>
+    <mc:Fallback xmlns="">
       <p:transition spd="slow">
         <p:fade/>
       </p:transition>
@@ -613,7 +632,6 @@
               <a:rPr lang="he-IL"/>
               <a:t>ערוך סגנונות טקסט של תבנית בסיס</a:t>
             </a:r>
-            <a:endParaRPr lang="he-IL"/>
           </a:p>
         </p:txBody>
       </p:sp>
@@ -634,6 +652,7 @@
           <a:p>
             <a:fld id="{B61BEF0D-F0BB-DE4B-95CE-6DB70DBA9567}" type="datetimeFigureOut">
               <a:rPr lang="en-US" dirty="0"/>
+              <a:t>11/20/2018</a:t>
             </a:fld>
             <a:endParaRPr lang="en-US" dirty="0"/>
           </a:p>
@@ -675,6 +694,7 @@
           <a:p>
             <a:fld id="{D57F1E4F-1CFF-5643-939E-217C01CDF565}" type="slidenum">
               <a:rPr lang="en-US" dirty="0"/>
+              <a:t>‹#›</a:t>
             </a:fld>
             <a:endParaRPr lang="en-US" dirty="0"/>
           </a:p>
@@ -685,13 +705,13 @@
   <p:clrMapOvr>
     <a:masterClrMapping/>
   </p:clrMapOvr>
-  <mc:AlternateContent xmlns:mc="http://schemas.openxmlformats.org/markup-compatibility/2006">
-    <mc:Choice xmlns:p14="http://schemas.microsoft.com/office/powerpoint/2010/main" Requires="p14">
+  <mc:AlternateContent xmlns:mc="http://schemas.openxmlformats.org/markup-compatibility/2006" xmlns:p14="http://schemas.microsoft.com/office/powerpoint/2010/main">
+    <mc:Choice Requires="p14">
       <p:transition spd="slow" p14:dur="1300">
         <p14:pan dir="u"/>
       </p:transition>
     </mc:Choice>
-    <mc:Fallback>
+    <mc:Fallback xmlns="">
       <p:transition spd="slow">
         <p:fade/>
       </p:transition>
@@ -878,7 +898,6 @@
               <a:rPr lang="he-IL"/>
               <a:t>ערוך סגנונות טקסט של תבנית בסיס</a:t>
             </a:r>
-            <a:endParaRPr lang="he-IL"/>
           </a:p>
         </p:txBody>
       </p:sp>
@@ -899,6 +918,7 @@
           <a:p>
             <a:fld id="{B61BEF0D-F0BB-DE4B-95CE-6DB70DBA9567}" type="datetimeFigureOut">
               <a:rPr lang="en-US" dirty="0"/>
+              <a:t>11/20/2018</a:t>
             </a:fld>
             <a:endParaRPr lang="en-US" dirty="0"/>
           </a:p>
@@ -940,6 +960,7 @@
           <a:p>
             <a:fld id="{D57F1E4F-1CFF-5643-939E-217C01CDF565}" type="slidenum">
               <a:rPr lang="en-US" dirty="0"/>
+              <a:t>‹#›</a:t>
             </a:fld>
             <a:endParaRPr lang="en-US" dirty="0"/>
           </a:p>
@@ -950,13 +971,13 @@
   <p:clrMapOvr>
     <a:masterClrMapping/>
   </p:clrMapOvr>
-  <mc:AlternateContent xmlns:mc="http://schemas.openxmlformats.org/markup-compatibility/2006">
-    <mc:Choice xmlns:p14="http://schemas.microsoft.com/office/powerpoint/2010/main" Requires="p14">
+  <mc:AlternateContent xmlns:mc="http://schemas.openxmlformats.org/markup-compatibility/2006" xmlns:p14="http://schemas.microsoft.com/office/powerpoint/2010/main">
+    <mc:Choice Requires="p14">
       <p:transition spd="slow" p14:dur="1300">
         <p14:pan dir="u"/>
       </p:transition>
     </mc:Choice>
-    <mc:Fallback>
+    <mc:Fallback xmlns="">
       <p:transition spd="slow">
         <p:fade/>
       </p:transition>
@@ -1094,11 +1115,6 @@
               </a:rPr>
               <a:t>“</a:t>
             </a:r>
-            <a:endParaRPr lang="en-US" sz="8000" dirty="0">
-              <a:solidFill>
-                <a:schemeClr val="accent1"/>
-              </a:solidFill>
-            </a:endParaRPr>
           </a:p>
         </p:txBody>
       </p:sp>
@@ -1214,11 +1230,6 @@
               </a:rPr>
               <a:t>”</a:t>
             </a:r>
-            <a:endParaRPr lang="en-US" sz="8000" dirty="0">
-              <a:solidFill>
-                <a:schemeClr val="accent1"/>
-              </a:solidFill>
-            </a:endParaRPr>
           </a:p>
         </p:txBody>
       </p:sp>
@@ -1311,7 +1322,6 @@
               <a:rPr lang="he-IL"/>
               <a:t>ערוך סגנונות טקסט של תבנית בסיס</a:t>
             </a:r>
-            <a:endParaRPr lang="he-IL"/>
           </a:p>
         </p:txBody>
       </p:sp>
@@ -1364,7 +1374,6 @@
               <a:rPr lang="he-IL"/>
               <a:t>ערוך סגנונות טקסט של תבנית בסיס</a:t>
             </a:r>
-            <a:endParaRPr lang="he-IL"/>
           </a:p>
         </p:txBody>
       </p:sp>
@@ -1385,6 +1394,7 @@
           <a:p>
             <a:fld id="{B61BEF0D-F0BB-DE4B-95CE-6DB70DBA9567}" type="datetimeFigureOut">
               <a:rPr lang="en-US" dirty="0"/>
+              <a:t>11/20/2018</a:t>
             </a:fld>
             <a:endParaRPr lang="en-US" dirty="0"/>
           </a:p>
@@ -1426,6 +1436,7 @@
           <a:p>
             <a:fld id="{D57F1E4F-1CFF-5643-939E-217C01CDF565}" type="slidenum">
               <a:rPr lang="en-US" dirty="0"/>
+              <a:t>‹#›</a:t>
             </a:fld>
             <a:endParaRPr lang="en-US" dirty="0"/>
           </a:p>
@@ -1436,13 +1447,13 @@
   <p:clrMapOvr>
     <a:masterClrMapping/>
   </p:clrMapOvr>
-  <mc:AlternateContent xmlns:mc="http://schemas.openxmlformats.org/markup-compatibility/2006">
-    <mc:Choice xmlns:p14="http://schemas.microsoft.com/office/powerpoint/2010/main" Requires="p14">
+  <mc:AlternateContent xmlns:mc="http://schemas.openxmlformats.org/markup-compatibility/2006" xmlns:p14="http://schemas.microsoft.com/office/powerpoint/2010/main">
+    <mc:Choice Requires="p14">
       <p:transition spd="slow" p14:dur="1300">
         <p14:pan dir="u"/>
       </p:transition>
     </mc:Choice>
-    <mc:Fallback>
+    <mc:Fallback xmlns="">
       <p:transition spd="slow">
         <p:fade/>
       </p:transition>
@@ -1550,7 +1561,6 @@
               <a:rPr lang="he-IL"/>
               <a:t>ערוך סגנונות טקסט של תבנית בסיס</a:t>
             </a:r>
-            <a:endParaRPr lang="he-IL"/>
           </a:p>
         </p:txBody>
       </p:sp>
@@ -1571,6 +1581,7 @@
           <a:p>
             <a:fld id="{B61BEF0D-F0BB-DE4B-95CE-6DB70DBA9567}" type="datetimeFigureOut">
               <a:rPr lang="en-US" dirty="0"/>
+              <a:t>11/20/2018</a:t>
             </a:fld>
             <a:endParaRPr lang="en-US" dirty="0"/>
           </a:p>
@@ -1612,6 +1623,7 @@
           <a:p>
             <a:fld id="{D57F1E4F-1CFF-5643-939E-217C01CDF565}" type="slidenum">
               <a:rPr lang="en-US" dirty="0"/>
+              <a:t>‹#›</a:t>
             </a:fld>
             <a:endParaRPr lang="en-US" dirty="0"/>
           </a:p>
@@ -1622,13 +1634,13 @@
   <p:clrMapOvr>
     <a:masterClrMapping/>
   </p:clrMapOvr>
-  <mc:AlternateContent xmlns:mc="http://schemas.openxmlformats.org/markup-compatibility/2006">
-    <mc:Choice xmlns:p14="http://schemas.microsoft.com/office/powerpoint/2010/main" Requires="p14">
+  <mc:AlternateContent xmlns:mc="http://schemas.openxmlformats.org/markup-compatibility/2006" xmlns:p14="http://schemas.microsoft.com/office/powerpoint/2010/main">
+    <mc:Choice Requires="p14">
       <p:transition spd="slow" p14:dur="1300">
         <p14:pan dir="u"/>
       </p:transition>
     </mc:Choice>
-    <mc:Fallback>
+    <mc:Fallback xmlns="">
       <p:transition spd="slow">
         <p:fade/>
       </p:transition>
@@ -1766,11 +1778,6 @@
               </a:rPr>
               <a:t>“</a:t>
             </a:r>
-            <a:endParaRPr lang="en-US" sz="8000" dirty="0">
-              <a:solidFill>
-                <a:schemeClr val="accent1"/>
-              </a:solidFill>
-            </a:endParaRPr>
           </a:p>
         </p:txBody>
       </p:sp>
@@ -1886,11 +1893,6 @@
               </a:rPr>
               <a:t>”</a:t>
             </a:r>
-            <a:endParaRPr lang="en-US" sz="8000" dirty="0">
-              <a:solidFill>
-                <a:schemeClr val="accent1"/>
-              </a:solidFill>
-            </a:endParaRPr>
           </a:p>
         </p:txBody>
       </p:sp>
@@ -2012,7 +2014,6 @@
               <a:rPr lang="he-IL"/>
               <a:t>ערוך סגנונות טקסט של תבנית בסיס</a:t>
             </a:r>
-            <a:endParaRPr lang="he-IL"/>
           </a:p>
         </p:txBody>
       </p:sp>
@@ -2143,7 +2144,6 @@
               <a:rPr lang="he-IL"/>
               <a:t>ערוך סגנונות טקסט של תבנית בסיס</a:t>
             </a:r>
-            <a:endParaRPr lang="he-IL"/>
           </a:p>
         </p:txBody>
       </p:sp>
@@ -2164,6 +2164,7 @@
           <a:p>
             <a:fld id="{B61BEF0D-F0BB-DE4B-95CE-6DB70DBA9567}" type="datetimeFigureOut">
               <a:rPr lang="en-US" dirty="0"/>
+              <a:t>11/20/2018</a:t>
             </a:fld>
             <a:endParaRPr lang="en-US" dirty="0"/>
           </a:p>
@@ -2205,6 +2206,7 @@
           <a:p>
             <a:fld id="{D57F1E4F-1CFF-5643-939E-217C01CDF565}" type="slidenum">
               <a:rPr lang="en-US" dirty="0"/>
+              <a:t>‹#›</a:t>
             </a:fld>
             <a:endParaRPr lang="en-US" dirty="0"/>
           </a:p>
@@ -2215,13 +2217,13 @@
   <p:clrMapOvr>
     <a:masterClrMapping/>
   </p:clrMapOvr>
-  <mc:AlternateContent xmlns:mc="http://schemas.openxmlformats.org/markup-compatibility/2006">
-    <mc:Choice xmlns:p14="http://schemas.microsoft.com/office/powerpoint/2010/main" Requires="p14">
+  <mc:AlternateContent xmlns:mc="http://schemas.openxmlformats.org/markup-compatibility/2006" xmlns:p14="http://schemas.microsoft.com/office/powerpoint/2010/main">
+    <mc:Choice Requires="p14">
       <p:transition spd="slow" p14:dur="1300">
         <p14:pan dir="u"/>
       </p:transition>
     </mc:Choice>
-    <mc:Fallback>
+    <mc:Fallback xmlns="">
       <p:transition spd="slow">
         <p:fade/>
       </p:transition>
@@ -2351,7 +2353,6 @@
               <a:rPr lang="he-IL"/>
               <a:t>ערוך סגנונות טקסט של תבנית בסיס</a:t>
             </a:r>
-            <a:endParaRPr lang="he-IL"/>
           </a:p>
         </p:txBody>
       </p:sp>
@@ -2482,7 +2483,6 @@
               <a:rPr lang="he-IL"/>
               <a:t>ערוך סגנונות טקסט של תבנית בסיס</a:t>
             </a:r>
-            <a:endParaRPr lang="he-IL"/>
           </a:p>
         </p:txBody>
       </p:sp>
@@ -2503,6 +2503,7 @@
           <a:p>
             <a:fld id="{B61BEF0D-F0BB-DE4B-95CE-6DB70DBA9567}" type="datetimeFigureOut">
               <a:rPr lang="en-US" dirty="0"/>
+              <a:t>11/20/2018</a:t>
             </a:fld>
             <a:endParaRPr lang="en-US" dirty="0"/>
           </a:p>
@@ -2544,6 +2545,7 @@
           <a:p>
             <a:fld id="{D57F1E4F-1CFF-5643-939E-217C01CDF565}" type="slidenum">
               <a:rPr lang="en-US" dirty="0"/>
+              <a:t>‹#›</a:t>
             </a:fld>
             <a:endParaRPr lang="en-US" dirty="0"/>
           </a:p>
@@ -2554,13 +2556,13 @@
   <p:clrMapOvr>
     <a:masterClrMapping/>
   </p:clrMapOvr>
-  <mc:AlternateContent xmlns:mc="http://schemas.openxmlformats.org/markup-compatibility/2006">
-    <mc:Choice xmlns:p14="http://schemas.microsoft.com/office/powerpoint/2010/main" Requires="p14">
+  <mc:AlternateContent xmlns:mc="http://schemas.openxmlformats.org/markup-compatibility/2006" xmlns:p14="http://schemas.microsoft.com/office/powerpoint/2010/main">
+    <mc:Choice Requires="p14">
       <p:transition spd="slow" p14:dur="1300">
         <p14:pan dir="u"/>
       </p:transition>
     </mc:Choice>
-    <mc:Fallback>
+    <mc:Fallback xmlns="">
       <p:transition spd="slow">
         <p:fade/>
       </p:transition>
@@ -2634,7 +2636,6 @@
               <a:rPr lang="he-IL"/>
               <a:t>ערוך סגנונות טקסט של תבנית בסיס</a:t>
             </a:r>
-            <a:endParaRPr lang="he-IL"/>
           </a:p>
           <a:p>
             <a:pPr lvl="1"/>
@@ -2642,7 +2643,6 @@
               <a:rPr lang="he-IL"/>
               <a:t>רמה שניה</a:t>
             </a:r>
-            <a:endParaRPr lang="he-IL"/>
           </a:p>
           <a:p>
             <a:pPr lvl="2"/>
@@ -2650,7 +2650,6 @@
               <a:rPr lang="he-IL"/>
               <a:t>רמה שלישית</a:t>
             </a:r>
-            <a:endParaRPr lang="he-IL"/>
           </a:p>
           <a:p>
             <a:pPr lvl="3"/>
@@ -2658,7 +2657,6 @@
               <a:rPr lang="he-IL"/>
               <a:t>רמה רביעית</a:t>
             </a:r>
-            <a:endParaRPr lang="he-IL"/>
           </a:p>
           <a:p>
             <a:pPr lvl="4"/>
@@ -2687,6 +2685,7 @@
           <a:p>
             <a:fld id="{B61BEF0D-F0BB-DE4B-95CE-6DB70DBA9567}" type="datetimeFigureOut">
               <a:rPr lang="en-US" dirty="0"/>
+              <a:t>11/20/2018</a:t>
             </a:fld>
             <a:endParaRPr lang="en-US" dirty="0"/>
           </a:p>
@@ -2728,6 +2727,7 @@
           <a:p>
             <a:fld id="{D57F1E4F-1CFF-5643-939E-217C01CDF565}" type="slidenum">
               <a:rPr lang="en-US" dirty="0"/>
+              <a:t>‹#›</a:t>
             </a:fld>
             <a:endParaRPr lang="en-US" dirty="0"/>
           </a:p>
@@ -2738,13 +2738,13 @@
   <p:clrMapOvr>
     <a:masterClrMapping/>
   </p:clrMapOvr>
-  <mc:AlternateContent xmlns:mc="http://schemas.openxmlformats.org/markup-compatibility/2006">
-    <mc:Choice xmlns:p14="http://schemas.microsoft.com/office/powerpoint/2010/main" Requires="p14">
+  <mc:AlternateContent xmlns:mc="http://schemas.openxmlformats.org/markup-compatibility/2006" xmlns:p14="http://schemas.microsoft.com/office/powerpoint/2010/main">
+    <mc:Choice Requires="p14">
       <p:transition spd="slow" p14:dur="1300">
         <p14:pan dir="u"/>
       </p:transition>
     </mc:Choice>
-    <mc:Fallback>
+    <mc:Fallback xmlns="">
       <p:transition spd="slow">
         <p:fade/>
       </p:transition>
@@ -2823,7 +2823,6 @@
               <a:rPr lang="he-IL"/>
               <a:t>ערוך סגנונות טקסט של תבנית בסיס</a:t>
             </a:r>
-            <a:endParaRPr lang="he-IL"/>
           </a:p>
           <a:p>
             <a:pPr lvl="1"/>
@@ -2831,7 +2830,6 @@
               <a:rPr lang="he-IL"/>
               <a:t>רמה שניה</a:t>
             </a:r>
-            <a:endParaRPr lang="he-IL"/>
           </a:p>
           <a:p>
             <a:pPr lvl="2"/>
@@ -2839,7 +2837,6 @@
               <a:rPr lang="he-IL"/>
               <a:t>רמה שלישית</a:t>
             </a:r>
-            <a:endParaRPr lang="he-IL"/>
           </a:p>
           <a:p>
             <a:pPr lvl="3"/>
@@ -2847,7 +2844,6 @@
               <a:rPr lang="he-IL"/>
               <a:t>רמה רביעית</a:t>
             </a:r>
-            <a:endParaRPr lang="he-IL"/>
           </a:p>
           <a:p>
             <a:pPr lvl="4"/>
@@ -2876,6 +2872,7 @@
           <a:p>
             <a:fld id="{B61BEF0D-F0BB-DE4B-95CE-6DB70DBA9567}" type="datetimeFigureOut">
               <a:rPr lang="en-US" dirty="0"/>
+              <a:t>11/20/2018</a:t>
             </a:fld>
             <a:endParaRPr lang="en-US" dirty="0"/>
           </a:p>
@@ -2917,6 +2914,7 @@
           <a:p>
             <a:fld id="{D57F1E4F-1CFF-5643-939E-217C01CDF565}" type="slidenum">
               <a:rPr lang="en-US" dirty="0"/>
+              <a:t>‹#›</a:t>
             </a:fld>
             <a:endParaRPr lang="en-US" dirty="0"/>
           </a:p>
@@ -2927,13 +2925,13 @@
   <p:clrMapOvr>
     <a:masterClrMapping/>
   </p:clrMapOvr>
-  <mc:AlternateContent xmlns:mc="http://schemas.openxmlformats.org/markup-compatibility/2006">
-    <mc:Choice xmlns:p14="http://schemas.microsoft.com/office/powerpoint/2010/main" Requires="p14">
+  <mc:AlternateContent xmlns:mc="http://schemas.openxmlformats.org/markup-compatibility/2006" xmlns:p14="http://schemas.microsoft.com/office/powerpoint/2010/main">
+    <mc:Choice Requires="p14">
       <p:transition spd="slow" p14:dur="1300">
         <p14:pan dir="u"/>
       </p:transition>
     </mc:Choice>
-    <mc:Fallback>
+    <mc:Fallback xmlns="">
       <p:transition spd="slow">
         <p:fade/>
       </p:transition>
@@ -3002,7 +3000,6 @@
               <a:rPr lang="he-IL"/>
               <a:t>ערוך סגנונות טקסט של תבנית בסיס</a:t>
             </a:r>
-            <a:endParaRPr lang="he-IL"/>
           </a:p>
           <a:p>
             <a:pPr lvl="1"/>
@@ -3010,7 +3007,6 @@
               <a:rPr lang="he-IL"/>
               <a:t>רמה שניה</a:t>
             </a:r>
-            <a:endParaRPr lang="he-IL"/>
           </a:p>
           <a:p>
             <a:pPr lvl="2"/>
@@ -3018,7 +3014,6 @@
               <a:rPr lang="he-IL"/>
               <a:t>רמה שלישית</a:t>
             </a:r>
-            <a:endParaRPr lang="he-IL"/>
           </a:p>
           <a:p>
             <a:pPr lvl="3"/>
@@ -3026,7 +3021,6 @@
               <a:rPr lang="he-IL"/>
               <a:t>רמה רביעית</a:t>
             </a:r>
-            <a:endParaRPr lang="he-IL"/>
           </a:p>
           <a:p>
             <a:pPr lvl="4"/>
@@ -3055,6 +3049,7 @@
           <a:p>
             <a:fld id="{B61BEF0D-F0BB-DE4B-95CE-6DB70DBA9567}" type="datetimeFigureOut">
               <a:rPr lang="en-US" dirty="0"/>
+              <a:t>11/20/2018</a:t>
             </a:fld>
             <a:endParaRPr lang="en-US" dirty="0"/>
           </a:p>
@@ -3096,6 +3091,7 @@
           <a:p>
             <a:fld id="{D57F1E4F-1CFF-5643-939E-217C01CDF565}" type="slidenum">
               <a:rPr lang="en-US" dirty="0"/>
+              <a:t>‹#›</a:t>
             </a:fld>
             <a:endParaRPr lang="en-US" dirty="0"/>
           </a:p>
@@ -3106,13 +3102,13 @@
   <p:clrMapOvr>
     <a:masterClrMapping/>
   </p:clrMapOvr>
-  <mc:AlternateContent xmlns:mc="http://schemas.openxmlformats.org/markup-compatibility/2006">
-    <mc:Choice xmlns:p14="http://schemas.microsoft.com/office/powerpoint/2010/main" Requires="p14">
+  <mc:AlternateContent xmlns:mc="http://schemas.openxmlformats.org/markup-compatibility/2006" xmlns:p14="http://schemas.microsoft.com/office/powerpoint/2010/main">
+    <mc:Choice Requires="p14">
       <p:transition spd="slow" p14:dur="1300">
         <p14:pan dir="u"/>
       </p:transition>
     </mc:Choice>
-    <mc:Fallback>
+    <mc:Fallback xmlns="">
       <p:transition spd="slow">
         <p:fade/>
       </p:transition>
@@ -3297,7 +3293,6 @@
               <a:rPr lang="he-IL"/>
               <a:t>ערוך סגנונות טקסט של תבנית בסיס</a:t>
             </a:r>
-            <a:endParaRPr lang="he-IL"/>
           </a:p>
         </p:txBody>
       </p:sp>
@@ -3318,6 +3313,7 @@
           <a:p>
             <a:fld id="{B61BEF0D-F0BB-DE4B-95CE-6DB70DBA9567}" type="datetimeFigureOut">
               <a:rPr lang="en-US" dirty="0"/>
+              <a:t>11/20/2018</a:t>
             </a:fld>
             <a:endParaRPr lang="en-US" dirty="0"/>
           </a:p>
@@ -3359,6 +3355,7 @@
           <a:p>
             <a:fld id="{D57F1E4F-1CFF-5643-939E-217C01CDF565}" type="slidenum">
               <a:rPr lang="en-US" dirty="0"/>
+              <a:t>‹#›</a:t>
             </a:fld>
             <a:endParaRPr lang="en-US" dirty="0"/>
           </a:p>
@@ -3369,13 +3366,13 @@
   <p:clrMapOvr>
     <a:masterClrMapping/>
   </p:clrMapOvr>
-  <mc:AlternateContent xmlns:mc="http://schemas.openxmlformats.org/markup-compatibility/2006">
-    <mc:Choice xmlns:p14="http://schemas.microsoft.com/office/powerpoint/2010/main" Requires="p14">
+  <mc:AlternateContent xmlns:mc="http://schemas.openxmlformats.org/markup-compatibility/2006" xmlns:p14="http://schemas.microsoft.com/office/powerpoint/2010/main">
+    <mc:Choice Requires="p14">
       <p:transition spd="slow" p14:dur="1300">
         <p14:pan dir="u"/>
       </p:transition>
     </mc:Choice>
-    <mc:Fallback>
+    <mc:Fallback xmlns="">
       <p:transition spd="slow">
         <p:fade/>
       </p:transition>
@@ -3479,7 +3476,6 @@
               <a:rPr lang="he-IL"/>
               <a:t>ערוך סגנונות טקסט של תבנית בסיס</a:t>
             </a:r>
-            <a:endParaRPr lang="he-IL"/>
           </a:p>
           <a:p>
             <a:pPr lvl="1"/>
@@ -3487,7 +3483,6 @@
               <a:rPr lang="he-IL"/>
               <a:t>רמה שניה</a:t>
             </a:r>
-            <a:endParaRPr lang="he-IL"/>
           </a:p>
           <a:p>
             <a:pPr lvl="2"/>
@@ -3495,7 +3490,6 @@
               <a:rPr lang="he-IL"/>
               <a:t>רמה שלישית</a:t>
             </a:r>
-            <a:endParaRPr lang="he-IL"/>
           </a:p>
           <a:p>
             <a:pPr lvl="3"/>
@@ -3503,7 +3497,6 @@
               <a:rPr lang="he-IL"/>
               <a:t>רמה רביעית</a:t>
             </a:r>
-            <a:endParaRPr lang="he-IL"/>
           </a:p>
           <a:p>
             <a:pPr lvl="4"/>
@@ -3570,7 +3563,6 @@
               <a:rPr lang="he-IL"/>
               <a:t>ערוך סגנונות טקסט של תבנית בסיס</a:t>
             </a:r>
-            <a:endParaRPr lang="he-IL"/>
           </a:p>
           <a:p>
             <a:pPr lvl="1"/>
@@ -3578,7 +3570,6 @@
               <a:rPr lang="he-IL"/>
               <a:t>רמה שניה</a:t>
             </a:r>
-            <a:endParaRPr lang="he-IL"/>
           </a:p>
           <a:p>
             <a:pPr lvl="2"/>
@@ -3586,7 +3577,6 @@
               <a:rPr lang="he-IL"/>
               <a:t>רמה שלישית</a:t>
             </a:r>
-            <a:endParaRPr lang="he-IL"/>
           </a:p>
           <a:p>
             <a:pPr lvl="3"/>
@@ -3594,7 +3584,6 @@
               <a:rPr lang="he-IL"/>
               <a:t>רמה רביעית</a:t>
             </a:r>
-            <a:endParaRPr lang="he-IL"/>
           </a:p>
           <a:p>
             <a:pPr lvl="4"/>
@@ -3623,6 +3612,7 @@
           <a:p>
             <a:fld id="{B61BEF0D-F0BB-DE4B-95CE-6DB70DBA9567}" type="datetimeFigureOut">
               <a:rPr lang="en-US" dirty="0"/>
+              <a:t>11/20/2018</a:t>
             </a:fld>
             <a:endParaRPr lang="en-US" dirty="0"/>
           </a:p>
@@ -3664,6 +3654,7 @@
           <a:p>
             <a:fld id="{D57F1E4F-1CFF-5643-939E-217C01CDF565}" type="slidenum">
               <a:rPr lang="en-US" dirty="0"/>
+              <a:t>‹#›</a:t>
             </a:fld>
             <a:endParaRPr lang="en-US" dirty="0"/>
           </a:p>
@@ -3674,13 +3665,13 @@
   <p:clrMapOvr>
     <a:masterClrMapping/>
   </p:clrMapOvr>
-  <mc:AlternateContent xmlns:mc="http://schemas.openxmlformats.org/markup-compatibility/2006">
-    <mc:Choice xmlns:p14="http://schemas.microsoft.com/office/powerpoint/2010/main" Requires="p14">
+  <mc:AlternateContent xmlns:mc="http://schemas.openxmlformats.org/markup-compatibility/2006" xmlns:p14="http://schemas.microsoft.com/office/powerpoint/2010/main">
+    <mc:Choice Requires="p14">
       <p:transition spd="slow" p14:dur="1300">
         <p14:pan dir="u"/>
       </p:transition>
     </mc:Choice>
-    <mc:Fallback>
+    <mc:Fallback xmlns="">
       <p:transition spd="slow">
         <p:fade/>
       </p:transition>
@@ -3797,7 +3788,6 @@
               <a:rPr lang="he-IL"/>
               <a:t>ערוך סגנונות טקסט של תבנית בסיס</a:t>
             </a:r>
-            <a:endParaRPr lang="he-IL"/>
           </a:p>
         </p:txBody>
       </p:sp>
@@ -3856,7 +3846,6 @@
               <a:rPr lang="he-IL"/>
               <a:t>ערוך סגנונות טקסט של תבנית בסיס</a:t>
             </a:r>
-            <a:endParaRPr lang="he-IL"/>
           </a:p>
           <a:p>
             <a:pPr lvl="1"/>
@@ -3864,7 +3853,6 @@
               <a:rPr lang="he-IL"/>
               <a:t>רמה שניה</a:t>
             </a:r>
-            <a:endParaRPr lang="he-IL"/>
           </a:p>
           <a:p>
             <a:pPr lvl="2"/>
@@ -3872,7 +3860,6 @@
               <a:rPr lang="he-IL"/>
               <a:t>רמה שלישית</a:t>
             </a:r>
-            <a:endParaRPr lang="he-IL"/>
           </a:p>
           <a:p>
             <a:pPr lvl="3"/>
@@ -3880,7 +3867,6 @@
               <a:rPr lang="he-IL"/>
               <a:t>רמה רביעית</a:t>
             </a:r>
-            <a:endParaRPr lang="he-IL"/>
           </a:p>
           <a:p>
             <a:pPr lvl="4"/>
@@ -3956,7 +3942,6 @@
               <a:rPr lang="he-IL"/>
               <a:t>ערוך סגנונות טקסט של תבנית בסיס</a:t>
             </a:r>
-            <a:endParaRPr lang="he-IL"/>
           </a:p>
         </p:txBody>
       </p:sp>
@@ -4015,7 +4000,6 @@
               <a:rPr lang="he-IL"/>
               <a:t>ערוך סגנונות טקסט של תבנית בסיס</a:t>
             </a:r>
-            <a:endParaRPr lang="he-IL"/>
           </a:p>
           <a:p>
             <a:pPr lvl="1"/>
@@ -4023,7 +4007,6 @@
               <a:rPr lang="he-IL"/>
               <a:t>רמה שניה</a:t>
             </a:r>
-            <a:endParaRPr lang="he-IL"/>
           </a:p>
           <a:p>
             <a:pPr lvl="2"/>
@@ -4031,7 +4014,6 @@
               <a:rPr lang="he-IL"/>
               <a:t>רמה שלישית</a:t>
             </a:r>
-            <a:endParaRPr lang="he-IL"/>
           </a:p>
           <a:p>
             <a:pPr lvl="3"/>
@@ -4039,7 +4021,6 @@
               <a:rPr lang="he-IL"/>
               <a:t>רמה רביעית</a:t>
             </a:r>
-            <a:endParaRPr lang="he-IL"/>
           </a:p>
           <a:p>
             <a:pPr lvl="4"/>
@@ -4068,6 +4049,7 @@
           <a:p>
             <a:fld id="{B61BEF0D-F0BB-DE4B-95CE-6DB70DBA9567}" type="datetimeFigureOut">
               <a:rPr lang="en-US" dirty="0"/>
+              <a:t>11/20/2018</a:t>
             </a:fld>
             <a:endParaRPr lang="en-US" dirty="0"/>
           </a:p>
@@ -4109,6 +4091,7 @@
           <a:p>
             <a:fld id="{D57F1E4F-1CFF-5643-939E-217C01CDF565}" type="slidenum">
               <a:rPr lang="en-US" dirty="0"/>
+              <a:t>‹#›</a:t>
             </a:fld>
             <a:endParaRPr lang="en-US" dirty="0"/>
           </a:p>
@@ -4119,13 +4102,13 @@
   <p:clrMapOvr>
     <a:masterClrMapping/>
   </p:clrMapOvr>
-  <mc:AlternateContent xmlns:mc="http://schemas.openxmlformats.org/markup-compatibility/2006">
-    <mc:Choice xmlns:p14="http://schemas.microsoft.com/office/powerpoint/2010/main" Requires="p14">
+  <mc:AlternateContent xmlns:mc="http://schemas.openxmlformats.org/markup-compatibility/2006" xmlns:p14="http://schemas.microsoft.com/office/powerpoint/2010/main">
+    <mc:Choice Requires="p14">
       <p:transition spd="slow" p14:dur="1300">
         <p14:pan dir="u"/>
       </p:transition>
     </mc:Choice>
-    <mc:Fallback>
+    <mc:Fallback xmlns="">
       <p:transition spd="slow">
         <p:fade/>
       </p:transition>
@@ -4191,6 +4174,7 @@
           <a:p>
             <a:fld id="{B61BEF0D-F0BB-DE4B-95CE-6DB70DBA9567}" type="datetimeFigureOut">
               <a:rPr lang="en-US" dirty="0"/>
+              <a:t>11/20/2018</a:t>
             </a:fld>
             <a:endParaRPr lang="en-US" dirty="0"/>
           </a:p>
@@ -4232,6 +4216,7 @@
           <a:p>
             <a:fld id="{D57F1E4F-1CFF-5643-939E-217C01CDF565}" type="slidenum">
               <a:rPr lang="en-US" dirty="0"/>
+              <a:t>‹#›</a:t>
             </a:fld>
             <a:endParaRPr lang="en-US" dirty="0"/>
           </a:p>
@@ -4242,13 +4227,13 @@
   <p:clrMapOvr>
     <a:masterClrMapping/>
   </p:clrMapOvr>
-  <mc:AlternateContent xmlns:mc="http://schemas.openxmlformats.org/markup-compatibility/2006">
-    <mc:Choice xmlns:p14="http://schemas.microsoft.com/office/powerpoint/2010/main" Requires="p14">
+  <mc:AlternateContent xmlns:mc="http://schemas.openxmlformats.org/markup-compatibility/2006" xmlns:p14="http://schemas.microsoft.com/office/powerpoint/2010/main">
+    <mc:Choice Requires="p14">
       <p:transition spd="slow" p14:dur="1300">
         <p14:pan dir="u"/>
       </p:transition>
     </mc:Choice>
-    <mc:Fallback>
+    <mc:Fallback xmlns="">
       <p:transition spd="slow">
         <p:fade/>
       </p:transition>
@@ -4291,6 +4276,7 @@
           <a:p>
             <a:fld id="{B61BEF0D-F0BB-DE4B-95CE-6DB70DBA9567}" type="datetimeFigureOut">
               <a:rPr lang="en-US" dirty="0"/>
+              <a:t>11/20/2018</a:t>
             </a:fld>
             <a:endParaRPr lang="en-US" dirty="0"/>
           </a:p>
@@ -4332,6 +4318,7 @@
           <a:p>
             <a:fld id="{D57F1E4F-1CFF-5643-939E-217C01CDF565}" type="slidenum">
               <a:rPr lang="en-US" dirty="0"/>
+              <a:t>‹#›</a:t>
             </a:fld>
             <a:endParaRPr lang="en-US" dirty="0"/>
           </a:p>
@@ -4342,13 +4329,13 @@
   <p:clrMapOvr>
     <a:masterClrMapping/>
   </p:clrMapOvr>
-  <mc:AlternateContent xmlns:mc="http://schemas.openxmlformats.org/markup-compatibility/2006">
-    <mc:Choice xmlns:p14="http://schemas.microsoft.com/office/powerpoint/2010/main" Requires="p14">
+  <mc:AlternateContent xmlns:mc="http://schemas.openxmlformats.org/markup-compatibility/2006" xmlns:p14="http://schemas.microsoft.com/office/powerpoint/2010/main">
+    <mc:Choice Requires="p14">
       <p:transition spd="slow" p14:dur="1300">
         <p14:pan dir="u"/>
       </p:transition>
     </mc:Choice>
-    <mc:Fallback>
+    <mc:Fallback xmlns="">
       <p:transition spd="slow">
         <p:fade/>
       </p:transition>
@@ -4463,7 +4450,6 @@
               <a:rPr lang="he-IL"/>
               <a:t>ערוך סגנונות טקסט של תבנית בסיס</a:t>
             </a:r>
-            <a:endParaRPr lang="he-IL"/>
           </a:p>
           <a:p>
             <a:pPr lvl="1"/>
@@ -4471,7 +4457,6 @@
               <a:rPr lang="he-IL"/>
               <a:t>רמה שניה</a:t>
             </a:r>
-            <a:endParaRPr lang="he-IL"/>
           </a:p>
           <a:p>
             <a:pPr lvl="2"/>
@@ -4479,7 +4464,6 @@
               <a:rPr lang="he-IL"/>
               <a:t>רמה שלישית</a:t>
             </a:r>
-            <a:endParaRPr lang="he-IL"/>
           </a:p>
           <a:p>
             <a:pPr lvl="3"/>
@@ -4487,7 +4471,6 @@
               <a:rPr lang="he-IL"/>
               <a:t>רמה רביעית</a:t>
             </a:r>
-            <a:endParaRPr lang="he-IL"/>
           </a:p>
           <a:p>
             <a:pPr lvl="4"/>
@@ -4563,7 +4546,6 @@
               <a:rPr lang="he-IL"/>
               <a:t>ערוך סגנונות טקסט של תבנית בסיס</a:t>
             </a:r>
-            <a:endParaRPr lang="he-IL"/>
           </a:p>
         </p:txBody>
       </p:sp>
@@ -4584,6 +4566,7 @@
           <a:p>
             <a:fld id="{B61BEF0D-F0BB-DE4B-95CE-6DB70DBA9567}" type="datetimeFigureOut">
               <a:rPr lang="en-US" dirty="0"/>
+              <a:t>11/20/2018</a:t>
             </a:fld>
             <a:endParaRPr lang="en-US" dirty="0"/>
           </a:p>
@@ -4625,6 +4608,7 @@
           <a:p>
             <a:fld id="{D57F1E4F-1CFF-5643-939E-217C01CDF565}" type="slidenum">
               <a:rPr lang="en-US" dirty="0"/>
+              <a:t>‹#›</a:t>
             </a:fld>
             <a:endParaRPr lang="en-US" dirty="0"/>
           </a:p>
@@ -4635,13 +4619,13 @@
   <p:clrMapOvr>
     <a:masterClrMapping/>
   </p:clrMapOvr>
-  <mc:AlternateContent xmlns:mc="http://schemas.openxmlformats.org/markup-compatibility/2006">
-    <mc:Choice xmlns:p14="http://schemas.microsoft.com/office/powerpoint/2010/main" Requires="p14">
+  <mc:AlternateContent xmlns:mc="http://schemas.openxmlformats.org/markup-compatibility/2006" xmlns:p14="http://schemas.microsoft.com/office/powerpoint/2010/main">
+    <mc:Choice Requires="p14">
       <p:transition spd="slow" p14:dur="1300">
         <p14:pan dir="u"/>
       </p:transition>
     </mc:Choice>
-    <mc:Fallback>
+    <mc:Fallback xmlns="">
       <p:transition spd="slow">
         <p:fade/>
       </p:transition>
@@ -4855,7 +4839,6 @@
               <a:rPr lang="he-IL"/>
               <a:t>ערוך סגנונות טקסט של תבנית בסיס</a:t>
             </a:r>
-            <a:endParaRPr lang="he-IL"/>
           </a:p>
         </p:txBody>
       </p:sp>
@@ -4881,6 +4864,7 @@
           <a:p>
             <a:fld id="{B61BEF0D-F0BB-DE4B-95CE-6DB70DBA9567}" type="datetimeFigureOut">
               <a:rPr lang="en-US" dirty="0"/>
+              <a:t>11/20/2018</a:t>
             </a:fld>
             <a:endParaRPr lang="en-US" dirty="0"/>
           </a:p>
@@ -4932,6 +4916,7 @@
           <a:p>
             <a:fld id="{D57F1E4F-1CFF-5643-939E-217C01CDF565}" type="slidenum">
               <a:rPr lang="en-US" dirty="0"/>
+              <a:t>‹#›</a:t>
             </a:fld>
             <a:endParaRPr lang="en-US" dirty="0"/>
           </a:p>
@@ -4942,13 +4927,13 @@
   <p:clrMapOvr>
     <a:masterClrMapping/>
   </p:clrMapOvr>
-  <mc:AlternateContent xmlns:mc="http://schemas.openxmlformats.org/markup-compatibility/2006">
-    <mc:Choice xmlns:p14="http://schemas.microsoft.com/office/powerpoint/2010/main" Requires="p14">
+  <mc:AlternateContent xmlns:mc="http://schemas.openxmlformats.org/markup-compatibility/2006" xmlns:p14="http://schemas.microsoft.com/office/powerpoint/2010/main">
+    <mc:Choice Requires="p14">
       <p:transition spd="slow" p14:dur="1300">
         <p14:pan dir="u"/>
       </p:transition>
     </mc:Choice>
-    <mc:Fallback>
+    <mc:Fallback xmlns="">
       <p:transition spd="slow">
         <p:fade/>
       </p:transition>
@@ -5042,7 +5027,6 @@
               <a:rPr lang="he-IL"/>
               <a:t>ערוך סגנונות טקסט של תבנית בסיס</a:t>
             </a:r>
-            <a:endParaRPr lang="he-IL"/>
           </a:p>
           <a:p>
             <a:pPr lvl="1"/>
@@ -5050,7 +5034,6 @@
               <a:rPr lang="he-IL"/>
               <a:t>רמה שניה</a:t>
             </a:r>
-            <a:endParaRPr lang="he-IL"/>
           </a:p>
           <a:p>
             <a:pPr lvl="2"/>
@@ -5058,7 +5041,6 @@
               <a:rPr lang="he-IL"/>
               <a:t>רמה שלישית</a:t>
             </a:r>
-            <a:endParaRPr lang="he-IL"/>
           </a:p>
           <a:p>
             <a:pPr lvl="3"/>
@@ -5066,7 +5048,6 @@
               <a:rPr lang="he-IL"/>
               <a:t>רמה רביעית</a:t>
             </a:r>
-            <a:endParaRPr lang="he-IL"/>
           </a:p>
           <a:p>
             <a:pPr lvl="4"/>
@@ -5121,6 +5102,7 @@
           <a:p>
             <a:fld id="{B61BEF0D-F0BB-DE4B-95CE-6DB70DBA9567}" type="datetimeFigureOut">
               <a:rPr lang="en-US" dirty="0"/>
+              <a:t>11/20/2018</a:t>
             </a:fld>
             <a:endParaRPr lang="en-US" dirty="0"/>
           </a:p>
@@ -5214,6 +5196,7 @@
           <a:p>
             <a:fld id="{D57F1E4F-1CFF-5643-939E-217C01CDF565}" type="slidenum">
               <a:rPr lang="en-US" dirty="0"/>
+              <a:t>‹#›</a:t>
             </a:fld>
             <a:endParaRPr lang="en-US" dirty="0"/>
           </a:p>
@@ -5241,13 +5224,13 @@
     <p:sldLayoutId id="2147483664" r:id="rId16"/>
     <p:sldLayoutId id="2147483665" r:id="rId17"/>
   </p:sldLayoutIdLst>
-  <mc:AlternateContent xmlns:mc="http://schemas.openxmlformats.org/markup-compatibility/2006">
-    <mc:Choice xmlns:p14="http://schemas.microsoft.com/office/powerpoint/2010/main" Requires="p14">
+  <mc:AlternateContent xmlns:mc="http://schemas.openxmlformats.org/markup-compatibility/2006" xmlns:p14="http://schemas.microsoft.com/office/powerpoint/2010/main">
+    <mc:Choice Requires="p14">
       <p:transition spd="slow" p14:dur="1300">
         <p14:pan dir="u"/>
       </p:transition>
     </mc:Choice>
-    <mc:Fallback>
+    <mc:Fallback xmlns="">
       <p:transition spd="slow">
         <p:fade/>
       </p:transition>
@@ -5955,7 +5938,7 @@
       <p:sp>
         <p:nvSpPr>
           <p:cNvPr id="4" name="מלבן 7">
-            <a:hlinkClick r:id="rId1" action="ppaction://hlinksldjump"/>
+            <a:hlinkClick r:id="rId2" action="ppaction://hlinksldjump"/>
           </p:cNvPr>
           <p:cNvSpPr/>
           <p:nvPr/>
@@ -6051,13 +6034,13 @@
   <p:clrMapOvr>
     <a:masterClrMapping/>
   </p:clrMapOvr>
-  <mc:AlternateContent xmlns:mc="http://schemas.openxmlformats.org/markup-compatibility/2006">
-    <mc:Choice xmlns:p14="http://schemas.microsoft.com/office/powerpoint/2010/main" Requires="p14">
+  <mc:AlternateContent xmlns:mc="http://schemas.openxmlformats.org/markup-compatibility/2006" xmlns:p14="http://schemas.microsoft.com/office/powerpoint/2010/main">
+    <mc:Choice Requires="p14">
       <p:transition spd="slow" p14:dur="1300">
         <p14:pan dir="u"/>
       </p:transition>
     </mc:Choice>
-    <mc:Fallback>
+    <mc:Fallback xmlns="">
       <p:transition spd="slow">
         <p:fade/>
       </p:transition>
@@ -6204,7 +6187,7 @@
       <p:sp>
         <p:nvSpPr>
           <p:cNvPr id="6" name="מלבן 6">
-            <a:hlinkClick r:id="rId1" action="ppaction://hlinksldjump"/>
+            <a:hlinkClick r:id="rId2" action="ppaction://hlinksldjump"/>
           </p:cNvPr>
           <p:cNvSpPr/>
           <p:nvPr/>
@@ -6356,7 +6339,7 @@
       <p:sp>
         <p:nvSpPr>
           <p:cNvPr id="9" name="מלבן 6">
-            <a:hlinkClick r:id="rId1" action="ppaction://hlinksldjump"/>
+            <a:hlinkClick r:id="rId2" action="ppaction://hlinksldjump"/>
           </p:cNvPr>
           <p:cNvSpPr/>
           <p:nvPr/>
@@ -6422,13 +6405,13 @@
   <p:clrMapOvr>
     <a:masterClrMapping/>
   </p:clrMapOvr>
-  <mc:AlternateContent xmlns:mc="http://schemas.openxmlformats.org/markup-compatibility/2006">
-    <mc:Choice xmlns:p14="http://schemas.microsoft.com/office/powerpoint/2010/main" Requires="p14">
+  <mc:AlternateContent xmlns:mc="http://schemas.openxmlformats.org/markup-compatibility/2006" xmlns:p14="http://schemas.microsoft.com/office/powerpoint/2010/main">
+    <mc:Choice Requires="p14">
       <p:transition spd="slow" p14:dur="1300">
         <p14:pan dir="u"/>
       </p:transition>
     </mc:Choice>
-    <mc:Fallback>
+    <mc:Fallback xmlns="">
       <p:transition spd="slow">
         <p:fade/>
       </p:transition>
@@ -6511,7 +6494,6 @@
               <a:rPr lang="en-US" dirty="0" smtClean="0"/>
               <a:t>ABC.</a:t>
             </a:r>
-            <a:endParaRPr lang="en-US" dirty="0" smtClean="0"/>
           </a:p>
           <a:p>
             <a:pPr algn="l" rtl="0"/>
@@ -6526,7 +6508,6 @@
               <a:rPr lang="en-US" dirty="0" smtClean="0"/>
               <a:t>DEF.</a:t>
             </a:r>
-            <a:endParaRPr lang="en-US" dirty="0" smtClean="0"/>
           </a:p>
           <a:p>
             <a:pPr algn="l" rtl="0"/>
@@ -6541,7 +6522,7 @@
       <p:sp>
         <p:nvSpPr>
           <p:cNvPr id="4" name="מלבן 6">
-            <a:hlinkClick r:id="rId1" action="ppaction://hlinksldjump"/>
+            <a:hlinkClick r:id="rId2" action="ppaction://hlinksldjump"/>
           </p:cNvPr>
           <p:cNvSpPr/>
           <p:nvPr/>
@@ -6607,13 +6588,13 @@
   <p:clrMapOvr>
     <a:masterClrMapping/>
   </p:clrMapOvr>
-  <mc:AlternateContent xmlns:mc="http://schemas.openxmlformats.org/markup-compatibility/2006">
-    <mc:Choice xmlns:p14="http://schemas.microsoft.com/office/powerpoint/2010/main" Requires="p14">
+  <mc:AlternateContent xmlns:mc="http://schemas.openxmlformats.org/markup-compatibility/2006" xmlns:p14="http://schemas.microsoft.com/office/powerpoint/2010/main">
+    <mc:Choice Requires="p14">
       <p:transition spd="slow" p14:dur="1300">
         <p14:pan dir="u"/>
       </p:transition>
     </mc:Choice>
-    <mc:Fallback>
+    <mc:Fallback xmlns="">
       <p:transition spd="slow">
         <p:fade/>
       </p:transition>
@@ -6699,7 +6680,6 @@
               <a:rPr lang="en-US" dirty="0" smtClean="0"/>
               <a:t>Open ticket</a:t>
             </a:r>
-            <a:endParaRPr lang="en-US" dirty="0" smtClean="0"/>
           </a:p>
           <a:p>
             <a:pPr marL="457200" indent="-457200" algn="l" rtl="0">
@@ -6710,7 +6690,6 @@
               <a:rPr lang="en-US" dirty="0" smtClean="0"/>
               <a:t>View / update ticket</a:t>
             </a:r>
-            <a:endParaRPr lang="en-US" dirty="0" smtClean="0"/>
           </a:p>
           <a:p>
             <a:pPr marL="457200" indent="-457200" algn="l" rtl="0">
@@ -6721,7 +6700,6 @@
               <a:rPr lang="en-US" dirty="0" smtClean="0"/>
               <a:t>Browse tickets</a:t>
             </a:r>
-            <a:endParaRPr lang="en-US" dirty="0" smtClean="0"/>
           </a:p>
           <a:p>
             <a:pPr marL="457200" indent="-457200" algn="l" rtl="0">
@@ -6730,9 +6708,12 @@
             </a:pPr>
             <a:r>
               <a:rPr lang="en-US" dirty="0" smtClean="0"/>
-              <a:t>Create user</a:t>
-            </a:r>
-            <a:endParaRPr lang="en-US" dirty="0" smtClean="0"/>
+              <a:t>Create </a:t>
+            </a:r>
+            <a:r>
+              <a:rPr lang="en-US" dirty="0" smtClean="0"/>
+              <a:t>user</a:t>
+            </a:r>
           </a:p>
           <a:p>
             <a:pPr marL="457200" indent="-457200" algn="l" rtl="0">
@@ -6741,8 +6722,24 @@
             </a:pPr>
             <a:r>
               <a:rPr lang="en-US" dirty="0" smtClean="0"/>
+              <a:t>Stats</a:t>
+            </a:r>
+          </a:p>
+          <a:p>
+            <a:pPr marL="457200" indent="-457200" algn="l" rtl="0">
+              <a:buFont typeface="+mj-lt"/>
+              <a:buAutoNum type="arabicPeriod"/>
+            </a:pPr>
+            <a:r>
+              <a:rPr lang="en-US" dirty="0"/>
               <a:t>Log out</a:t>
             </a:r>
+          </a:p>
+          <a:p>
+            <a:pPr marL="457200" indent="-457200" algn="l" rtl="0">
+              <a:buFont typeface="+mj-lt"/>
+              <a:buAutoNum type="arabicPeriod"/>
+            </a:pPr>
             <a:endParaRPr lang="en-US" dirty="0"/>
           </a:p>
         </p:txBody>
@@ -6750,7 +6747,7 @@
       <p:sp>
         <p:nvSpPr>
           <p:cNvPr id="4" name="Right Arrow 3">
-            <a:hlinkClick r:id="rId1" action="ppaction://hlinksldjump"/>
+            <a:hlinkClick r:id="rId2" action="ppaction://hlinksldjump"/>
           </p:cNvPr>
           <p:cNvSpPr/>
           <p:nvPr/>
@@ -6805,7 +6802,7 @@
       <p:sp>
         <p:nvSpPr>
           <p:cNvPr id="5" name="Right Arrow 4">
-            <a:hlinkClick r:id="rId2" action="ppaction://hlinksldjump"/>
+            <a:hlinkClick r:id="rId3" action="ppaction://hlinksldjump"/>
           </p:cNvPr>
           <p:cNvSpPr/>
           <p:nvPr/>
@@ -6860,7 +6857,7 @@
       <p:sp>
         <p:nvSpPr>
           <p:cNvPr id="6" name="Right Arrow 5">
-            <a:hlinkClick r:id="rId3" action="ppaction://hlinksldjump"/>
+            <a:hlinkClick r:id="rId4" action="ppaction://hlinksldjump"/>
           </p:cNvPr>
           <p:cNvSpPr/>
           <p:nvPr/>
@@ -6915,14 +6912,14 @@
       <p:sp>
         <p:nvSpPr>
           <p:cNvPr id="7" name="Right Arrow 6">
-            <a:hlinkClick r:id="rId4" action="ppaction://hlinksldjump"/>
+            <a:hlinkClick r:id="rId5" action="ppaction://hlinksldjump"/>
           </p:cNvPr>
           <p:cNvSpPr/>
           <p:nvPr/>
         </p:nvSpPr>
         <p:spPr>
           <a:xfrm>
-            <a:off x="148281" y="4423925"/>
+            <a:off x="148281" y="4861763"/>
             <a:ext cx="978408" cy="484632"/>
           </a:xfrm>
           <a:prstGeom prst="rightArrow">
@@ -6970,7 +6967,7 @@
       <p:sp>
         <p:nvSpPr>
           <p:cNvPr id="8" name="Right Arrow 7">
-            <a:hlinkClick r:id="rId5" action="ppaction://hlinksldjump"/>
+            <a:hlinkClick r:id="rId6" action="ppaction://hlinksldjump"/>
           </p:cNvPr>
           <p:cNvSpPr/>
           <p:nvPr/>
@@ -7022,18 +7019,73 @@
           </a:p>
         </p:txBody>
       </p:sp>
+      <p:sp>
+        <p:nvSpPr>
+          <p:cNvPr id="9" name="Right Arrow 8">
+            <a:hlinkClick r:id="rId7" action="ppaction://hlinksldjump"/>
+          </p:cNvPr>
+          <p:cNvSpPr/>
+          <p:nvPr/>
+        </p:nvSpPr>
+        <p:spPr>
+          <a:xfrm>
+            <a:off x="163005" y="4390804"/>
+            <a:ext cx="978408" cy="484632"/>
+          </a:xfrm>
+          <a:prstGeom prst="rightArrow">
+            <a:avLst>
+              <a:gd name="adj1" fmla="val 34702"/>
+              <a:gd name="adj2" fmla="val 72948"/>
+            </a:avLst>
+          </a:prstGeom>
+          <a:solidFill>
+            <a:srgbClr val="DEB400"/>
+          </a:solidFill>
+          <a:ln>
+            <a:solidFill>
+              <a:schemeClr val="accent3">
+                <a:lumMod val="50000"/>
+              </a:schemeClr>
+            </a:solidFill>
+          </a:ln>
+        </p:spPr>
+        <p:style>
+          <a:lnRef idx="2">
+            <a:schemeClr val="accent1">
+              <a:shade val="50000"/>
+            </a:schemeClr>
+          </a:lnRef>
+          <a:fillRef idx="1">
+            <a:schemeClr val="accent1"/>
+          </a:fillRef>
+          <a:effectRef idx="0">
+            <a:schemeClr val="accent1"/>
+          </a:effectRef>
+          <a:fontRef idx="minor">
+            <a:schemeClr val="lt1"/>
+          </a:fontRef>
+        </p:style>
+        <p:txBody>
+          <a:bodyPr rtlCol="0" anchor="ctr"/>
+          <a:lstStyle/>
+          <a:p>
+            <a:pPr algn="ctr"/>
+            <a:endParaRPr lang="en-US"/>
+          </a:p>
+        </p:txBody>
+      </p:sp>
     </p:spTree>
   </p:cSld>
   <p:clrMapOvr>
     <a:masterClrMapping/>
   </p:clrMapOvr>
-  <mc:AlternateContent xmlns:mc="http://schemas.openxmlformats.org/markup-compatibility/2006">
-    <mc:Choice xmlns:p14="http://schemas.microsoft.com/office/powerpoint/2010/main" Requires="p14">
+  <mc:AlternateContent xmlns:mc="http://schemas.openxmlformats.org/markup-compatibility/2006" xmlns:p14="http://schemas.microsoft.com/office/powerpoint/2010/main">
+    <mc:Choice Requires="p14">
       <p:transition spd="slow" p14:dur="1300">
         <p14:pan dir="u"/>
       </p:transition>
     </mc:Choice>
-    <mc:Fallback>
+    <mc:Fallback xmlns="">
       <p:transition spd="slow">
         <p:fade/>
       </p:transition>
@@ -7180,7 +7232,7 @@
       <p:sp>
         <p:nvSpPr>
           <p:cNvPr id="6" name="מלבן 5">
-            <a:hlinkClick r:id="rId1" action="ppaction://hlinksldjump"/>
+            <a:hlinkClick r:id="rId2" action="ppaction://hlinksldjump"/>
           </p:cNvPr>
           <p:cNvSpPr/>
           <p:nvPr/>
@@ -7436,7 +7488,6 @@
               <a:rPr lang="en-US" dirty="0" smtClean="0"/>
               <a:t>Will attempt to find a registered user with this email.</a:t>
             </a:r>
-            <a:endParaRPr lang="en-US" dirty="0" smtClean="0"/>
           </a:p>
           <a:p>
             <a:pPr algn="ctr"/>
@@ -7444,7 +7495,6 @@
               <a:rPr lang="en-US" dirty="0" smtClean="0"/>
               <a:t>If found, will link them and the ticket.</a:t>
             </a:r>
-            <a:endParaRPr lang="en-US" dirty="0" smtClean="0"/>
           </a:p>
           <a:p>
             <a:pPr algn="ctr"/>
@@ -7459,7 +7509,7 @@
       <p:sp>
         <p:nvSpPr>
           <p:cNvPr id="12" name="מלבן 6">
-            <a:hlinkClick r:id="rId2" action="ppaction://hlinksldjump"/>
+            <a:hlinkClick r:id="rId3" action="ppaction://hlinksldjump"/>
           </p:cNvPr>
           <p:cNvSpPr/>
           <p:nvPr/>
@@ -7525,13 +7575,13 @@
   <p:clrMapOvr>
     <a:masterClrMapping/>
   </p:clrMapOvr>
-  <mc:AlternateContent xmlns:mc="http://schemas.openxmlformats.org/markup-compatibility/2006">
-    <mc:Choice xmlns:p14="http://schemas.microsoft.com/office/powerpoint/2010/main" Requires="p14">
+  <mc:AlternateContent xmlns:mc="http://schemas.openxmlformats.org/markup-compatibility/2006" xmlns:p14="http://schemas.microsoft.com/office/powerpoint/2010/main">
+    <mc:Choice Requires="p14">
       <p:transition spd="slow" p14:dur="1300">
         <p14:pan dir="u"/>
       </p:transition>
     </mc:Choice>
-    <mc:Fallback>
+    <mc:Fallback xmlns="">
       <p:transition spd="slow">
         <p:fade/>
       </p:transition>
@@ -7637,7 +7687,7 @@
       <p:sp>
         <p:nvSpPr>
           <p:cNvPr id="4" name="מלבן 6">
-            <a:hlinkClick r:id="rId1" action="ppaction://hlinksldjump"/>
+            <a:hlinkClick r:id="rId2" action="ppaction://hlinksldjump"/>
           </p:cNvPr>
           <p:cNvSpPr/>
           <p:nvPr/>
@@ -7703,13 +7753,13 @@
   <p:clrMapOvr>
     <a:masterClrMapping/>
   </p:clrMapOvr>
-  <mc:AlternateContent xmlns:mc="http://schemas.openxmlformats.org/markup-compatibility/2006">
-    <mc:Choice xmlns:p14="http://schemas.microsoft.com/office/powerpoint/2010/main" Requires="p14">
+  <mc:AlternateContent xmlns:mc="http://schemas.openxmlformats.org/markup-compatibility/2006" xmlns:p14="http://schemas.microsoft.com/office/powerpoint/2010/main">
+    <mc:Choice Requires="p14">
       <p:transition spd="slow" p14:dur="1300">
         <p14:pan dir="u"/>
       </p:transition>
     </mc:Choice>
-    <mc:Fallback>
+    <mc:Fallback xmlns="">
       <p:transition spd="slow">
         <p:fade/>
       </p:transition>
@@ -7838,7 +7888,7 @@
       <p:sp>
         <p:nvSpPr>
           <p:cNvPr id="5" name="מלבן 6">
-            <a:hlinkClick r:id="rId1" action="ppaction://hlinksldjump"/>
+            <a:hlinkClick r:id="rId2" action="ppaction://hlinksldjump"/>
           </p:cNvPr>
           <p:cNvSpPr/>
           <p:nvPr/>
@@ -7904,13 +7954,13 @@
   <p:clrMapOvr>
     <a:masterClrMapping/>
   </p:clrMapOvr>
-  <mc:AlternateContent xmlns:mc="http://schemas.openxmlformats.org/markup-compatibility/2006">
-    <mc:Choice xmlns:p14="http://schemas.microsoft.com/office/powerpoint/2010/main" Requires="p14">
+  <mc:AlternateContent xmlns:mc="http://schemas.openxmlformats.org/markup-compatibility/2006" xmlns:p14="http://schemas.microsoft.com/office/powerpoint/2010/main">
+    <mc:Choice Requires="p14">
       <p:transition spd="slow" p14:dur="1300">
         <p14:pan dir="u"/>
       </p:transition>
     </mc:Choice>
-    <mc:Fallback>
+    <mc:Fallback xmlns="">
       <p:transition spd="slow">
         <p:fade/>
       </p:transition>
@@ -7976,7 +8026,12 @@
             <p:ph idx="1"/>
           </p:nvPr>
         </p:nvSpPr>
-        <p:spPr/>
+        <p:spPr>
+          <a:xfrm>
+            <a:off x="1141413" y="1893675"/>
+            <a:ext cx="9905998" cy="3124201"/>
+          </a:xfrm>
+        </p:spPr>
         <p:txBody>
           <a:bodyPr anchor="t"/>
           <a:lstStyle/>
@@ -7988,7 +8043,6 @@
               <a:rPr lang="en-US" dirty="0" smtClean="0"/>
               <a:t>Ticket ID: XXXX</a:t>
             </a:r>
-            <a:endParaRPr lang="en-US" dirty="0" smtClean="0"/>
           </a:p>
           <a:p>
             <a:pPr marL="0" indent="0" algn="l" rtl="0">
@@ -7998,7 +8052,6 @@
               <a:rPr lang="en-US" dirty="0" smtClean="0"/>
               <a:t>Description: ____</a:t>
             </a:r>
-            <a:endParaRPr lang="en-US" dirty="0" smtClean="0"/>
           </a:p>
           <a:p>
             <a:pPr marL="0" indent="0" algn="l" rtl="0">
@@ -8020,7 +8073,7 @@
         </p:nvSpPr>
         <p:spPr>
           <a:xfrm>
-            <a:off x="1450119" y="4036315"/>
+            <a:off x="1450119" y="3352164"/>
             <a:ext cx="4481124" cy="525585"/>
           </a:xfrm>
           <a:prstGeom prst="rect">
@@ -8064,7 +8117,7 @@
         </p:nvSpPr>
         <p:spPr>
           <a:xfrm>
-            <a:off x="1450119" y="4651472"/>
+            <a:off x="1450119" y="3990901"/>
             <a:ext cx="4481124" cy="525585"/>
           </a:xfrm>
           <a:prstGeom prst="rect">
@@ -8147,7 +8200,7 @@
       <p:sp>
         <p:nvSpPr>
           <p:cNvPr id="7" name="מלבן 6">
-            <a:hlinkClick r:id="rId1" action="ppaction://hlinksldjump"/>
+            <a:hlinkClick r:id="rId2" action="ppaction://hlinksldjump"/>
           </p:cNvPr>
           <p:cNvSpPr/>
           <p:nvPr/>
@@ -8211,7 +8264,7 @@
       <p:sp>
         <p:nvSpPr>
           <p:cNvPr id="8" name="מלבן 6">
-            <a:hlinkClick r:id="rId1" action="ppaction://hlinksldjump"/>
+            <a:hlinkClick r:id="rId2" action="ppaction://hlinksldjump"/>
           </p:cNvPr>
           <p:cNvSpPr/>
           <p:nvPr/>
@@ -8562,7 +8615,6 @@
               <a:rPr lang="en-US" dirty="0" smtClean="0"/>
               <a:t>Notes: ____</a:t>
             </a:r>
-            <a:endParaRPr lang="en-US" dirty="0" smtClean="0"/>
           </a:p>
           <a:p>
             <a:r>
@@ -8599,21 +8651,18 @@
               <a:rPr lang="en-US" dirty="0" smtClean="0"/>
               <a:t>Ticket creator:</a:t>
             </a:r>
-            <a:endParaRPr lang="en-US" dirty="0" smtClean="0"/>
           </a:p>
           <a:p>
             <a:r>
               <a:rPr lang="en-US" dirty="0" smtClean="0"/>
               <a:t>Name:</a:t>
             </a:r>
-            <a:endParaRPr lang="en-US" dirty="0" smtClean="0"/>
           </a:p>
           <a:p>
             <a:r>
               <a:rPr lang="en-US" dirty="0" smtClean="0"/>
               <a:t>E-Mail:</a:t>
             </a:r>
-            <a:endParaRPr lang="en-US" dirty="0" smtClean="0"/>
           </a:p>
           <a:p>
             <a:r>
@@ -8621,6 +8670,50 @@
               <a:t>Phone Number:</a:t>
             </a:r>
             <a:endParaRPr lang="en-US" dirty="0"/>
+          </a:p>
+        </p:txBody>
+      </p:sp>
+      <p:sp>
+        <p:nvSpPr>
+          <p:cNvPr id="17" name="מלבן 4"/>
+          <p:cNvSpPr/>
+          <p:nvPr/>
+        </p:nvSpPr>
+        <p:spPr>
+          <a:xfrm>
+            <a:off x="1450119" y="4648081"/>
+            <a:ext cx="4481124" cy="525585"/>
+          </a:xfrm>
+          <a:prstGeom prst="rect">
+            <a:avLst/>
+          </a:prstGeom>
+        </p:spPr>
+        <p:style>
+          <a:lnRef idx="2">
+            <a:schemeClr val="accent1">
+              <a:shade val="50000"/>
+            </a:schemeClr>
+          </a:lnRef>
+          <a:fillRef idx="1">
+            <a:schemeClr val="accent1"/>
+          </a:fillRef>
+          <a:effectRef idx="0">
+            <a:schemeClr val="accent1"/>
+          </a:effectRef>
+          <a:fontRef idx="minor">
+            <a:schemeClr val="lt1"/>
+          </a:fontRef>
+        </p:style>
+        <p:txBody>
+          <a:bodyPr rtlCol="1" anchor="ctr"/>
+          <a:lstStyle/>
+          <a:p>
+            <a:pPr algn="ctr"/>
+            <a:r>
+              <a:rPr lang="en-US" dirty="0" smtClean="0"/>
+              <a:t>Media of Communication</a:t>
+            </a:r>
+            <a:endParaRPr lang="he-IL" dirty="0"/>
           </a:p>
         </p:txBody>
       </p:sp>
@@ -8629,13 +8722,13 @@
   <p:clrMapOvr>
     <a:masterClrMapping/>
   </p:clrMapOvr>
-  <mc:AlternateContent xmlns:mc="http://schemas.openxmlformats.org/markup-compatibility/2006">
-    <mc:Choice xmlns:p14="http://schemas.microsoft.com/office/powerpoint/2010/main" Requires="p14">
+  <mc:AlternateContent xmlns:mc="http://schemas.openxmlformats.org/markup-compatibility/2006" xmlns:p14="http://schemas.microsoft.com/office/powerpoint/2010/main">
+    <mc:Choice Requires="p14">
       <p:transition spd="slow" p14:dur="1300">
         <p14:pan dir="u"/>
       </p:transition>
     </mc:Choice>
-    <mc:Fallback>
+    <mc:Fallback xmlns="">
       <p:transition spd="slow">
         <p:fade/>
       </p:transition>
@@ -8718,14 +8811,9 @@
               <a:buChar char="•"/>
             </a:pPr>
             <a:r>
-              <a:rPr lang="en-US" dirty="0"/>
-              <a:t>Title </a:t>
-            </a:r>
-            <a:r>
               <a:rPr lang="en-US" dirty="0" smtClean="0"/>
-              <a:t>– ID</a:t>
-            </a:r>
-            <a:endParaRPr lang="en-US" dirty="0" smtClean="0"/>
+              <a:t>Title – ID</a:t>
+            </a:r>
           </a:p>
           <a:p>
             <a:pPr marL="285750" indent="-285750">
@@ -8733,10 +8821,13 @@
               <a:buChar char="•"/>
             </a:pPr>
             <a:r>
+              <a:rPr lang="en-US" dirty="0" smtClean="0"/>
+              <a:t>Title </a:t>
+            </a:r>
+            <a:r>
               <a:rPr lang="en-US" dirty="0"/>
-              <a:t>Title - ID</a:t>
-            </a:r>
-            <a:endParaRPr lang="en-US" dirty="0"/>
+              <a:t>- ID</a:t>
+            </a:r>
           </a:p>
           <a:p>
             <a:pPr marL="285750" indent="-285750">
@@ -8744,14 +8835,9 @@
               <a:buChar char="•"/>
             </a:pPr>
             <a:r>
-              <a:rPr lang="en-US" dirty="0"/>
-              <a:t>Title - </a:t>
-            </a:r>
-            <a:r>
               <a:rPr lang="en-US" dirty="0" smtClean="0"/>
-              <a:t>ID</a:t>
-            </a:r>
-            <a:endParaRPr lang="en-US" dirty="0" smtClean="0"/>
+              <a:t>Title - ID</a:t>
+            </a:r>
           </a:p>
           <a:p>
             <a:pPr marL="285750" indent="-285750">
@@ -8759,10 +8845,13 @@
               <a:buChar char="•"/>
             </a:pPr>
             <a:r>
+              <a:rPr lang="en-US" dirty="0" smtClean="0"/>
+              <a:t>Title </a:t>
+            </a:r>
+            <a:r>
               <a:rPr lang="en-US" dirty="0"/>
-              <a:t>Title - ID</a:t>
-            </a:r>
-            <a:endParaRPr lang="en-US" dirty="0"/>
+              <a:t>- ID</a:t>
+            </a:r>
           </a:p>
           <a:p>
             <a:pPr marL="285750" indent="-285750">
@@ -8773,7 +8862,6 @@
               <a:rPr lang="en-US" dirty="0"/>
               <a:t>Title - ID</a:t>
             </a:r>
-            <a:endParaRPr lang="en-US" dirty="0"/>
           </a:p>
           <a:p>
             <a:pPr marL="285750" indent="-285750">
@@ -8784,7 +8872,6 @@
               <a:rPr lang="en-US" dirty="0"/>
               <a:t>Title - ID</a:t>
             </a:r>
-            <a:endParaRPr lang="en-US" dirty="0"/>
           </a:p>
           <a:p>
             <a:pPr marL="285750" indent="-285750">
@@ -8795,7 +8882,6 @@
               <a:rPr lang="en-US" dirty="0"/>
               <a:t>Title - ID</a:t>
             </a:r>
-            <a:endParaRPr lang="en-US" dirty="0"/>
           </a:p>
           <a:p>
             <a:pPr marL="285750" indent="-285750">
@@ -8810,7 +8896,6 @@
               <a:rPr lang="en-US" dirty="0" smtClean="0"/>
               <a:t>– ID</a:t>
             </a:r>
-            <a:endParaRPr lang="en-US" dirty="0" smtClean="0"/>
           </a:p>
           <a:p>
             <a:pPr marL="285750" indent="-285750">
@@ -8828,7 +8913,7 @@
       <p:sp>
         <p:nvSpPr>
           <p:cNvPr id="5" name="מלבן 6">
-            <a:hlinkClick r:id="rId1" action="ppaction://hlinksldjump"/>
+            <a:hlinkClick r:id="rId2" action="ppaction://hlinksldjump"/>
           </p:cNvPr>
           <p:cNvSpPr/>
           <p:nvPr/>
@@ -9233,12 +9318,60 @@
           <a:bodyPr wrap="none" rtlCol="0">
             <a:spAutoFit/>
           </a:bodyPr>
+          <a:lstStyle/>
           <a:p>
             <a:r>
               <a:rPr lang="en-US" altLang="en-US"/>
               <a:t>Tickets that answer the criteria: X</a:t>
             </a:r>
-            <a:endParaRPr lang="en-US" altLang="en-US"/>
+          </a:p>
+        </p:txBody>
+      </p:sp>
+      <p:sp>
+        <p:nvSpPr>
+          <p:cNvPr id="16" name="מלבן 6"/>
+          <p:cNvSpPr/>
+          <p:nvPr/>
+        </p:nvSpPr>
+        <p:spPr>
+          <a:xfrm>
+            <a:off x="8159577" y="4068697"/>
+            <a:ext cx="2690581" cy="525584"/>
+          </a:xfrm>
+          <a:prstGeom prst="rect">
+            <a:avLst/>
+          </a:prstGeom>
+        </p:spPr>
+        <p:style>
+          <a:lnRef idx="2">
+            <a:schemeClr val="accent1">
+              <a:shade val="50000"/>
+            </a:schemeClr>
+          </a:lnRef>
+          <a:fillRef idx="1">
+            <a:schemeClr val="accent1"/>
+          </a:fillRef>
+          <a:effectRef idx="0">
+            <a:schemeClr val="accent1"/>
+          </a:effectRef>
+          <a:fontRef idx="minor">
+            <a:schemeClr val="lt1"/>
+          </a:fontRef>
+        </p:style>
+        <p:txBody>
+          <a:bodyPr rtlCol="1" anchor="ctr"/>
+          <a:lstStyle/>
+          <a:p>
+            <a:pPr algn="ctr"/>
+            <a:r>
+              <a:rPr lang="en-US" dirty="0" smtClean="0"/>
+              <a:t>Filter by </a:t>
+            </a:r>
+            <a:r>
+              <a:rPr lang="en-US" dirty="0" smtClean="0"/>
+              <a:t>media</a:t>
+            </a:r>
+            <a:endParaRPr lang="he-IL" dirty="0"/>
           </a:p>
         </p:txBody>
       </p:sp>
@@ -9247,13 +9380,13 @@
   <p:clrMapOvr>
     <a:masterClrMapping/>
   </p:clrMapOvr>
-  <mc:AlternateContent xmlns:mc="http://schemas.openxmlformats.org/markup-compatibility/2006">
-    <mc:Choice xmlns:p14="http://schemas.microsoft.com/office/powerpoint/2010/main" Requires="p14">
+  <mc:AlternateContent xmlns:mc="http://schemas.openxmlformats.org/markup-compatibility/2006" xmlns:p14="http://schemas.microsoft.com/office/powerpoint/2010/main">
+    <mc:Choice Requires="p14">
       <p:transition spd="slow" p14:dur="1300">
         <p14:pan dir="u"/>
       </p:transition>
     </mc:Choice>
-    <mc:Fallback>
+    <mc:Fallback xmlns="">
       <p:transition spd="slow">
         <p:fade/>
       </p:transition>
@@ -9400,7 +9533,7 @@
       <p:sp>
         <p:nvSpPr>
           <p:cNvPr id="6" name="מלבן 5">
-            <a:hlinkClick r:id="rId1" action="ppaction://hlinksldjump"/>
+            <a:hlinkClick r:id="rId2" action="ppaction://hlinksldjump"/>
           </p:cNvPr>
           <p:cNvSpPr/>
           <p:nvPr/>
@@ -9464,7 +9597,7 @@
       <p:sp>
         <p:nvSpPr>
           <p:cNvPr id="7" name="מלבן 6">
-            <a:hlinkClick r:id="rId1" action="ppaction://hlinksldjump"/>
+            <a:hlinkClick r:id="rId2" action="ppaction://hlinksldjump"/>
           </p:cNvPr>
           <p:cNvSpPr/>
           <p:nvPr/>
@@ -9614,6 +9747,177 @@
         </p:txBody>
       </p:sp>
     </p:spTree>
+  </p:cSld>
+  <p:clrMapOvr>
+    <a:masterClrMapping/>
+  </p:clrMapOvr>
+  <mc:AlternateContent xmlns:mc="http://schemas.openxmlformats.org/markup-compatibility/2006" xmlns:p14="http://schemas.microsoft.com/office/powerpoint/2010/main">
+    <mc:Choice Requires="p14">
+      <p:transition spd="slow" p14:dur="1300">
+        <p14:pan dir="u"/>
+      </p:transition>
+    </mc:Choice>
+    <mc:Fallback xmlns="">
+      <p:transition spd="slow">
+        <p:fade/>
+      </p:transition>
+    </mc:Fallback>
+  </mc:AlternateContent>
+  <p:timing>
+    <p:tnLst>
+      <p:par>
+        <p:cTn id="1" dur="indefinite" restart="never" nodeType="tmRoot"/>
+      </p:par>
+    </p:tnLst>
+  </p:timing>
+</p:sld>
+</file>
+
+<file path=ppt/slides/slide19.xml><?xml version="1.0" encoding="utf-8"?>
+<p:sld xmlns:a="http://schemas.openxmlformats.org/drawingml/2006/main" xmlns:r="http://schemas.openxmlformats.org/officeDocument/2006/relationships" xmlns:p="http://schemas.openxmlformats.org/presentationml/2006/main">
+  <p:cSld>
+    <p:spTree>
+      <p:nvGrpSpPr>
+        <p:cNvPr id="1" name=""/>
+        <p:cNvGrpSpPr/>
+        <p:nvPr/>
+      </p:nvGrpSpPr>
+      <p:grpSpPr>
+        <a:xfrm>
+          <a:off x="0" y="0"/>
+          <a:ext cx="0" cy="0"/>
+          <a:chOff x="0" y="0"/>
+          <a:chExt cx="0" cy="0"/>
+        </a:xfrm>
+      </p:grpSpPr>
+      <p:sp>
+        <p:nvSpPr>
+          <p:cNvPr id="2" name="Title 1"/>
+          <p:cNvSpPr>
+            <a:spLocks noGrp="1"/>
+          </p:cNvSpPr>
+          <p:nvPr>
+            <p:ph type="title"/>
+          </p:nvPr>
+        </p:nvSpPr>
+        <p:spPr>
+          <a:xfrm>
+            <a:off x="268576" y="231339"/>
+            <a:ext cx="9905998" cy="1905000"/>
+          </a:xfrm>
+        </p:spPr>
+        <p:txBody>
+          <a:bodyPr/>
+          <a:lstStyle/>
+          <a:p>
+            <a:r>
+              <a:rPr lang="en-US" dirty="0" smtClean="0"/>
+              <a:t>Stats</a:t>
+            </a:r>
+            <a:endParaRPr lang="en-US" dirty="0"/>
+          </a:p>
+        </p:txBody>
+      </p:sp>
+      <p:sp>
+        <p:nvSpPr>
+          <p:cNvPr id="5" name="Rectangle 4"/>
+          <p:cNvSpPr/>
+          <p:nvPr/>
+        </p:nvSpPr>
+        <p:spPr>
+          <a:xfrm>
+            <a:off x="543791" y="2136339"/>
+            <a:ext cx="6096000" cy="2031325"/>
+          </a:xfrm>
+          <a:prstGeom prst="rect">
+            <a:avLst/>
+          </a:prstGeom>
+        </p:spPr>
+        <p:txBody>
+          <a:bodyPr>
+            <a:spAutoFit/>
+          </a:bodyPr>
+          <a:lstStyle/>
+          <a:p>
+            <a:pPr marL="285750" indent="-285750">
+              <a:buFont typeface="Arial" panose="020B0604020202020204" pitchFamily="34" charset="0"/>
+              <a:buChar char="•"/>
+            </a:pPr>
+            <a:r>
+              <a:rPr lang="en-US" dirty="0" smtClean="0"/>
+              <a:t>Day with most </a:t>
+            </a:r>
+            <a:r>
+              <a:rPr lang="en-US" dirty="0" err="1" smtClean="0"/>
+              <a:t>oppened</a:t>
+            </a:r>
+            <a:r>
+              <a:rPr lang="en-US" dirty="0" smtClean="0"/>
+              <a:t> tickets:</a:t>
+            </a:r>
+          </a:p>
+          <a:p>
+            <a:pPr marL="285750" indent="-285750">
+              <a:buFont typeface="Arial" panose="020B0604020202020204" pitchFamily="34" charset="0"/>
+              <a:buChar char="•"/>
+            </a:pPr>
+            <a:r>
+              <a:rPr lang="en-US" dirty="0" smtClean="0"/>
+              <a:t>Most active support giver:</a:t>
+            </a:r>
+          </a:p>
+          <a:p>
+            <a:pPr marL="285750" indent="-285750">
+              <a:buFont typeface="Arial" panose="020B0604020202020204" pitchFamily="34" charset="0"/>
+              <a:buChar char="•"/>
+            </a:pPr>
+            <a:r>
+              <a:rPr lang="en-US" dirty="0" smtClean="0"/>
+              <a:t>Number of tickets with X title:</a:t>
+            </a:r>
+          </a:p>
+          <a:p>
+            <a:pPr marL="285750" indent="-285750">
+              <a:buFont typeface="Arial" panose="020B0604020202020204" pitchFamily="34" charset="0"/>
+              <a:buChar char="•"/>
+            </a:pPr>
+            <a:r>
+              <a:rPr lang="en-US" dirty="0" smtClean="0"/>
+              <a:t>Tickets opened today:</a:t>
+            </a:r>
+          </a:p>
+          <a:p>
+            <a:pPr marL="285750" indent="-285750">
+              <a:buFont typeface="Arial" panose="020B0604020202020204" pitchFamily="34" charset="0"/>
+              <a:buChar char="•"/>
+            </a:pPr>
+            <a:r>
+              <a:rPr lang="en-US" dirty="0" smtClean="0"/>
+              <a:t>Tickets closed today:</a:t>
+            </a:r>
+          </a:p>
+          <a:p>
+            <a:pPr marL="285750" indent="-285750">
+              <a:buFont typeface="Arial" panose="020B0604020202020204" pitchFamily="34" charset="0"/>
+              <a:buChar char="•"/>
+            </a:pPr>
+            <a:endParaRPr lang="en-US" dirty="0" smtClean="0"/>
+          </a:p>
+          <a:p>
+            <a:pPr marL="285750" indent="-285750">
+              <a:buFont typeface="Arial" panose="020B0604020202020204" pitchFamily="34" charset="0"/>
+              <a:buChar char="•"/>
+            </a:pPr>
+            <a:endParaRPr lang="en-US" dirty="0"/>
+          </a:p>
+        </p:txBody>
+      </p:sp>
+    </p:spTree>
+    <p:extLst>
+      <p:ext uri="{BB962C8B-B14F-4D97-AF65-F5344CB8AC3E}">
+        <p14:creationId xmlns:p14="http://schemas.microsoft.com/office/powerpoint/2010/main" val="1260041249"/>
+      </p:ext>
+    </p:extLst>
   </p:cSld>
   <p:clrMapOvr>
     <a:masterClrMapping/>
@@ -9630,13 +9934,6 @@
       </p:transition>
     </mc:Fallback>
   </mc:AlternateContent>
-  <p:timing>
-    <p:tnLst>
-      <p:par>
-        <p:cTn id="1" dur="indefinite" restart="never" nodeType="tmRoot"/>
-      </p:par>
-    </p:tnLst>
-  </p:timing>
 </p:sld>
 </file>
 
@@ -9795,7 +10092,7 @@
       <p:sp>
         <p:nvSpPr>
           <p:cNvPr id="8" name="מלבן 7">
-            <a:hlinkClick r:id="rId1" action="ppaction://hlinksldjump"/>
+            <a:hlinkClick r:id="rId2" action="ppaction://hlinksldjump"/>
           </p:cNvPr>
           <p:cNvSpPr/>
           <p:nvPr/>
@@ -9886,7 +10183,6 @@
               <a:rPr lang="en-US" dirty="0" smtClean="0"/>
               <a:t>?</a:t>
             </a:r>
-            <a:endParaRPr lang="en-US" dirty="0" smtClean="0"/>
           </a:p>
           <a:p>
             <a:pPr algn="r"/>
@@ -9903,13 +10199,13 @@
   <p:clrMapOvr>
     <a:masterClrMapping/>
   </p:clrMapOvr>
-  <mc:AlternateContent xmlns:mc="http://schemas.openxmlformats.org/markup-compatibility/2006">
-    <mc:Choice xmlns:p14="http://schemas.microsoft.com/office/powerpoint/2010/main" Requires="p14">
+  <mc:AlternateContent xmlns:mc="http://schemas.openxmlformats.org/markup-compatibility/2006" xmlns:p14="http://schemas.microsoft.com/office/powerpoint/2010/main">
+    <mc:Choice Requires="p14">
       <p:transition spd="slow" p14:dur="1300">
         <p14:pan dir="u"/>
       </p:transition>
     </mc:Choice>
-    <mc:Fallback>
+    <mc:Fallback xmlns="">
       <p:transition spd="slow">
         <p:fade/>
       </p:transition>
@@ -9970,7 +10266,7 @@
       <p:sp>
         <p:nvSpPr>
           <p:cNvPr id="4" name="מלבן 5">
-            <a:hlinkClick r:id="rId1" action="ppaction://hlinksldjump"/>
+            <a:hlinkClick r:id="rId2" action="ppaction://hlinksldjump"/>
           </p:cNvPr>
           <p:cNvSpPr/>
           <p:nvPr/>
@@ -10023,11 +10319,6 @@
               </a:rPr>
               <a:t>NO</a:t>
             </a:r>
-            <a:endParaRPr lang="en-US" b="1" dirty="0" smtClean="0">
-              <a:solidFill>
-                <a:schemeClr val="bg1"/>
-              </a:solidFill>
-            </a:endParaRPr>
           </a:p>
           <a:p>
             <a:pPr algn="ctr"/>
@@ -10050,7 +10341,7 @@
       <p:sp>
         <p:nvSpPr>
           <p:cNvPr id="5" name="מלבן 6">
-            <a:hlinkClick r:id="rId2" action="ppaction://hlinksldjump"/>
+            <a:hlinkClick r:id="rId3" action="ppaction://hlinksldjump"/>
           </p:cNvPr>
           <p:cNvSpPr/>
           <p:nvPr/>
@@ -10103,11 +10394,6 @@
               </a:rPr>
               <a:t>YES</a:t>
             </a:r>
-            <a:endParaRPr lang="en-US" b="1" dirty="0" smtClean="0">
-              <a:solidFill>
-                <a:schemeClr val="bg1"/>
-              </a:solidFill>
-            </a:endParaRPr>
           </a:p>
           <a:p>
             <a:pPr algn="ctr"/>
@@ -10154,7 +10440,6 @@
               <a:rPr lang="en-US" dirty="0" smtClean="0"/>
               <a:t>This page is not part of the program.</a:t>
             </a:r>
-            <a:endParaRPr lang="en-US" dirty="0" smtClean="0"/>
           </a:p>
           <a:p>
             <a:pPr algn="ctr"/>
@@ -10171,13 +10456,13 @@
   <p:clrMapOvr>
     <a:masterClrMapping/>
   </p:clrMapOvr>
-  <mc:AlternateContent xmlns:mc="http://schemas.openxmlformats.org/markup-compatibility/2006">
-    <mc:Choice xmlns:p14="http://schemas.microsoft.com/office/powerpoint/2010/main" Requires="p14">
+  <mc:AlternateContent xmlns:mc="http://schemas.openxmlformats.org/markup-compatibility/2006" xmlns:p14="http://schemas.microsoft.com/office/powerpoint/2010/main">
+    <mc:Choice Requires="p14">
       <p:transition spd="slow" p14:dur="1300">
         <p14:pan dir="u"/>
       </p:transition>
     </mc:Choice>
-    <mc:Fallback>
+    <mc:Fallback xmlns="">
       <p:transition spd="slow">
         <p:fade/>
       </p:transition>
@@ -10282,7 +10567,6 @@
               <a:rPr lang="en-US" dirty="0"/>
               <a:t>status</a:t>
             </a:r>
-            <a:endParaRPr lang="en-US" dirty="0"/>
           </a:p>
           <a:p>
             <a:pPr marL="457200" indent="-457200" algn="l" rtl="0">
@@ -10308,7 +10592,6 @@
               <a:rPr lang="en-US" dirty="0"/>
               <a:t>Update contact information</a:t>
             </a:r>
-            <a:endParaRPr lang="en-US" dirty="0"/>
           </a:p>
           <a:p>
             <a:pPr marL="457200" indent="-457200" algn="l" rtl="0">
@@ -10319,7 +10602,6 @@
               <a:rPr lang="en-US" dirty="0"/>
               <a:t>FAQ / Q&amp;A</a:t>
             </a:r>
-            <a:endParaRPr lang="en-US" dirty="0"/>
           </a:p>
           <a:p>
             <a:pPr marL="457200" indent="-457200" algn="l" rtl="0">
@@ -10337,7 +10619,7 @@
       <p:sp>
         <p:nvSpPr>
           <p:cNvPr id="5" name="Right Arrow 4">
-            <a:hlinkClick r:id="rId1" action="ppaction://hlinksldjump"/>
+            <a:hlinkClick r:id="rId2" action="ppaction://hlinksldjump"/>
           </p:cNvPr>
           <p:cNvSpPr/>
           <p:nvPr/>
@@ -10392,7 +10674,7 @@
       <p:sp>
         <p:nvSpPr>
           <p:cNvPr id="6" name="Right Arrow 5">
-            <a:hlinkClick r:id="rId2" action="ppaction://hlinksldjump"/>
+            <a:hlinkClick r:id="rId3" action="ppaction://hlinksldjump"/>
           </p:cNvPr>
           <p:cNvSpPr/>
           <p:nvPr/>
@@ -10447,7 +10729,7 @@
       <p:sp>
         <p:nvSpPr>
           <p:cNvPr id="7" name="Right Arrow 6">
-            <a:hlinkClick r:id="rId3" action="ppaction://hlinksldjump"/>
+            <a:hlinkClick r:id="rId4" action="ppaction://hlinksldjump"/>
           </p:cNvPr>
           <p:cNvSpPr/>
           <p:nvPr/>
@@ -10502,7 +10784,7 @@
       <p:sp>
         <p:nvSpPr>
           <p:cNvPr id="8" name="Right Arrow 7">
-            <a:hlinkClick r:id="rId4" action="ppaction://hlinksldjump"/>
+            <a:hlinkClick r:id="rId5" action="ppaction://hlinksldjump"/>
           </p:cNvPr>
           <p:cNvSpPr/>
           <p:nvPr/>
@@ -10557,7 +10839,7 @@
       <p:sp>
         <p:nvSpPr>
           <p:cNvPr id="9" name="Right Arrow 8">
-            <a:hlinkClick r:id="rId5" action="ppaction://hlinksldjump"/>
+            <a:hlinkClick r:id="rId6" action="ppaction://hlinksldjump"/>
           </p:cNvPr>
           <p:cNvSpPr/>
           <p:nvPr/>
@@ -10612,7 +10894,7 @@
       <p:sp>
         <p:nvSpPr>
           <p:cNvPr id="10" name="Right Arrow 9">
-            <a:hlinkClick r:id="rId6" action="ppaction://hlinksldjump"/>
+            <a:hlinkClick r:id="rId7" action="ppaction://hlinksldjump"/>
           </p:cNvPr>
           <p:cNvSpPr/>
           <p:nvPr/>
@@ -10669,13 +10951,13 @@
   <p:clrMapOvr>
     <a:masterClrMapping/>
   </p:clrMapOvr>
-  <mc:AlternateContent xmlns:mc="http://schemas.openxmlformats.org/markup-compatibility/2006">
-    <mc:Choice xmlns:p14="http://schemas.microsoft.com/office/powerpoint/2010/main" Requires="p14">
+  <mc:AlternateContent xmlns:mc="http://schemas.openxmlformats.org/markup-compatibility/2006" xmlns:p14="http://schemas.microsoft.com/office/powerpoint/2010/main">
+    <mc:Choice Requires="p14">
       <p:transition spd="slow" p14:dur="1300">
         <p14:pan dir="u"/>
       </p:transition>
     </mc:Choice>
-    <mc:Fallback>
+    <mc:Fallback xmlns="">
       <p:transition spd="slow">
         <p:fade/>
       </p:transition>
@@ -10822,7 +11104,7 @@
       <p:sp>
         <p:nvSpPr>
           <p:cNvPr id="6" name="מלבן 5">
-            <a:hlinkClick r:id="rId1" action="ppaction://hlinksldjump"/>
+            <a:hlinkClick r:id="rId2" action="ppaction://hlinksldjump"/>
           </p:cNvPr>
           <p:cNvSpPr/>
           <p:nvPr/>
@@ -10932,13 +11214,13 @@
   <p:clrMapOvr>
     <a:masterClrMapping/>
   </p:clrMapOvr>
-  <mc:AlternateContent xmlns:mc="http://schemas.openxmlformats.org/markup-compatibility/2006">
-    <mc:Choice xmlns:p14="http://schemas.microsoft.com/office/powerpoint/2010/main" Requires="p14">
+  <mc:AlternateContent xmlns:mc="http://schemas.openxmlformats.org/markup-compatibility/2006" xmlns:p14="http://schemas.microsoft.com/office/powerpoint/2010/main">
+    <mc:Choice Requires="p14">
       <p:transition spd="slow" p14:dur="1300">
         <p14:pan dir="u"/>
       </p:transition>
     </mc:Choice>
-    <mc:Fallback>
+    <mc:Fallback xmlns="">
       <p:transition spd="slow">
         <p:fade/>
       </p:transition>
@@ -11044,7 +11326,7 @@
       <p:sp>
         <p:nvSpPr>
           <p:cNvPr id="4" name="מלבן 6">
-            <a:hlinkClick r:id="rId1" action="ppaction://hlinksldjump"/>
+            <a:hlinkClick r:id="rId2" action="ppaction://hlinksldjump"/>
           </p:cNvPr>
           <p:cNvSpPr/>
           <p:nvPr/>
@@ -11110,13 +11392,13 @@
   <p:clrMapOvr>
     <a:masterClrMapping/>
   </p:clrMapOvr>
-  <mc:AlternateContent xmlns:mc="http://schemas.openxmlformats.org/markup-compatibility/2006">
-    <mc:Choice xmlns:p14="http://schemas.microsoft.com/office/powerpoint/2010/main" Requires="p14">
+  <mc:AlternateContent xmlns:mc="http://schemas.openxmlformats.org/markup-compatibility/2006" xmlns:p14="http://schemas.microsoft.com/office/powerpoint/2010/main">
+    <mc:Choice Requires="p14">
       <p:transition spd="slow" p14:dur="1300">
         <p14:pan dir="u"/>
       </p:transition>
     </mc:Choice>
-    <mc:Fallback>
+    <mc:Fallback xmlns="">
       <p:transition spd="slow">
         <p:fade/>
       </p:transition>
@@ -11245,7 +11527,7 @@
       <p:sp>
         <p:nvSpPr>
           <p:cNvPr id="5" name="מלבן 6">
-            <a:hlinkClick r:id="rId1" action="ppaction://hlinksldjump"/>
+            <a:hlinkClick r:id="rId2" action="ppaction://hlinksldjump"/>
           </p:cNvPr>
           <p:cNvSpPr/>
           <p:nvPr/>
@@ -11311,13 +11593,13 @@
   <p:clrMapOvr>
     <a:masterClrMapping/>
   </p:clrMapOvr>
-  <mc:AlternateContent xmlns:mc="http://schemas.openxmlformats.org/markup-compatibility/2006">
-    <mc:Choice xmlns:p14="http://schemas.microsoft.com/office/powerpoint/2010/main" Requires="p14">
+  <mc:AlternateContent xmlns:mc="http://schemas.openxmlformats.org/markup-compatibility/2006" xmlns:p14="http://schemas.microsoft.com/office/powerpoint/2010/main">
+    <mc:Choice Requires="p14">
       <p:transition spd="slow" p14:dur="1300">
         <p14:pan dir="u"/>
       </p:transition>
     </mc:Choice>
-    <mc:Fallback>
+    <mc:Fallback xmlns="">
       <p:transition spd="slow">
         <p:fade/>
       </p:transition>
@@ -11397,7 +11679,6 @@
               <a:rPr lang="en-US" dirty="0" smtClean="0"/>
               <a:t>Ticket ID: XXXX</a:t>
             </a:r>
-            <a:endParaRPr lang="en-US" dirty="0" smtClean="0"/>
           </a:p>
           <a:p>
             <a:pPr marL="0" indent="0" algn="l" rtl="0">
@@ -11407,7 +11688,6 @@
               <a:rPr lang="en-US" dirty="0" smtClean="0"/>
               <a:t>Title:</a:t>
             </a:r>
-            <a:endParaRPr lang="en-US" dirty="0" smtClean="0"/>
           </a:p>
           <a:p>
             <a:pPr marL="0" indent="0" algn="l" rtl="0">
@@ -11417,7 +11697,6 @@
               <a:rPr lang="en-US" dirty="0" smtClean="0"/>
               <a:t>Date:</a:t>
             </a:r>
-            <a:endParaRPr lang="en-US" dirty="0" smtClean="0"/>
           </a:p>
           <a:p>
             <a:pPr marL="0" indent="0" algn="l" rtl="0">
@@ -11427,7 +11706,6 @@
               <a:rPr lang="en-US" dirty="0" smtClean="0"/>
               <a:t>Status:</a:t>
             </a:r>
-            <a:endParaRPr lang="en-US" dirty="0" smtClean="0"/>
           </a:p>
           <a:p>
             <a:pPr marL="0" indent="0" algn="l" rtl="0">
@@ -11437,7 +11715,6 @@
               <a:rPr lang="en-US" dirty="0" smtClean="0"/>
               <a:t>Tier:</a:t>
             </a:r>
-            <a:endParaRPr lang="en-US" dirty="0" smtClean="0"/>
           </a:p>
           <a:p>
             <a:pPr marL="0" indent="0" algn="l" rtl="0">
@@ -11447,7 +11724,6 @@
               <a:rPr lang="en-US" dirty="0" smtClean="0"/>
               <a:t>Type:</a:t>
             </a:r>
-            <a:endParaRPr lang="en-US" dirty="0" smtClean="0"/>
           </a:p>
           <a:p>
             <a:pPr marL="0" indent="0" algn="l" rtl="0">
@@ -11457,7 +11733,6 @@
               <a:rPr lang="en-US" dirty="0" smtClean="0"/>
               <a:t>Severity:</a:t>
             </a:r>
-            <a:endParaRPr lang="en-US" dirty="0" smtClean="0"/>
           </a:p>
           <a:p>
             <a:pPr marL="0" indent="0" algn="l" rtl="0">
@@ -11467,7 +11742,6 @@
               <a:rPr lang="en-US" dirty="0" smtClean="0"/>
               <a:t>Description:</a:t>
             </a:r>
-            <a:endParaRPr lang="en-US" dirty="0" smtClean="0"/>
           </a:p>
           <a:p>
             <a:pPr marL="0" indent="0" algn="l" rtl="0">
@@ -11484,7 +11758,7 @@
       <p:sp>
         <p:nvSpPr>
           <p:cNvPr id="4" name="מלבן 6">
-            <a:hlinkClick r:id="rId1" action="ppaction://hlinksldjump"/>
+            <a:hlinkClick r:id="rId2" action="ppaction://hlinksldjump"/>
           </p:cNvPr>
           <p:cNvSpPr/>
           <p:nvPr/>
@@ -11550,13 +11824,13 @@
   <p:clrMapOvr>
     <a:masterClrMapping/>
   </p:clrMapOvr>
-  <mc:AlternateContent xmlns:mc="http://schemas.openxmlformats.org/markup-compatibility/2006">
-    <mc:Choice xmlns:p14="http://schemas.microsoft.com/office/powerpoint/2010/main" Requires="p14">
+  <mc:AlternateContent xmlns:mc="http://schemas.openxmlformats.org/markup-compatibility/2006" xmlns:p14="http://schemas.microsoft.com/office/powerpoint/2010/main">
+    <mc:Choice Requires="p14">
       <p:transition spd="slow" p14:dur="1300">
         <p14:pan dir="u"/>
       </p:transition>
     </mc:Choice>
-    <mc:Fallback>
+    <mc:Fallback xmlns="">
       <p:transition spd="slow">
         <p:fade/>
       </p:transition>
@@ -11646,7 +11920,6 @@
               <a:rPr lang="en-US" dirty="0" smtClean="0"/>
               <a:t>)</a:t>
             </a:r>
-            <a:endParaRPr lang="en-US" dirty="0" smtClean="0"/>
           </a:p>
           <a:p>
             <a:pPr algn="l" rtl="0"/>
@@ -11654,7 +11927,6 @@
               <a:rPr lang="en-US" dirty="0"/>
               <a:t>(Ticket ID) – (Ticket Title)</a:t>
             </a:r>
-            <a:endParaRPr lang="en-US" dirty="0"/>
           </a:p>
           <a:p>
             <a:pPr algn="l" rtl="0"/>
@@ -11666,7 +11938,6 @@
               <a:rPr lang="en-US" dirty="0" smtClean="0"/>
               <a:t>)</a:t>
             </a:r>
-            <a:endParaRPr lang="en-US" dirty="0" smtClean="0"/>
           </a:p>
           <a:p>
             <a:pPr algn="l" rtl="0"/>
@@ -11674,7 +11945,6 @@
               <a:rPr lang="en-US" dirty="0"/>
               <a:t>(Ticket ID) – (Ticket Title)</a:t>
             </a:r>
-            <a:endParaRPr lang="en-US" dirty="0"/>
           </a:p>
           <a:p>
             <a:pPr algn="l" rtl="0"/>
@@ -11689,7 +11959,7 @@
       <p:sp>
         <p:nvSpPr>
           <p:cNvPr id="4" name="מלבן 6">
-            <a:hlinkClick r:id="rId1" action="ppaction://hlinksldjump"/>
+            <a:hlinkClick r:id="rId2" action="ppaction://hlinksldjump"/>
           </p:cNvPr>
           <p:cNvSpPr/>
           <p:nvPr/>
@@ -11755,13 +12025,13 @@
   <p:clrMapOvr>
     <a:masterClrMapping/>
   </p:clrMapOvr>
-  <mc:AlternateContent xmlns:mc="http://schemas.openxmlformats.org/markup-compatibility/2006">
-    <mc:Choice xmlns:p14="http://schemas.microsoft.com/office/powerpoint/2010/main" Requires="p14">
+  <mc:AlternateContent xmlns:mc="http://schemas.openxmlformats.org/markup-compatibility/2006" xmlns:p14="http://schemas.microsoft.com/office/powerpoint/2010/main">
+    <mc:Choice Requires="p14">
       <p:transition spd="slow" p14:dur="1300">
         <p14:pan dir="u"/>
       </p:transition>
     </mc:Choice>
-    <mc:Fallback>
+    <mc:Fallback xmlns="">
       <p:transition spd="slow">
         <p:fade/>
       </p:transition>
@@ -12025,6 +12295,8 @@
       </a:bgFillStyleLst>
     </a:fmtScheme>
   </a:themeElements>
+  <a:objectDefaults/>
+  <a:extraClrSchemeLst/>
   <a:extLst>
     <a:ext uri="{05A4C25C-085E-4340-85A3-A5531E510DB2}">
       <thm15:themeFamily xmlns:thm15="http://schemas.microsoft.com/office/thememl/2012/main" name="Office Theme" id="{62F939B6-93AF-4DB8-9C6B-D6C7DFDC589F}" vid="{4A3C46E8-61CC-4603-A589-7422A47A8E4A}"/>

</xml_diff>

<commit_message>
Update prototype and SRS
</commit_message>
<xml_diff>
--- a/Requirements & Specifications/Prototype.pptx
+++ b/Requirements & Specifications/Prototype.pptx
@@ -354,7 +354,7 @@
           <a:p>
             <a:fld id="{B61BEF0D-F0BB-DE4B-95CE-6DB70DBA9567}" type="datetimeFigureOut">
               <a:rPr lang="en-US" dirty="0"/>
-              <a:t>11/20/2018</a:t>
+              <a:t>11/25/2018</a:t>
             </a:fld>
             <a:endParaRPr lang="en-US" dirty="0"/>
           </a:p>
@@ -652,7 +652,7 @@
           <a:p>
             <a:fld id="{B61BEF0D-F0BB-DE4B-95CE-6DB70DBA9567}" type="datetimeFigureOut">
               <a:rPr lang="en-US" dirty="0"/>
-              <a:t>11/20/2018</a:t>
+              <a:t>11/25/2018</a:t>
             </a:fld>
             <a:endParaRPr lang="en-US" dirty="0"/>
           </a:p>
@@ -918,7 +918,7 @@
           <a:p>
             <a:fld id="{B61BEF0D-F0BB-DE4B-95CE-6DB70DBA9567}" type="datetimeFigureOut">
               <a:rPr lang="en-US" dirty="0"/>
-              <a:t>11/20/2018</a:t>
+              <a:t>11/25/2018</a:t>
             </a:fld>
             <a:endParaRPr lang="en-US" dirty="0"/>
           </a:p>
@@ -1394,7 +1394,7 @@
           <a:p>
             <a:fld id="{B61BEF0D-F0BB-DE4B-95CE-6DB70DBA9567}" type="datetimeFigureOut">
               <a:rPr lang="en-US" dirty="0"/>
-              <a:t>11/20/2018</a:t>
+              <a:t>11/25/2018</a:t>
             </a:fld>
             <a:endParaRPr lang="en-US" dirty="0"/>
           </a:p>
@@ -1581,7 +1581,7 @@
           <a:p>
             <a:fld id="{B61BEF0D-F0BB-DE4B-95CE-6DB70DBA9567}" type="datetimeFigureOut">
               <a:rPr lang="en-US" dirty="0"/>
-              <a:t>11/20/2018</a:t>
+              <a:t>11/25/2018</a:t>
             </a:fld>
             <a:endParaRPr lang="en-US" dirty="0"/>
           </a:p>
@@ -2164,7 +2164,7 @@
           <a:p>
             <a:fld id="{B61BEF0D-F0BB-DE4B-95CE-6DB70DBA9567}" type="datetimeFigureOut">
               <a:rPr lang="en-US" dirty="0"/>
-              <a:t>11/20/2018</a:t>
+              <a:t>11/25/2018</a:t>
             </a:fld>
             <a:endParaRPr lang="en-US" dirty="0"/>
           </a:p>
@@ -2503,7 +2503,7 @@
           <a:p>
             <a:fld id="{B61BEF0D-F0BB-DE4B-95CE-6DB70DBA9567}" type="datetimeFigureOut">
               <a:rPr lang="en-US" dirty="0"/>
-              <a:t>11/20/2018</a:t>
+              <a:t>11/25/2018</a:t>
             </a:fld>
             <a:endParaRPr lang="en-US" dirty="0"/>
           </a:p>
@@ -2685,7 +2685,7 @@
           <a:p>
             <a:fld id="{B61BEF0D-F0BB-DE4B-95CE-6DB70DBA9567}" type="datetimeFigureOut">
               <a:rPr lang="en-US" dirty="0"/>
-              <a:t>11/20/2018</a:t>
+              <a:t>11/25/2018</a:t>
             </a:fld>
             <a:endParaRPr lang="en-US" dirty="0"/>
           </a:p>
@@ -2872,7 +2872,7 @@
           <a:p>
             <a:fld id="{B61BEF0D-F0BB-DE4B-95CE-6DB70DBA9567}" type="datetimeFigureOut">
               <a:rPr lang="en-US" dirty="0"/>
-              <a:t>11/20/2018</a:t>
+              <a:t>11/25/2018</a:t>
             </a:fld>
             <a:endParaRPr lang="en-US" dirty="0"/>
           </a:p>
@@ -3049,7 +3049,7 @@
           <a:p>
             <a:fld id="{B61BEF0D-F0BB-DE4B-95CE-6DB70DBA9567}" type="datetimeFigureOut">
               <a:rPr lang="en-US" dirty="0"/>
-              <a:t>11/20/2018</a:t>
+              <a:t>11/25/2018</a:t>
             </a:fld>
             <a:endParaRPr lang="en-US" dirty="0"/>
           </a:p>
@@ -3313,7 +3313,7 @@
           <a:p>
             <a:fld id="{B61BEF0D-F0BB-DE4B-95CE-6DB70DBA9567}" type="datetimeFigureOut">
               <a:rPr lang="en-US" dirty="0"/>
-              <a:t>11/20/2018</a:t>
+              <a:t>11/25/2018</a:t>
             </a:fld>
             <a:endParaRPr lang="en-US" dirty="0"/>
           </a:p>
@@ -3612,7 +3612,7 @@
           <a:p>
             <a:fld id="{B61BEF0D-F0BB-DE4B-95CE-6DB70DBA9567}" type="datetimeFigureOut">
               <a:rPr lang="en-US" dirty="0"/>
-              <a:t>11/20/2018</a:t>
+              <a:t>11/25/2018</a:t>
             </a:fld>
             <a:endParaRPr lang="en-US" dirty="0"/>
           </a:p>
@@ -4049,7 +4049,7 @@
           <a:p>
             <a:fld id="{B61BEF0D-F0BB-DE4B-95CE-6DB70DBA9567}" type="datetimeFigureOut">
               <a:rPr lang="en-US" dirty="0"/>
-              <a:t>11/20/2018</a:t>
+              <a:t>11/25/2018</a:t>
             </a:fld>
             <a:endParaRPr lang="en-US" dirty="0"/>
           </a:p>
@@ -4174,7 +4174,7 @@
           <a:p>
             <a:fld id="{B61BEF0D-F0BB-DE4B-95CE-6DB70DBA9567}" type="datetimeFigureOut">
               <a:rPr lang="en-US" dirty="0"/>
-              <a:t>11/20/2018</a:t>
+              <a:t>11/25/2018</a:t>
             </a:fld>
             <a:endParaRPr lang="en-US" dirty="0"/>
           </a:p>
@@ -4276,7 +4276,7 @@
           <a:p>
             <a:fld id="{B61BEF0D-F0BB-DE4B-95CE-6DB70DBA9567}" type="datetimeFigureOut">
               <a:rPr lang="en-US" dirty="0"/>
-              <a:t>11/20/2018</a:t>
+              <a:t>11/25/2018</a:t>
             </a:fld>
             <a:endParaRPr lang="en-US" dirty="0"/>
           </a:p>
@@ -4566,7 +4566,7 @@
           <a:p>
             <a:fld id="{B61BEF0D-F0BB-DE4B-95CE-6DB70DBA9567}" type="datetimeFigureOut">
               <a:rPr lang="en-US" dirty="0"/>
-              <a:t>11/20/2018</a:t>
+              <a:t>11/25/2018</a:t>
             </a:fld>
             <a:endParaRPr lang="en-US" dirty="0"/>
           </a:p>
@@ -4864,7 +4864,7 @@
           <a:p>
             <a:fld id="{B61BEF0D-F0BB-DE4B-95CE-6DB70DBA9567}" type="datetimeFigureOut">
               <a:rPr lang="en-US" dirty="0"/>
-              <a:t>11/20/2018</a:t>
+              <a:t>11/25/2018</a:t>
             </a:fld>
             <a:endParaRPr lang="en-US" dirty="0"/>
           </a:p>
@@ -5102,7 +5102,7 @@
           <a:p>
             <a:fld id="{B61BEF0D-F0BB-DE4B-95CE-6DB70DBA9567}" type="datetimeFigureOut">
               <a:rPr lang="en-US" dirty="0"/>
-              <a:t>11/20/2018</a:t>
+              <a:t>11/25/2018</a:t>
             </a:fld>
             <a:endParaRPr lang="en-US" dirty="0"/>
           </a:p>
@@ -6708,11 +6708,7 @@
             </a:pPr>
             <a:r>
               <a:rPr lang="en-US" dirty="0" smtClean="0"/>
-              <a:t>Create </a:t>
-            </a:r>
-            <a:r>
-              <a:rPr lang="en-US" dirty="0" smtClean="0"/>
-              <a:t>user</a:t>
+              <a:t>Create user</a:t>
             </a:r>
           </a:p>
           <a:p>
@@ -7301,8 +7297,8 @@
         </p:nvSpPr>
         <p:spPr>
           <a:xfrm>
-            <a:off x="1450119" y="4551405"/>
-            <a:ext cx="9186620" cy="1054759"/>
+            <a:off x="1450119" y="5143860"/>
+            <a:ext cx="9186620" cy="562800"/>
           </a:xfrm>
           <a:prstGeom prst="rect">
             <a:avLst/>
@@ -7345,7 +7341,7 @@
         </p:nvSpPr>
         <p:spPr>
           <a:xfrm>
-            <a:off x="1450119" y="3909248"/>
+            <a:off x="1450119" y="3882038"/>
             <a:ext cx="9186620" cy="525585"/>
           </a:xfrm>
           <a:prstGeom prst="rect">
@@ -7374,8 +7370,12 @@
           <a:p>
             <a:pPr algn="ctr"/>
             <a:r>
+              <a:rPr lang="en-US" dirty="0"/>
+              <a:t>Severity(Medium</a:t>
+            </a:r>
+            <a:r>
               <a:rPr lang="en-US" dirty="0" smtClean="0"/>
-              <a:t>Severity</a:t>
+              <a:t>, High, Critical, Urgent)</a:t>
             </a:r>
             <a:endParaRPr lang="he-IL" dirty="0"/>
           </a:p>
@@ -7567,6 +7567,50 @@
                 <a:schemeClr val="bg1"/>
               </a:solidFill>
             </a:endParaRPr>
+          </a:p>
+        </p:txBody>
+      </p:sp>
+      <p:sp>
+        <p:nvSpPr>
+          <p:cNvPr id="14" name="מלבן 4"/>
+          <p:cNvSpPr/>
+          <p:nvPr/>
+        </p:nvSpPr>
+        <p:spPr>
+          <a:xfrm>
+            <a:off x="1450119" y="4502118"/>
+            <a:ext cx="9186620" cy="525585"/>
+          </a:xfrm>
+          <a:prstGeom prst="rect">
+            <a:avLst/>
+          </a:prstGeom>
+        </p:spPr>
+        <p:style>
+          <a:lnRef idx="2">
+            <a:schemeClr val="accent1">
+              <a:shade val="50000"/>
+            </a:schemeClr>
+          </a:lnRef>
+          <a:fillRef idx="1">
+            <a:schemeClr val="accent1"/>
+          </a:fillRef>
+          <a:effectRef idx="0">
+            <a:schemeClr val="accent1"/>
+          </a:effectRef>
+          <a:fontRef idx="minor">
+            <a:schemeClr val="lt1"/>
+          </a:fontRef>
+        </p:style>
+        <p:txBody>
+          <a:bodyPr rtlCol="1" anchor="ctr"/>
+          <a:lstStyle/>
+          <a:p>
+            <a:pPr algn="ctr"/>
+            <a:r>
+              <a:rPr lang="en-US" dirty="0" smtClean="0"/>
+              <a:t>Media of Communication</a:t>
+            </a:r>
+            <a:endParaRPr lang="he-IL" dirty="0"/>
           </a:p>
         </p:txBody>
       </p:sp>
@@ -8061,6 +8105,15 @@
               <a:rPr lang="en-US" dirty="0" smtClean="0"/>
               <a:t>_______________</a:t>
             </a:r>
+          </a:p>
+          <a:p>
+            <a:pPr marL="0" indent="0" algn="l" rtl="0">
+              <a:buNone/>
+            </a:pPr>
+            <a:r>
+              <a:rPr lang="en-US" dirty="0" smtClean="0"/>
+              <a:t>Media of communication:_______</a:t>
+            </a:r>
             <a:endParaRPr lang="en-US" dirty="0"/>
           </a:p>
         </p:txBody>
@@ -8073,7 +8126,7 @@
         </p:nvSpPr>
         <p:spPr>
           <a:xfrm>
-            <a:off x="1450119" y="3352164"/>
+            <a:off x="1450119" y="4036315"/>
             <a:ext cx="4481124" cy="525585"/>
           </a:xfrm>
           <a:prstGeom prst="rect">
@@ -8117,7 +8170,7 @@
         </p:nvSpPr>
         <p:spPr>
           <a:xfrm>
-            <a:off x="1450119" y="3990901"/>
+            <a:off x="1450119" y="4648081"/>
             <a:ext cx="4481124" cy="525585"/>
           </a:xfrm>
           <a:prstGeom prst="rect">
@@ -8161,7 +8214,7 @@
         </p:nvSpPr>
         <p:spPr>
           <a:xfrm>
-            <a:off x="1450119" y="5329457"/>
+            <a:off x="1450119" y="5279401"/>
             <a:ext cx="4481124" cy="525585"/>
           </a:xfrm>
           <a:prstGeom prst="rect">
@@ -8421,7 +8474,7 @@
         </p:nvSpPr>
         <p:spPr>
           <a:xfrm>
-            <a:off x="6141307" y="5329457"/>
+            <a:off x="6141307" y="5279402"/>
             <a:ext cx="4495431" cy="525585"/>
           </a:xfrm>
           <a:prstGeom prst="rect">
@@ -8598,7 +8651,7 @@
         <p:spPr>
           <a:xfrm>
             <a:off x="6141307" y="1346887"/>
-            <a:ext cx="1454244" cy="646331"/>
+            <a:ext cx="1595309" cy="707886"/>
           </a:xfrm>
           <a:prstGeom prst="rect">
             <a:avLst/>
@@ -8612,16 +8665,16 @@
           <a:lstStyle/>
           <a:p>
             <a:r>
-              <a:rPr lang="en-US" dirty="0" smtClean="0"/>
+              <a:rPr lang="en-US" sz="2000" dirty="0" smtClean="0"/>
               <a:t>Notes: ____</a:t>
             </a:r>
           </a:p>
           <a:p>
             <a:r>
-              <a:rPr lang="en-US" dirty="0" smtClean="0"/>
+              <a:rPr lang="en-US" sz="2000" dirty="0" smtClean="0"/>
               <a:t>___________</a:t>
             </a:r>
-            <a:endParaRPr lang="en-US" dirty="0"/>
+            <a:endParaRPr lang="en-US" sz="2000" dirty="0"/>
           </a:p>
         </p:txBody>
       </p:sp>
@@ -8634,7 +8687,7 @@
         <p:spPr>
           <a:xfrm>
             <a:off x="6141306" y="146558"/>
-            <a:ext cx="4495432" cy="1200329"/>
+            <a:ext cx="4495432" cy="1323439"/>
           </a:xfrm>
           <a:prstGeom prst="rect">
             <a:avLst/>
@@ -8648,72 +8701,28 @@
           <a:lstStyle/>
           <a:p>
             <a:r>
-              <a:rPr lang="en-US" dirty="0" smtClean="0"/>
+              <a:rPr lang="en-US" sz="2000" dirty="0" smtClean="0"/>
               <a:t>Ticket creator:</a:t>
             </a:r>
           </a:p>
           <a:p>
             <a:r>
-              <a:rPr lang="en-US" dirty="0" smtClean="0"/>
+              <a:rPr lang="en-US" sz="2000" dirty="0" smtClean="0"/>
               <a:t>Name:</a:t>
             </a:r>
           </a:p>
           <a:p>
             <a:r>
-              <a:rPr lang="en-US" dirty="0" smtClean="0"/>
+              <a:rPr lang="en-US" sz="2000" dirty="0" smtClean="0"/>
               <a:t>E-Mail:</a:t>
             </a:r>
           </a:p>
           <a:p>
             <a:r>
-              <a:rPr lang="en-US" dirty="0" smtClean="0"/>
+              <a:rPr lang="en-US" sz="2000" dirty="0" smtClean="0"/>
               <a:t>Phone Number:</a:t>
             </a:r>
-            <a:endParaRPr lang="en-US" dirty="0"/>
-          </a:p>
-        </p:txBody>
-      </p:sp>
-      <p:sp>
-        <p:nvSpPr>
-          <p:cNvPr id="17" name="מלבן 4"/>
-          <p:cNvSpPr/>
-          <p:nvPr/>
-        </p:nvSpPr>
-        <p:spPr>
-          <a:xfrm>
-            <a:off x="1450119" y="4648081"/>
-            <a:ext cx="4481124" cy="525585"/>
-          </a:xfrm>
-          <a:prstGeom prst="rect">
-            <a:avLst/>
-          </a:prstGeom>
-        </p:spPr>
-        <p:style>
-          <a:lnRef idx="2">
-            <a:schemeClr val="accent1">
-              <a:shade val="50000"/>
-            </a:schemeClr>
-          </a:lnRef>
-          <a:fillRef idx="1">
-            <a:schemeClr val="accent1"/>
-          </a:fillRef>
-          <a:effectRef idx="0">
-            <a:schemeClr val="accent1"/>
-          </a:effectRef>
-          <a:fontRef idx="minor">
-            <a:schemeClr val="lt1"/>
-          </a:fontRef>
-        </p:style>
-        <p:txBody>
-          <a:bodyPr rtlCol="1" anchor="ctr"/>
-          <a:lstStyle/>
-          <a:p>
-            <a:pPr algn="ctr"/>
-            <a:r>
-              <a:rPr lang="en-US" dirty="0" smtClean="0"/>
-              <a:t>Media of Communication</a:t>
-            </a:r>
-            <a:endParaRPr lang="he-IL" dirty="0"/>
+            <a:endParaRPr lang="en-US" sz="2000" dirty="0"/>
           </a:p>
         </p:txBody>
       </p:sp>
@@ -9365,11 +9374,7 @@
             <a:pPr algn="ctr"/>
             <a:r>
               <a:rPr lang="en-US" dirty="0" smtClean="0"/>
-              <a:t>Filter by </a:t>
-            </a:r>
-            <a:r>
-              <a:rPr lang="en-US" dirty="0" smtClean="0"/>
-              <a:t>media</a:t>
+              <a:t>Filter by media</a:t>
             </a:r>
             <a:endParaRPr lang="he-IL" dirty="0"/>
           </a:p>
@@ -9827,7 +9832,7 @@
         <p:spPr>
           <a:xfrm>
             <a:off x="543791" y="2136339"/>
-            <a:ext cx="6096000" cy="2031325"/>
+            <a:ext cx="6096000" cy="1754326"/>
           </a:xfrm>
           <a:prstGeom prst="rect">
             <a:avLst/>
@@ -9848,12 +9853,12 @@
               <a:t>Day with most </a:t>
             </a:r>
             <a:r>
-              <a:rPr lang="en-US" dirty="0" err="1" smtClean="0"/>
-              <a:t>oppened</a:t>
-            </a:r>
-            <a:r>
               <a:rPr lang="en-US" dirty="0" smtClean="0"/>
-              <a:t> tickets:</a:t>
+              <a:t>opened </a:t>
+            </a:r>
+            <a:r>
+              <a:rPr lang="en-US" dirty="0" smtClean="0"/>
+              <a:t>tickets:</a:t>
             </a:r>
           </a:p>
           <a:p>
@@ -9863,18 +9868,17 @@
             </a:pPr>
             <a:r>
               <a:rPr lang="en-US" dirty="0" smtClean="0"/>
-              <a:t>Most active support giver:</a:t>
-            </a:r>
-          </a:p>
-          <a:p>
-            <a:pPr marL="285750" indent="-285750">
-              <a:buFont typeface="Arial" panose="020B0604020202020204" pitchFamily="34" charset="0"/>
-              <a:buChar char="•"/>
-            </a:pPr>
+              <a:t>Number </a:t>
+            </a:r>
             <a:r>
               <a:rPr lang="en-US" dirty="0" smtClean="0"/>
-              <a:t>Number of tickets with X title:</a:t>
-            </a:r>
+              <a:t>of tickets with X </a:t>
+            </a:r>
+            <a:r>
+              <a:rPr lang="en-US" dirty="0" smtClean="0"/>
+              <a:t>type:</a:t>
+            </a:r>
+            <a:endParaRPr lang="en-US" dirty="0" smtClean="0"/>
           </a:p>
           <a:p>
             <a:pPr marL="285750" indent="-285750">
@@ -9922,13 +9926,13 @@
   <p:clrMapOvr>
     <a:masterClrMapping/>
   </p:clrMapOvr>
-  <mc:AlternateContent xmlns:mc="http://schemas.openxmlformats.org/markup-compatibility/2006">
-    <mc:Choice xmlns:p14="http://schemas.microsoft.com/office/powerpoint/2010/main" Requires="p14">
+  <mc:AlternateContent xmlns:mc="http://schemas.openxmlformats.org/markup-compatibility/2006" xmlns:p14="http://schemas.microsoft.com/office/powerpoint/2010/main">
+    <mc:Choice Requires="p14">
       <p:transition spd="slow" p14:dur="1300">
         <p14:pan dir="u"/>
       </p:transition>
     </mc:Choice>
-    <mc:Fallback>
+    <mc:Fallback xmlns="">
       <p:transition spd="slow">
         <p:fade/>
       </p:transition>
@@ -11065,7 +11069,7 @@
         </p:nvSpPr>
         <p:spPr>
           <a:xfrm>
-            <a:off x="1450119" y="2775926"/>
+            <a:off x="1450119" y="2640214"/>
             <a:ext cx="9186620" cy="525585"/>
           </a:xfrm>
           <a:prstGeom prst="rect">
@@ -11173,8 +11177,8 @@
         </p:nvSpPr>
         <p:spPr>
           <a:xfrm>
-            <a:off x="1450119" y="3511676"/>
-            <a:ext cx="9186620" cy="1435462"/>
+            <a:off x="1450119" y="3942612"/>
+            <a:ext cx="9186620" cy="468433"/>
           </a:xfrm>
           <a:prstGeom prst="rect">
             <a:avLst/>
@@ -11204,6 +11208,98 @@
             <a:r>
               <a:rPr lang="en-US" dirty="0"/>
               <a:t>Description</a:t>
+            </a:r>
+            <a:endParaRPr lang="he-IL" dirty="0"/>
+          </a:p>
+        </p:txBody>
+      </p:sp>
+      <p:sp>
+        <p:nvSpPr>
+          <p:cNvPr id="8" name="מלבן 7"/>
+          <p:cNvSpPr/>
+          <p:nvPr/>
+        </p:nvSpPr>
+        <p:spPr>
+          <a:xfrm>
+            <a:off x="1450119" y="3291413"/>
+            <a:ext cx="9186620" cy="525585"/>
+          </a:xfrm>
+          <a:prstGeom prst="rect">
+            <a:avLst/>
+          </a:prstGeom>
+        </p:spPr>
+        <p:style>
+          <a:lnRef idx="2">
+            <a:schemeClr val="accent1">
+              <a:shade val="50000"/>
+            </a:schemeClr>
+          </a:lnRef>
+          <a:fillRef idx="1">
+            <a:schemeClr val="accent1"/>
+          </a:fillRef>
+          <a:effectRef idx="0">
+            <a:schemeClr val="accent1"/>
+          </a:effectRef>
+          <a:fontRef idx="minor">
+            <a:schemeClr val="lt1"/>
+          </a:fontRef>
+        </p:style>
+        <p:txBody>
+          <a:bodyPr rtlCol="1" anchor="ctr"/>
+          <a:lstStyle/>
+          <a:p>
+            <a:pPr algn="ctr"/>
+            <a:r>
+              <a:rPr lang="en-US" dirty="0" smtClean="0"/>
+              <a:t>Severity(Medium, High, Critical, Urgent</a:t>
+            </a:r>
+            <a:r>
+              <a:rPr lang="en-US" dirty="0"/>
+              <a:t>)</a:t>
+            </a:r>
+            <a:endParaRPr lang="he-IL" dirty="0"/>
+          </a:p>
+        </p:txBody>
+      </p:sp>
+      <p:sp>
+        <p:nvSpPr>
+          <p:cNvPr id="9" name="מלבן 8"/>
+          <p:cNvSpPr/>
+          <p:nvPr/>
+        </p:nvSpPr>
+        <p:spPr>
+          <a:xfrm>
+            <a:off x="1450119" y="4536659"/>
+            <a:ext cx="9186620" cy="525585"/>
+          </a:xfrm>
+          <a:prstGeom prst="rect">
+            <a:avLst/>
+          </a:prstGeom>
+        </p:spPr>
+        <p:style>
+          <a:lnRef idx="2">
+            <a:schemeClr val="accent1">
+              <a:shade val="50000"/>
+            </a:schemeClr>
+          </a:lnRef>
+          <a:fillRef idx="1">
+            <a:schemeClr val="accent1"/>
+          </a:fillRef>
+          <a:effectRef idx="0">
+            <a:schemeClr val="accent1"/>
+          </a:effectRef>
+          <a:fontRef idx="minor">
+            <a:schemeClr val="lt1"/>
+          </a:fontRef>
+        </p:style>
+        <p:txBody>
+          <a:bodyPr rtlCol="1" anchor="ctr"/>
+          <a:lstStyle/>
+          <a:p>
+            <a:pPr algn="ctr"/>
+            <a:r>
+              <a:rPr lang="en-US" dirty="0" smtClean="0"/>
+              <a:t>Tags</a:t>
             </a:r>
             <a:endParaRPr lang="he-IL" dirty="0"/>
           </a:p>

</xml_diff>